<commit_message>
Updated type on the slide "adainit() & adafinal()"
</commit_message>
<xml_diff>
--- a/lectures/04_Mixed_Language_Programming_In_Ada/02_Ada_and_C/Slides/02_Ada_And_C.pptx
+++ b/lectures/04_Mixed_Language_Programming_In_Ada/02_Ada_and_C/Slides/02_Ada_And_C.pptx
@@ -1160,7 +1160,6 @@
               <a:rPr lang="en-GB" baseline="0" dirty="0" smtClean="0"/>
               <a:t>Here is an example of traversing a C array being traversed</a:t>
             </a:r>
-            <a:endParaRPr lang="en-GB" baseline="0" dirty="0" smtClean="0"/>
           </a:p>
         </p:txBody>
       </p:sp>
@@ -12271,25 +12270,7 @@
                           </a:solidFill>
                           <a:latin typeface="Courier New" pitchFamily="49" charset="0"/>
                         </a:rPr>
-                        <a:t>(1</a:t>
-                      </a:r>
-                      <a:r>
-                        <a:rPr lang="en-GB" sz="1100" b="1" baseline="0" dirty="0" smtClean="0">
-                          <a:solidFill>
-                            <a:schemeClr val="tx1"/>
-                          </a:solidFill>
-                          <a:latin typeface="Courier New" pitchFamily="49" charset="0"/>
-                        </a:rPr>
-                        <a:t>..2) </a:t>
-                      </a:r>
-                      <a:r>
-                        <a:rPr lang="en-GB" sz="1100" b="1" baseline="0" dirty="0" smtClean="0">
-                          <a:solidFill>
-                            <a:schemeClr val="tx1"/>
-                          </a:solidFill>
-                          <a:latin typeface="Courier New" pitchFamily="49" charset="0"/>
-                        </a:rPr>
-                        <a:t>:= ( </a:t>
+                        <a:t>(1..2) := ( </a:t>
                       </a:r>
                     </a:p>
                     <a:p>
@@ -12335,16 +12316,7 @@
                           </a:solidFill>
                           <a:latin typeface="Courier New" pitchFamily="49" charset="0"/>
                         </a:rPr>
-                        <a:t>("</a:t>
-                      </a:r>
-                      <a:r>
-                        <a:rPr lang="en-GB" sz="1100" b="1" baseline="0" dirty="0" smtClean="0">
-                          <a:solidFill>
-                            <a:schemeClr val="tx1"/>
-                          </a:solidFill>
-                          <a:latin typeface="Courier New" pitchFamily="49" charset="0"/>
-                        </a:rPr>
-                        <a:t>Hello World"),</a:t>
+                        <a:t>("Hello World"),</a:t>
                       </a:r>
                     </a:p>
                     <a:p>
@@ -12415,16 +12387,7 @@
                           </a:solidFill>
                           <a:latin typeface="Courier New" pitchFamily="49" charset="0"/>
                         </a:rPr>
-                        <a:t>      ) </a:t>
-                      </a:r>
-                      <a:r>
-                        <a:rPr lang="en-GB" sz="1100" b="1" baseline="0" dirty="0" smtClean="0">
-                          <a:solidFill>
-                            <a:schemeClr val="tx1"/>
-                          </a:solidFill>
-                          <a:latin typeface="Courier New" pitchFamily="49" charset="0"/>
-                        </a:rPr>
-                        <a:t>with</a:t>
+                        <a:t>      ) with</a:t>
                       </a:r>
                     </a:p>
                     <a:p>
@@ -14743,12 +14706,6 @@
                         </a:rPr>
                         <a:t>[4] = { 0x10, 0x20, 0x30, 0x40 };</a:t>
                       </a:r>
-                      <a:endParaRPr lang="en-GB" sz="1100" b="1" baseline="0" dirty="0" smtClean="0">
-                        <a:solidFill>
-                          <a:schemeClr val="tx1"/>
-                        </a:solidFill>
-                        <a:latin typeface="Courier New" pitchFamily="49" charset="0"/>
-                      </a:endParaRPr>
                     </a:p>
                   </a:txBody>
                   <a:tcPr marL="91413" marR="91413" marT="45445" marB="45445">
@@ -15968,16 +15925,7 @@
                           </a:solidFill>
                           <a:latin typeface="Courier New" pitchFamily="49" charset="0"/>
                         </a:rPr>
-                        <a:t>   </a:t>
-                      </a:r>
-                      <a:r>
-                        <a:rPr lang="en-GB" sz="1100" b="1" baseline="0" dirty="0" smtClean="0">
-                          <a:solidFill>
-                            <a:schemeClr val="tx1"/>
-                          </a:solidFill>
-                          <a:latin typeface="Courier New" pitchFamily="49" charset="0"/>
-                        </a:rPr>
-                        <a:t>for </a:t>
+                        <a:t>   for </a:t>
                       </a:r>
                       <a:r>
                         <a:rPr lang="en-GB" sz="1100" b="0" baseline="0" dirty="0" smtClean="0">
@@ -17774,12 +17722,6 @@
                         </a:rPr>
                         <a:t>;</a:t>
                       </a:r>
-                      <a:endParaRPr lang="en-GB" sz="1100" b="1" baseline="0" dirty="0" smtClean="0">
-                        <a:solidFill>
-                          <a:schemeClr val="tx1"/>
-                        </a:solidFill>
-                        <a:latin typeface="Courier New" pitchFamily="49" charset="0"/>
-                      </a:endParaRPr>
                     </a:p>
                   </a:txBody>
                   <a:tcPr marL="91413" marR="91413" marT="45445" marB="45445">
@@ -35529,12 +35471,6 @@
                         </a:rPr>
                         <a:t>;</a:t>
                       </a:r>
-                      <a:endParaRPr lang="en-GB" sz="1100" b="1" baseline="0" dirty="0" smtClean="0">
-                        <a:solidFill>
-                          <a:schemeClr val="tx1"/>
-                        </a:solidFill>
-                        <a:latin typeface="Courier New" pitchFamily="49" charset="0"/>
-                      </a:endParaRPr>
                     </a:p>
                     <a:p>
                       <a:pPr marL="0" marR="0" indent="0" algn="l" defTabSz="914400" rtl="0" eaLnBrk="1" fontAlgn="auto" latinLnBrk="0" hangingPunct="1">
@@ -36692,12 +36628,6 @@
                         </a:rPr>
                         <a:t>;</a:t>
                       </a:r>
-                      <a:endParaRPr lang="en-GB" sz="1100" b="1" baseline="0" dirty="0" smtClean="0">
-                        <a:solidFill>
-                          <a:schemeClr val="tx1"/>
-                        </a:solidFill>
-                        <a:latin typeface="Courier New" pitchFamily="49" charset="0"/>
-                      </a:endParaRPr>
                     </a:p>
                     <a:p>
                       <a:pPr marL="0" marR="0" indent="0" algn="l" defTabSz="914400" rtl="0" eaLnBrk="1" fontAlgn="auto" latinLnBrk="0" hangingPunct="1">
@@ -41662,7 +41592,23 @@
                   <a:schemeClr val="tx1"/>
                 </a:solidFill>
               </a:rPr>
-              <a:t>Must appear as a the following in C code</a:t>
+              <a:t>Must appear as </a:t>
+            </a:r>
+            <a:r>
+              <a:rPr lang="en-GB" b="0" kern="1200" dirty="0" smtClean="0">
+                <a:solidFill>
+                  <a:schemeClr val="tx1"/>
+                </a:solidFill>
+              </a:rPr>
+              <a:t>the </a:t>
+            </a:r>
+            <a:r>
+              <a:rPr lang="en-GB" b="0" kern="1200" dirty="0" smtClean="0">
+                <a:solidFill>
+                  <a:schemeClr val="tx1"/>
+                </a:solidFill>
+              </a:rPr>
+              <a:t>following in C code</a:t>
             </a:r>
           </a:p>
           <a:p>
@@ -41711,7 +41657,23 @@
                   <a:schemeClr val="tx1"/>
                 </a:solidFill>
               </a:rPr>
-              <a:t>Must appear as a the following in C code</a:t>
+              <a:t>Must appear as </a:t>
+            </a:r>
+            <a:r>
+              <a:rPr lang="en-GB" b="0" kern="1200" dirty="0" smtClean="0">
+                <a:solidFill>
+                  <a:schemeClr val="tx1"/>
+                </a:solidFill>
+              </a:rPr>
+              <a:t>the </a:t>
+            </a:r>
+            <a:r>
+              <a:rPr lang="en-GB" b="0" kern="1200" dirty="0">
+                <a:solidFill>
+                  <a:schemeClr val="tx1"/>
+                </a:solidFill>
+              </a:rPr>
+              <a:t>following in C code</a:t>
             </a:r>
           </a:p>
           <a:p>
@@ -43471,11 +43433,7 @@
           <a:p>
             <a:r>
               <a:rPr lang="en-GB" dirty="0" smtClean="0"/>
-              <a:t>Exporting Ada Memory </a:t>
-            </a:r>
-            <a:r>
-              <a:rPr lang="en-GB" dirty="0" smtClean="0"/>
-              <a:t>Objects</a:t>
+              <a:t>Exporting Ada Memory Objects</a:t>
             </a:r>
             <a:endParaRPr lang="en-GB" dirty="0"/>
           </a:p>
@@ -44726,6 +44684,89 @@
                         </a:rPr>
                         <a:t>;</a:t>
                       </a:r>
+                    </a:p>
+                    <a:p>
+                      <a:pPr marL="0" marR="0" indent="0" algn="l" defTabSz="914400" rtl="0" eaLnBrk="1" fontAlgn="auto" latinLnBrk="0" hangingPunct="1">
+                        <a:lnSpc>
+                          <a:spcPct val="100000"/>
+                        </a:lnSpc>
+                        <a:spcBef>
+                          <a:spcPts val="0"/>
+                        </a:spcBef>
+                        <a:spcAft>
+                          <a:spcPts val="0"/>
+                        </a:spcAft>
+                        <a:buClrTx/>
+                        <a:buSzTx/>
+                        <a:buFontTx/>
+                        <a:buNone/>
+                        <a:tabLst/>
+                        <a:defRPr/>
+                      </a:pPr>
+                      <a:r>
+                        <a:rPr lang="en-GB" sz="1100" b="1" baseline="0" dirty="0" smtClean="0">
+                          <a:solidFill>
+                            <a:schemeClr val="tx1"/>
+                          </a:solidFill>
+                          <a:latin typeface="Courier New" pitchFamily="49" charset="0"/>
+                        </a:rPr>
+                        <a:t>with </a:t>
+                      </a:r>
+                      <a:r>
+                        <a:rPr lang="en-GB" sz="1100" b="0" baseline="0" dirty="0" err="1" smtClean="0">
+                          <a:solidFill>
+                            <a:schemeClr val="tx1"/>
+                          </a:solidFill>
+                          <a:latin typeface="Courier New" pitchFamily="49" charset="0"/>
+                        </a:rPr>
+                        <a:t>Ada.Text_IO</a:t>
+                      </a:r>
+                      <a:r>
+                        <a:rPr lang="en-GB" sz="1100" b="1" baseline="0" dirty="0" smtClean="0">
+                          <a:solidFill>
+                            <a:schemeClr val="tx1"/>
+                          </a:solidFill>
+                          <a:latin typeface="Courier New" pitchFamily="49" charset="0"/>
+                        </a:rPr>
+                        <a:t>; use </a:t>
+                      </a:r>
+                      <a:r>
+                        <a:rPr lang="en-GB" sz="1100" b="0" baseline="0" dirty="0" err="1" smtClean="0">
+                          <a:solidFill>
+                            <a:schemeClr val="tx1"/>
+                          </a:solidFill>
+                          <a:latin typeface="Courier New" pitchFamily="49" charset="0"/>
+                        </a:rPr>
+                        <a:t>Ada.Text_IO</a:t>
+                      </a:r>
+                      <a:r>
+                        <a:rPr lang="en-GB" sz="1100" b="1" baseline="0" dirty="0" smtClean="0">
+                          <a:solidFill>
+                            <a:schemeClr val="tx1"/>
+                          </a:solidFill>
+                          <a:latin typeface="Courier New" pitchFamily="49" charset="0"/>
+                        </a:rPr>
+                        <a:t>;</a:t>
+                      </a:r>
+                    </a:p>
+                    <a:p>
+                      <a:pPr marL="0" marR="0" indent="0" algn="l" defTabSz="914400" rtl="0" eaLnBrk="1" fontAlgn="auto" latinLnBrk="0" hangingPunct="1">
+                        <a:lnSpc>
+                          <a:spcPct val="100000"/>
+                        </a:lnSpc>
+                        <a:spcBef>
+                          <a:spcPts val="0"/>
+                        </a:spcBef>
+                        <a:spcAft>
+                          <a:spcPts val="0"/>
+                        </a:spcAft>
+                        <a:buClrTx/>
+                        <a:buSzTx/>
+                        <a:buFontTx/>
+                        <a:buNone/>
+                        <a:tabLst/>
+                        <a:defRPr/>
+                      </a:pPr>
                       <a:endParaRPr lang="en-GB" sz="1100" b="1" baseline="0" dirty="0" smtClean="0">
                         <a:solidFill>
                           <a:schemeClr val="tx1"/>
@@ -44758,43 +44799,25 @@
                           </a:solidFill>
                           <a:latin typeface="Courier New" pitchFamily="49" charset="0"/>
                         </a:rPr>
-                        <a:t>with </a:t>
-                      </a:r>
-                      <a:r>
-                        <a:rPr lang="en-GB" sz="1100" b="0" baseline="0" dirty="0" err="1" smtClean="0">
-                          <a:solidFill>
-                            <a:schemeClr val="tx1"/>
-                          </a:solidFill>
-                          <a:latin typeface="Courier New" pitchFamily="49" charset="0"/>
-                        </a:rPr>
-                        <a:t>Ada.Text_IO</a:t>
-                      </a:r>
-                      <a:r>
-                        <a:rPr lang="en-GB" sz="1100" b="1" baseline="0" dirty="0" smtClean="0">
-                          <a:solidFill>
-                            <a:schemeClr val="tx1"/>
-                          </a:solidFill>
-                          <a:latin typeface="Courier New" pitchFamily="49" charset="0"/>
-                        </a:rPr>
-                        <a:t>; use </a:t>
-                      </a:r>
-                      <a:r>
-                        <a:rPr lang="en-GB" sz="1100" b="0" baseline="0" dirty="0" err="1" smtClean="0">
-                          <a:solidFill>
-                            <a:schemeClr val="tx1"/>
-                          </a:solidFill>
-                          <a:latin typeface="Courier New" pitchFamily="49" charset="0"/>
-                        </a:rPr>
-                        <a:t>Ada.Text_IO</a:t>
-                      </a:r>
-                      <a:r>
-                        <a:rPr lang="en-GB" sz="1100" b="1" baseline="0" dirty="0" smtClean="0">
-                          <a:solidFill>
-                            <a:schemeClr val="tx1"/>
-                          </a:solidFill>
-                          <a:latin typeface="Courier New" pitchFamily="49" charset="0"/>
-                        </a:rPr>
-                        <a:t>;</a:t>
+                        <a:t>procedure </a:t>
+                      </a:r>
+                      <a:r>
+                        <a:rPr lang="en-GB" sz="1100" b="0" baseline="0" dirty="0" smtClean="0">
+                          <a:solidFill>
+                            <a:schemeClr val="tx1"/>
+                          </a:solidFill>
+                          <a:latin typeface="Courier New" pitchFamily="49" charset="0"/>
+                        </a:rPr>
+                        <a:t>Main</a:t>
+                      </a:r>
+                      <a:r>
+                        <a:rPr lang="en-GB" sz="1100" b="1" baseline="0" dirty="0" smtClean="0">
+                          <a:solidFill>
+                            <a:schemeClr val="tx1"/>
+                          </a:solidFill>
+                          <a:latin typeface="Courier New" pitchFamily="49" charset="0"/>
+                        </a:rPr>
+                        <a:t> is</a:t>
                       </a:r>
                     </a:p>
                     <a:p>
@@ -44847,7 +44870,145 @@
                           </a:solidFill>
                           <a:latin typeface="Courier New" pitchFamily="49" charset="0"/>
                         </a:rPr>
-                        <a:t>procedure </a:t>
+                        <a:t>   function </a:t>
+                      </a:r>
+                      <a:r>
+                        <a:rPr lang="en-GB" sz="1100" b="0" baseline="0" dirty="0" err="1" smtClean="0">
+                          <a:solidFill>
+                            <a:schemeClr val="tx1"/>
+                          </a:solidFill>
+                          <a:latin typeface="Courier New" pitchFamily="49" charset="0"/>
+                        </a:rPr>
+                        <a:t>Get_String</a:t>
+                      </a:r>
+                      <a:r>
+                        <a:rPr lang="en-GB" sz="1100" b="1" baseline="0" dirty="0" smtClean="0">
+                          <a:solidFill>
+                            <a:schemeClr val="tx1"/>
+                          </a:solidFill>
+                          <a:latin typeface="Courier New" pitchFamily="49" charset="0"/>
+                        </a:rPr>
+                        <a:t> return </a:t>
+                      </a:r>
+                      <a:r>
+                        <a:rPr lang="en-GB" sz="1100" b="0" baseline="0" dirty="0" err="1" smtClean="0">
+                          <a:solidFill>
+                            <a:schemeClr val="tx1"/>
+                          </a:solidFill>
+                          <a:latin typeface="Courier New" pitchFamily="49" charset="0"/>
+                        </a:rPr>
+                        <a:t>char_array_access</a:t>
+                      </a:r>
+                      <a:r>
+                        <a:rPr lang="en-GB" sz="1100" b="1" baseline="0" dirty="0" smtClean="0">
+                          <a:solidFill>
+                            <a:schemeClr val="tx1"/>
+                          </a:solidFill>
+                          <a:latin typeface="Courier New" pitchFamily="49" charset="0"/>
+                        </a:rPr>
+                        <a:t> with</a:t>
+                      </a:r>
+                    </a:p>
+                    <a:p>
+                      <a:pPr marL="0" marR="0" indent="0" algn="l" defTabSz="914400" rtl="0" eaLnBrk="1" fontAlgn="auto" latinLnBrk="0" hangingPunct="1">
+                        <a:lnSpc>
+                          <a:spcPct val="100000"/>
+                        </a:lnSpc>
+                        <a:spcBef>
+                          <a:spcPts val="0"/>
+                        </a:spcBef>
+                        <a:spcAft>
+                          <a:spcPts val="0"/>
+                        </a:spcAft>
+                        <a:buClrTx/>
+                        <a:buSzTx/>
+                        <a:buFontTx/>
+                        <a:buNone/>
+                        <a:tabLst/>
+                        <a:defRPr/>
+                      </a:pPr>
+                      <a:r>
+                        <a:rPr lang="en-GB" sz="1100" b="1" baseline="0" dirty="0" smtClean="0">
+                          <a:solidFill>
+                            <a:schemeClr val="tx1"/>
+                          </a:solidFill>
+                          <a:latin typeface="Courier New" pitchFamily="49" charset="0"/>
+                        </a:rPr>
+                        <a:t>      Convention    =&gt; C,</a:t>
+                      </a:r>
+                    </a:p>
+                    <a:p>
+                      <a:pPr marL="0" marR="0" indent="0" algn="l" defTabSz="914400" rtl="0" eaLnBrk="1" fontAlgn="auto" latinLnBrk="0" hangingPunct="1">
+                        <a:lnSpc>
+                          <a:spcPct val="100000"/>
+                        </a:lnSpc>
+                        <a:spcBef>
+                          <a:spcPts val="0"/>
+                        </a:spcBef>
+                        <a:spcAft>
+                          <a:spcPts val="0"/>
+                        </a:spcAft>
+                        <a:buClrTx/>
+                        <a:buSzTx/>
+                        <a:buFontTx/>
+                        <a:buNone/>
+                        <a:tabLst/>
+                        <a:defRPr/>
+                      </a:pPr>
+                      <a:r>
+                        <a:rPr lang="en-GB" sz="1100" b="1" baseline="0" dirty="0" smtClean="0">
+                          <a:solidFill>
+                            <a:schemeClr val="tx1"/>
+                          </a:solidFill>
+                          <a:latin typeface="Courier New" pitchFamily="49" charset="0"/>
+                        </a:rPr>
+                        <a:t>      Import        =&gt; True,</a:t>
+                      </a:r>
+                    </a:p>
+                    <a:p>
+                      <a:pPr marL="0" marR="0" indent="0" algn="l" defTabSz="914400" rtl="0" eaLnBrk="1" fontAlgn="auto" latinLnBrk="0" hangingPunct="1">
+                        <a:lnSpc>
+                          <a:spcPct val="100000"/>
+                        </a:lnSpc>
+                        <a:spcBef>
+                          <a:spcPts val="0"/>
+                        </a:spcBef>
+                        <a:spcAft>
+                          <a:spcPts val="0"/>
+                        </a:spcAft>
+                        <a:buClrTx/>
+                        <a:buSzTx/>
+                        <a:buFontTx/>
+                        <a:buNone/>
+                        <a:tabLst/>
+                        <a:defRPr/>
+                      </a:pPr>
+                      <a:r>
+                        <a:rPr lang="en-GB" sz="1100" b="1" baseline="0" dirty="0" smtClean="0">
+                          <a:solidFill>
+                            <a:schemeClr val="tx1"/>
+                          </a:solidFill>
+                          <a:latin typeface="Courier New" pitchFamily="49" charset="0"/>
+                        </a:rPr>
+                        <a:t>      </a:t>
+                      </a:r>
+                      <a:r>
+                        <a:rPr lang="en-GB" sz="1100" b="1" baseline="0" dirty="0" err="1" smtClean="0">
+                          <a:solidFill>
+                            <a:schemeClr val="tx1"/>
+                          </a:solidFill>
+                          <a:latin typeface="Courier New" pitchFamily="49" charset="0"/>
+                        </a:rPr>
+                        <a:t>External_Name</a:t>
+                      </a:r>
+                      <a:r>
+                        <a:rPr lang="en-GB" sz="1100" b="1" baseline="0" dirty="0" smtClean="0">
+                          <a:solidFill>
+                            <a:schemeClr val="tx1"/>
+                          </a:solidFill>
+                          <a:latin typeface="Courier New" pitchFamily="49" charset="0"/>
+                        </a:rPr>
+                        <a:t> =&gt; </a:t>
                       </a:r>
                       <a:r>
                         <a:rPr lang="en-GB" sz="1100" b="0" baseline="0" dirty="0" smtClean="0">
@@ -44856,16 +45017,34 @@
                           </a:solidFill>
                           <a:latin typeface="Courier New" pitchFamily="49" charset="0"/>
                         </a:rPr>
-                        <a:t>Main</a:t>
-                      </a:r>
-                      <a:r>
-                        <a:rPr lang="en-GB" sz="1100" b="1" baseline="0" dirty="0" smtClean="0">
-                          <a:solidFill>
-                            <a:schemeClr val="tx1"/>
-                          </a:solidFill>
-                          <a:latin typeface="Courier New" pitchFamily="49" charset="0"/>
-                        </a:rPr>
-                        <a:t> is</a:t>
+                        <a:t>"</a:t>
+                      </a:r>
+                      <a:r>
+                        <a:rPr lang="en-GB" sz="1100" b="0" baseline="0" dirty="0" err="1" smtClean="0">
+                          <a:solidFill>
+                            <a:schemeClr val="tx1"/>
+                          </a:solidFill>
+                          <a:latin typeface="Courier New" pitchFamily="49" charset="0"/>
+                        </a:rPr>
+                        <a:t>getString</a:t>
+                      </a:r>
+                      <a:r>
+                        <a:rPr lang="en-GB" sz="1100" b="0" baseline="0" dirty="0" smtClean="0">
+                          <a:solidFill>
+                            <a:schemeClr val="tx1"/>
+                          </a:solidFill>
+                          <a:latin typeface="Courier New" pitchFamily="49" charset="0"/>
+                        </a:rPr>
+                        <a:t>"</a:t>
+                      </a:r>
+                      <a:r>
+                        <a:rPr lang="en-GB" sz="1100" b="1" baseline="0" dirty="0" smtClean="0">
+                          <a:solidFill>
+                            <a:schemeClr val="tx1"/>
+                          </a:solidFill>
+                          <a:latin typeface="Courier New" pitchFamily="49" charset="0"/>
+                        </a:rPr>
+                        <a:t>;</a:t>
                       </a:r>
                     </a:p>
                     <a:p>
@@ -44918,7 +45097,35 @@
                           </a:solidFill>
                           <a:latin typeface="Courier New" pitchFamily="49" charset="0"/>
                         </a:rPr>
-                        <a:t>   function </a:t>
+                        <a:t>begin</a:t>
+                      </a:r>
+                    </a:p>
+                    <a:p>
+                      <a:pPr marL="0" marR="0" indent="0" algn="l" defTabSz="914400" rtl="0" eaLnBrk="1" fontAlgn="auto" latinLnBrk="0" hangingPunct="1">
+                        <a:lnSpc>
+                          <a:spcPct val="100000"/>
+                        </a:lnSpc>
+                        <a:spcBef>
+                          <a:spcPts val="0"/>
+                        </a:spcBef>
+                        <a:spcAft>
+                          <a:spcPts val="0"/>
+                        </a:spcAft>
+                        <a:buClrTx/>
+                        <a:buSzTx/>
+                        <a:buFontTx/>
+                        <a:buNone/>
+                        <a:tabLst/>
+                        <a:defRPr/>
+                      </a:pPr>
+                      <a:r>
+                        <a:rPr lang="en-GB" sz="1100" b="1" baseline="0" dirty="0" smtClean="0">
+                          <a:solidFill>
+                            <a:schemeClr val="tx1"/>
+                          </a:solidFill>
+                          <a:latin typeface="Courier New" pitchFamily="49" charset="0"/>
+                        </a:rPr>
+                        <a:t>   </a:t>
                       </a:r>
                       <a:r>
                         <a:rPr lang="en-GB" sz="1100" b="0" baseline="0" dirty="0" err="1" smtClean="0">
@@ -44927,6 +45134,60 @@
                           </a:solidFill>
                           <a:latin typeface="Courier New" pitchFamily="49" charset="0"/>
                         </a:rPr>
+                        <a:t>Put_Line</a:t>
+                      </a:r>
+                      <a:r>
+                        <a:rPr lang="en-GB" sz="1100" b="1" baseline="0" dirty="0" smtClean="0">
+                          <a:solidFill>
+                            <a:schemeClr val="tx1"/>
+                          </a:solidFill>
+                          <a:latin typeface="Courier New" pitchFamily="49" charset="0"/>
+                        </a:rPr>
+                        <a:t>(</a:t>
+                      </a:r>
+                      <a:r>
+                        <a:rPr lang="en-GB" sz="1100" b="0" baseline="0" dirty="0" err="1" smtClean="0">
+                          <a:solidFill>
+                            <a:schemeClr val="tx1"/>
+                          </a:solidFill>
+                          <a:latin typeface="Courier New" pitchFamily="49" charset="0"/>
+                        </a:rPr>
+                        <a:t>Interfaces.C.Strings.Value</a:t>
+                      </a:r>
+                      <a:r>
+                        <a:rPr lang="en-GB" sz="1100" b="1" baseline="0" dirty="0" smtClean="0">
+                          <a:solidFill>
+                            <a:schemeClr val="tx1"/>
+                          </a:solidFill>
+                          <a:latin typeface="Courier New" pitchFamily="49" charset="0"/>
+                        </a:rPr>
+                        <a:t>(</a:t>
+                      </a:r>
+                      <a:r>
+                        <a:rPr lang="en-GB" sz="1100" b="0" baseline="0" dirty="0" err="1" smtClean="0">
+                          <a:solidFill>
+                            <a:schemeClr val="tx1"/>
+                          </a:solidFill>
+                          <a:latin typeface="Courier New" pitchFamily="49" charset="0"/>
+                        </a:rPr>
+                        <a:t>Interfaces.C.Strings.To_Chars_Ptr</a:t>
+                      </a:r>
+                      <a:r>
+                        <a:rPr lang="en-GB" sz="1100" b="1" baseline="0" dirty="0" smtClean="0">
+                          <a:solidFill>
+                            <a:schemeClr val="tx1"/>
+                          </a:solidFill>
+                          <a:latin typeface="Courier New" pitchFamily="49" charset="0"/>
+                        </a:rPr>
+                        <a:t>(</a:t>
+                      </a:r>
+                      <a:r>
+                        <a:rPr lang="en-GB" sz="1100" b="0" baseline="0" dirty="0" err="1" smtClean="0">
+                          <a:solidFill>
+                            <a:schemeClr val="tx1"/>
+                          </a:solidFill>
+                          <a:latin typeface="Courier New" pitchFamily="49" charset="0"/>
+                        </a:rPr>
                         <a:t>Get_String</a:t>
                       </a:r>
                       <a:r>
@@ -44936,323 +45197,8 @@
                           </a:solidFill>
                           <a:latin typeface="Courier New" pitchFamily="49" charset="0"/>
                         </a:rPr>
-                        <a:t> return </a:t>
-                      </a:r>
-                      <a:r>
-                        <a:rPr lang="en-GB" sz="1100" b="0" baseline="0" dirty="0" err="1" smtClean="0">
-                          <a:solidFill>
-                            <a:schemeClr val="tx1"/>
-                          </a:solidFill>
-                          <a:latin typeface="Courier New" pitchFamily="49" charset="0"/>
-                        </a:rPr>
-                        <a:t>char_array_access</a:t>
-                      </a:r>
-                      <a:r>
-                        <a:rPr lang="en-GB" sz="1100" b="1" baseline="0" dirty="0" smtClean="0">
-                          <a:solidFill>
-                            <a:schemeClr val="tx1"/>
-                          </a:solidFill>
-                          <a:latin typeface="Courier New" pitchFamily="49" charset="0"/>
-                        </a:rPr>
-                        <a:t> with</a:t>
-                      </a:r>
-                    </a:p>
-                    <a:p>
-                      <a:pPr marL="0" marR="0" indent="0" algn="l" defTabSz="914400" rtl="0" eaLnBrk="1" fontAlgn="auto" latinLnBrk="0" hangingPunct="1">
-                        <a:lnSpc>
-                          <a:spcPct val="100000"/>
-                        </a:lnSpc>
-                        <a:spcBef>
-                          <a:spcPts val="0"/>
-                        </a:spcBef>
-                        <a:spcAft>
-                          <a:spcPts val="0"/>
-                        </a:spcAft>
-                        <a:buClrTx/>
-                        <a:buSzTx/>
-                        <a:buFontTx/>
-                        <a:buNone/>
-                        <a:tabLst/>
-                        <a:defRPr/>
-                      </a:pPr>
-                      <a:r>
-                        <a:rPr lang="en-GB" sz="1100" b="1" baseline="0" dirty="0" smtClean="0">
-                          <a:solidFill>
-                            <a:schemeClr val="tx1"/>
-                          </a:solidFill>
-                          <a:latin typeface="Courier New" pitchFamily="49" charset="0"/>
-                        </a:rPr>
-                        <a:t>      Convention    =&gt; C,</a:t>
-                      </a:r>
-                    </a:p>
-                    <a:p>
-                      <a:pPr marL="0" marR="0" indent="0" algn="l" defTabSz="914400" rtl="0" eaLnBrk="1" fontAlgn="auto" latinLnBrk="0" hangingPunct="1">
-                        <a:lnSpc>
-                          <a:spcPct val="100000"/>
-                        </a:lnSpc>
-                        <a:spcBef>
-                          <a:spcPts val="0"/>
-                        </a:spcBef>
-                        <a:spcAft>
-                          <a:spcPts val="0"/>
-                        </a:spcAft>
-                        <a:buClrTx/>
-                        <a:buSzTx/>
-                        <a:buFontTx/>
-                        <a:buNone/>
-                        <a:tabLst/>
-                        <a:defRPr/>
-                      </a:pPr>
-                      <a:r>
-                        <a:rPr lang="en-GB" sz="1100" b="1" baseline="0" dirty="0" smtClean="0">
-                          <a:solidFill>
-                            <a:schemeClr val="tx1"/>
-                          </a:solidFill>
-                          <a:latin typeface="Courier New" pitchFamily="49" charset="0"/>
-                        </a:rPr>
-                        <a:t>      Import        =&gt; True,</a:t>
-                      </a:r>
-                    </a:p>
-                    <a:p>
-                      <a:pPr marL="0" marR="0" indent="0" algn="l" defTabSz="914400" rtl="0" eaLnBrk="1" fontAlgn="auto" latinLnBrk="0" hangingPunct="1">
-                        <a:lnSpc>
-                          <a:spcPct val="100000"/>
-                        </a:lnSpc>
-                        <a:spcBef>
-                          <a:spcPts val="0"/>
-                        </a:spcBef>
-                        <a:spcAft>
-                          <a:spcPts val="0"/>
-                        </a:spcAft>
-                        <a:buClrTx/>
-                        <a:buSzTx/>
-                        <a:buFontTx/>
-                        <a:buNone/>
-                        <a:tabLst/>
-                        <a:defRPr/>
-                      </a:pPr>
-                      <a:r>
-                        <a:rPr lang="en-GB" sz="1100" b="1" baseline="0" dirty="0" smtClean="0">
-                          <a:solidFill>
-                            <a:schemeClr val="tx1"/>
-                          </a:solidFill>
-                          <a:latin typeface="Courier New" pitchFamily="49" charset="0"/>
-                        </a:rPr>
-                        <a:t>      </a:t>
-                      </a:r>
-                      <a:r>
-                        <a:rPr lang="en-GB" sz="1100" b="1" baseline="0" dirty="0" err="1" smtClean="0">
-                          <a:solidFill>
-                            <a:schemeClr val="tx1"/>
-                          </a:solidFill>
-                          <a:latin typeface="Courier New" pitchFamily="49" charset="0"/>
-                        </a:rPr>
-                        <a:t>External_Name</a:t>
-                      </a:r>
-                      <a:r>
-                        <a:rPr lang="en-GB" sz="1100" b="1" baseline="0" dirty="0" smtClean="0">
-                          <a:solidFill>
-                            <a:schemeClr val="tx1"/>
-                          </a:solidFill>
-                          <a:latin typeface="Courier New" pitchFamily="49" charset="0"/>
-                        </a:rPr>
-                        <a:t> =&gt; </a:t>
-                      </a:r>
-                      <a:r>
-                        <a:rPr lang="en-GB" sz="1100" b="0" baseline="0" dirty="0" smtClean="0">
-                          <a:solidFill>
-                            <a:schemeClr val="tx1"/>
-                          </a:solidFill>
-                          <a:latin typeface="Courier New" pitchFamily="49" charset="0"/>
-                        </a:rPr>
-                        <a:t>"</a:t>
-                      </a:r>
-                      <a:r>
-                        <a:rPr lang="en-GB" sz="1100" b="0" baseline="0" dirty="0" err="1" smtClean="0">
-                          <a:solidFill>
-                            <a:schemeClr val="tx1"/>
-                          </a:solidFill>
-                          <a:latin typeface="Courier New" pitchFamily="49" charset="0"/>
-                        </a:rPr>
-                        <a:t>getString</a:t>
-                      </a:r>
-                      <a:r>
-                        <a:rPr lang="en-GB" sz="1100" b="0" baseline="0" dirty="0" smtClean="0">
-                          <a:solidFill>
-                            <a:schemeClr val="tx1"/>
-                          </a:solidFill>
-                          <a:latin typeface="Courier New" pitchFamily="49" charset="0"/>
-                        </a:rPr>
-                        <a:t>"</a:t>
-                      </a:r>
-                      <a:r>
-                        <a:rPr lang="en-GB" sz="1100" b="1" baseline="0" dirty="0" smtClean="0">
-                          <a:solidFill>
-                            <a:schemeClr val="tx1"/>
-                          </a:solidFill>
-                          <a:latin typeface="Courier New" pitchFamily="49" charset="0"/>
-                        </a:rPr>
-                        <a:t>;</a:t>
-                      </a:r>
-                    </a:p>
-                    <a:p>
-                      <a:pPr marL="0" marR="0" indent="0" algn="l" defTabSz="914400" rtl="0" eaLnBrk="1" fontAlgn="auto" latinLnBrk="0" hangingPunct="1">
-                        <a:lnSpc>
-                          <a:spcPct val="100000"/>
-                        </a:lnSpc>
-                        <a:spcBef>
-                          <a:spcPts val="0"/>
-                        </a:spcBef>
-                        <a:spcAft>
-                          <a:spcPts val="0"/>
-                        </a:spcAft>
-                        <a:buClrTx/>
-                        <a:buSzTx/>
-                        <a:buFontTx/>
-                        <a:buNone/>
-                        <a:tabLst/>
-                        <a:defRPr/>
-                      </a:pPr>
-                      <a:endParaRPr lang="en-GB" sz="1100" b="1" baseline="0" dirty="0" smtClean="0">
-                        <a:solidFill>
-                          <a:schemeClr val="tx1"/>
-                        </a:solidFill>
-                        <a:latin typeface="Courier New" pitchFamily="49" charset="0"/>
-                      </a:endParaRPr>
-                    </a:p>
-                    <a:p>
-                      <a:pPr marL="0" marR="0" indent="0" algn="l" defTabSz="914400" rtl="0" eaLnBrk="1" fontAlgn="auto" latinLnBrk="0" hangingPunct="1">
-                        <a:lnSpc>
-                          <a:spcPct val="100000"/>
-                        </a:lnSpc>
-                        <a:spcBef>
-                          <a:spcPts val="0"/>
-                        </a:spcBef>
-                        <a:spcAft>
-                          <a:spcPts val="0"/>
-                        </a:spcAft>
-                        <a:buClrTx/>
-                        <a:buSzTx/>
-                        <a:buFontTx/>
-                        <a:buNone/>
-                        <a:tabLst/>
-                        <a:defRPr/>
-                      </a:pPr>
-                      <a:r>
-                        <a:rPr lang="en-GB" sz="1100" b="1" baseline="0" dirty="0" smtClean="0">
-                          <a:solidFill>
-                            <a:schemeClr val="tx1"/>
-                          </a:solidFill>
-                          <a:latin typeface="Courier New" pitchFamily="49" charset="0"/>
-                        </a:rPr>
-                        <a:t>begin</a:t>
-                      </a:r>
-                    </a:p>
-                    <a:p>
-                      <a:pPr marL="0" marR="0" indent="0" algn="l" defTabSz="914400" rtl="0" eaLnBrk="1" fontAlgn="auto" latinLnBrk="0" hangingPunct="1">
-                        <a:lnSpc>
-                          <a:spcPct val="100000"/>
-                        </a:lnSpc>
-                        <a:spcBef>
-                          <a:spcPts val="0"/>
-                        </a:spcBef>
-                        <a:spcAft>
-                          <a:spcPts val="0"/>
-                        </a:spcAft>
-                        <a:buClrTx/>
-                        <a:buSzTx/>
-                        <a:buFontTx/>
-                        <a:buNone/>
-                        <a:tabLst/>
-                        <a:defRPr/>
-                      </a:pPr>
-                      <a:r>
-                        <a:rPr lang="en-GB" sz="1100" b="1" baseline="0" dirty="0" smtClean="0">
-                          <a:solidFill>
-                            <a:schemeClr val="tx1"/>
-                          </a:solidFill>
-                          <a:latin typeface="Courier New" pitchFamily="49" charset="0"/>
-                        </a:rPr>
-                        <a:t>   </a:t>
-                      </a:r>
-                      <a:r>
-                        <a:rPr lang="en-GB" sz="1100" b="0" baseline="0" dirty="0" err="1" smtClean="0">
-                          <a:solidFill>
-                            <a:schemeClr val="tx1"/>
-                          </a:solidFill>
-                          <a:latin typeface="Courier New" pitchFamily="49" charset="0"/>
-                        </a:rPr>
-                        <a:t>Put_Line</a:t>
-                      </a:r>
-                      <a:r>
-                        <a:rPr lang="en-GB" sz="1100" b="1" baseline="0" dirty="0" smtClean="0">
-                          <a:solidFill>
-                            <a:schemeClr val="tx1"/>
-                          </a:solidFill>
-                          <a:latin typeface="Courier New" pitchFamily="49" charset="0"/>
-                        </a:rPr>
-                        <a:t>(</a:t>
-                      </a:r>
-                      <a:r>
-                        <a:rPr lang="en-GB" sz="1100" b="0" baseline="0" dirty="0" err="1" smtClean="0">
-                          <a:solidFill>
-                            <a:schemeClr val="tx1"/>
-                          </a:solidFill>
-                          <a:latin typeface="Courier New" pitchFamily="49" charset="0"/>
-                        </a:rPr>
-                        <a:t>Interfaces.C.Strings.Value</a:t>
-                      </a:r>
-                      <a:r>
-                        <a:rPr lang="en-GB" sz="1100" b="1" baseline="0" dirty="0" smtClean="0">
-                          <a:solidFill>
-                            <a:schemeClr val="tx1"/>
-                          </a:solidFill>
-                          <a:latin typeface="Courier New" pitchFamily="49" charset="0"/>
-                        </a:rPr>
-                        <a:t>(</a:t>
-                      </a:r>
-                      <a:r>
-                        <a:rPr lang="en-GB" sz="1100" b="0" baseline="0" dirty="0" err="1" smtClean="0">
-                          <a:solidFill>
-                            <a:schemeClr val="tx1"/>
-                          </a:solidFill>
-                          <a:latin typeface="Courier New" pitchFamily="49" charset="0"/>
-                        </a:rPr>
-                        <a:t>Interfaces.C.Strings.To_Chars_Ptr</a:t>
-                      </a:r>
-                      <a:r>
-                        <a:rPr lang="en-GB" sz="1100" b="1" baseline="0" dirty="0" smtClean="0">
-                          <a:solidFill>
-                            <a:schemeClr val="tx1"/>
-                          </a:solidFill>
-                          <a:latin typeface="Courier New" pitchFamily="49" charset="0"/>
-                        </a:rPr>
-                        <a:t>(</a:t>
-                      </a:r>
-                      <a:r>
-                        <a:rPr lang="en-GB" sz="1100" b="0" baseline="0" dirty="0" err="1" smtClean="0">
-                          <a:solidFill>
-                            <a:schemeClr val="tx1"/>
-                          </a:solidFill>
-                          <a:latin typeface="Courier New" pitchFamily="49" charset="0"/>
-                        </a:rPr>
-                        <a:t>Get_String</a:t>
-                      </a:r>
-                      <a:r>
-                        <a:rPr lang="en-GB" sz="1100" b="1" baseline="0" dirty="0" smtClean="0">
-                          <a:solidFill>
-                            <a:schemeClr val="tx1"/>
-                          </a:solidFill>
-                          <a:latin typeface="Courier New" pitchFamily="49" charset="0"/>
-                        </a:rPr>
                         <a:t>)));</a:t>
                       </a:r>
-                      <a:endParaRPr lang="en-GB" sz="1100" b="1" baseline="0" dirty="0" smtClean="0">
-                        <a:solidFill>
-                          <a:schemeClr val="tx1"/>
-                        </a:solidFill>
-                        <a:latin typeface="Courier New" pitchFamily="49" charset="0"/>
-                      </a:endParaRPr>
                     </a:p>
                     <a:p>
                       <a:pPr marL="0" marR="0" indent="0" algn="l" defTabSz="914400" rtl="0" eaLnBrk="1" fontAlgn="auto" latinLnBrk="0" hangingPunct="1">

</xml_diff>

<commit_message>
Updated "Importing C Strings" and "Processing C Header Files" slides.
</commit_message>
<xml_diff>
--- a/lectures/04_Mixed_Language_Programming_In_Ada/02_Ada_and_C/Slides/02_Ada_And_C.pptx
+++ b/lectures/04_Mixed_Language_Programming_In_Ada/02_Ada_and_C/Slides/02_Ada_And_C.pptx
@@ -233,7 +233,7 @@
           <a:p>
             <a:fld id="{6AEF8CB0-33D2-4F49-9A97-DB788DFC7082}" type="datetimeFigureOut">
               <a:rPr lang="en-GB" smtClean="0"/>
-              <a:t>05/08/2014</a:t>
+              <a:t>06/08/2014</a:t>
             </a:fld>
             <a:endParaRPr lang="en-GB"/>
           </a:p>
@@ -1433,96 +1433,130 @@
           <a:lstStyle/>
           <a:p>
             <a:r>
-              <a:rPr lang="en-GB" altLang="en-US" dirty="0" smtClean="0">
-                <a:ea typeface="ＭＳ Ｐゴシック" panose="020B0600070205080204" pitchFamily="34" charset="-128"/>
-              </a:rPr>
-              <a:t>We’ve now reached the end of the slides section of this lecture.  </a:t>
-            </a:r>
-          </a:p>
-          <a:p>
-            <a:endParaRPr lang="en-GB" altLang="en-US" dirty="0" smtClean="0">
-              <a:ea typeface="ＭＳ Ｐゴシック" panose="020B0600070205080204" pitchFamily="34" charset="-128"/>
-            </a:endParaRPr>
-          </a:p>
-          <a:p>
-            <a:r>
-              <a:rPr lang="en-GB" altLang="en-US" dirty="0" smtClean="0">
-                <a:ea typeface="ＭＳ Ｐゴシック" panose="020B0600070205080204" pitchFamily="34" charset="-128"/>
-              </a:rPr>
-              <a:t>You should now have enough knowledge of this</a:t>
+              <a:rPr lang="en-GB" dirty="0" smtClean="0"/>
+              <a:t>The GNAT tools contains a very useful feature for automatically generating Import pragmas for entities</a:t>
             </a:r>
             <a:r>
-              <a:rPr lang="en-GB" altLang="en-US" baseline="0" dirty="0" smtClean="0">
-                <a:ea typeface="ＭＳ Ｐゴシック" panose="020B0600070205080204" pitchFamily="34" charset="-128"/>
-              </a:rPr>
-              <a:t> subject </a:t>
+              <a:rPr lang="en-GB" baseline="0" dirty="0" smtClean="0"/>
+              <a:t> defined in C header files.</a:t>
+            </a:r>
+          </a:p>
+          <a:p>
+            <a:endParaRPr lang="en-GB" baseline="0" dirty="0" smtClean="0"/>
+          </a:p>
+          <a:p>
+            <a:r>
+              <a:rPr lang="en-GB" baseline="0" dirty="0" smtClean="0"/>
+              <a:t>The example header file here called </a:t>
             </a:r>
             <a:r>
-              <a:rPr lang="en-GB" altLang="en-US" dirty="0" smtClean="0">
-                <a:ea typeface="ＭＳ Ｐゴシック" panose="020B0600070205080204" pitchFamily="34" charset="-128"/>
-              </a:rPr>
-              <a:t>to complete a small quiz with questions designed to test your understanding.</a:t>
-            </a:r>
-          </a:p>
-          <a:p>
-            <a:endParaRPr lang="en-GB" altLang="en-US" dirty="0" smtClean="0">
-              <a:ea typeface="ＭＳ Ｐゴシック" panose="020B0600070205080204" pitchFamily="34" charset="-128"/>
-            </a:endParaRPr>
-          </a:p>
-          <a:p>
-            <a:r>
-              <a:rPr lang="en-GB" altLang="en-US" dirty="0" smtClean="0">
-                <a:ea typeface="ＭＳ Ｐゴシック" panose="020B0600070205080204" pitchFamily="34" charset="-128"/>
-              </a:rPr>
-              <a:t>Before you start</a:t>
+              <a:rPr lang="en-GB" baseline="0" dirty="0" err="1" smtClean="0"/>
+              <a:t>clib.h</a:t>
             </a:r>
             <a:r>
-              <a:rPr lang="en-GB" altLang="en-US" baseline="0" dirty="0" smtClean="0">
-                <a:ea typeface="ＭＳ Ｐゴシック" panose="020B0600070205080204" pitchFamily="34" charset="-128"/>
-              </a:rPr>
-              <a:t> the quiz I suggest you keep a reference open to Interfaces.C and its child packages.</a:t>
+              <a:rPr lang="en-GB" baseline="0" dirty="0" smtClean="0"/>
+              <a:t> provides 3 function prototypes with various return types and parameters.</a:t>
             </a:r>
-            <a:endParaRPr lang="en-GB" altLang="en-US" dirty="0" smtClean="0">
-              <a:ea typeface="ＭＳ Ｐゴシック" panose="020B0600070205080204" pitchFamily="34" charset="-128"/>
-            </a:endParaRPr>
-          </a:p>
-          <a:p>
-            <a:endParaRPr lang="en-GB" altLang="en-US" dirty="0" smtClean="0">
-              <a:ea typeface="ＭＳ Ｐゴシック" panose="020B0600070205080204" pitchFamily="34" charset="-128"/>
-            </a:endParaRPr>
+          </a:p>
+          <a:p>
+            <a:endParaRPr lang="en-GB" baseline="0" dirty="0" smtClean="0"/>
           </a:p>
           <a:p>
             <a:r>
-              <a:rPr lang="en-GB" altLang="en-US" dirty="0" smtClean="0">
-                <a:ea typeface="ＭＳ Ｐゴシック" panose="020B0600070205080204" pitchFamily="34" charset="-128"/>
-              </a:rPr>
-              <a:t>Each question is marked and you will have a chance to review your score at the end</a:t>
+              <a:rPr lang="en-GB" baseline="0" dirty="0" smtClean="0"/>
+              <a:t>It is possible to produce an Ada package specification for this C header file by passing a particular flag to the </a:t>
             </a:r>
             <a:r>
-              <a:rPr lang="en-GB" altLang="en-US" baseline="0" dirty="0" smtClean="0">
-                <a:ea typeface="ＭＳ Ｐゴシック" panose="020B0600070205080204" pitchFamily="34" charset="-128"/>
-              </a:rPr>
-              <a:t> of the quiz</a:t>
+              <a:rPr lang="en-GB" baseline="0" dirty="0" err="1" smtClean="0"/>
+              <a:t>gcc</a:t>
             </a:r>
             <a:r>
-              <a:rPr lang="en-GB" altLang="en-US" dirty="0" smtClean="0">
-                <a:ea typeface="ＭＳ Ｐゴシック" panose="020B0600070205080204" pitchFamily="34" charset="-128"/>
-              </a:rPr>
-              <a:t>.</a:t>
+              <a:rPr lang="en-GB" baseline="0" dirty="0" smtClean="0"/>
+              <a:t> compiler.</a:t>
             </a:r>
           </a:p>
           <a:p>
-            <a:endParaRPr lang="en-GB" altLang="en-US" dirty="0" smtClean="0">
-              <a:ea typeface="ＭＳ Ｐゴシック" panose="020B0600070205080204" pitchFamily="34" charset="-128"/>
-            </a:endParaRPr>
+            <a:endParaRPr lang="en-GB" baseline="0" dirty="0" smtClean="0"/>
           </a:p>
           <a:p>
             <a:r>
-              <a:rPr lang="en-GB" altLang="en-US" dirty="0" smtClean="0">
-                <a:ea typeface="ＭＳ Ｐゴシック" panose="020B0600070205080204" pitchFamily="34" charset="-128"/>
-              </a:rPr>
-              <a:t>Good luck !</a:t>
+              <a:rPr lang="en-GB" dirty="0" smtClean="0"/>
+              <a:t>The –</a:t>
             </a:r>
+            <a:r>
+              <a:rPr lang="en-GB" dirty="0" err="1" smtClean="0"/>
+              <a:t>fdump</a:t>
+            </a:r>
+            <a:r>
+              <a:rPr lang="en-GB" dirty="0" smtClean="0"/>
+              <a:t>-</a:t>
+            </a:r>
+            <a:r>
+              <a:rPr lang="en-GB" dirty="0" err="1" smtClean="0"/>
+              <a:t>ada</a:t>
+            </a:r>
+            <a:r>
+              <a:rPr lang="en-GB" dirty="0" smtClean="0"/>
+              <a:t>-spec flag</a:t>
+            </a:r>
+            <a:r>
+              <a:rPr lang="en-GB" baseline="0" dirty="0" smtClean="0"/>
+              <a:t> is passed to </a:t>
+            </a:r>
+            <a:r>
+              <a:rPr lang="en-GB" baseline="0" dirty="0" err="1" smtClean="0"/>
+              <a:t>gcc</a:t>
+            </a:r>
+            <a:r>
+              <a:rPr lang="en-GB" baseline="0" dirty="0" smtClean="0"/>
+              <a:t> along with the name of the C header file.  The –C flag is used to ensure comments from the C header file are copied into the generated Ada package specification.</a:t>
+            </a:r>
+          </a:p>
+          <a:p>
+            <a:endParaRPr lang="en-GB" baseline="0" dirty="0" smtClean="0"/>
+          </a:p>
+          <a:p>
+            <a:r>
+              <a:rPr lang="en-GB" baseline="0" dirty="0" smtClean="0"/>
+              <a:t>The resulting Ada package specification for the example C header file is shown on this slide.</a:t>
+            </a:r>
+          </a:p>
+          <a:p>
+            <a:endParaRPr lang="en-GB" baseline="0" dirty="0" smtClean="0"/>
+          </a:p>
+          <a:p>
+            <a:r>
+              <a:rPr lang="en-GB" baseline="0" dirty="0" smtClean="0"/>
+              <a:t>Each function has been imported as an Ada entity and appropriate data types have been used for return values and parameters.</a:t>
+            </a:r>
+          </a:p>
+          <a:p>
+            <a:endParaRPr lang="en-GB" baseline="0" dirty="0" smtClean="0"/>
+          </a:p>
+          <a:p>
+            <a:r>
+              <a:rPr lang="en-GB" baseline="0" dirty="0" smtClean="0"/>
+              <a:t>Not the use of Interfaces.C.Strings for the character pointer return value from function3.</a:t>
+            </a:r>
+          </a:p>
+          <a:p>
+            <a:endParaRPr lang="en-GB" baseline="0" dirty="0" smtClean="0"/>
+          </a:p>
+          <a:p>
+            <a:r>
+              <a:rPr lang="en-GB" baseline="0" dirty="0" smtClean="0"/>
+              <a:t>At time of writing Ada 2005 pragmas are generated but these could be manually converted to Ada 2012 aspects.</a:t>
+            </a:r>
+          </a:p>
+          <a:p>
+            <a:endParaRPr lang="en-GB" baseline="0" dirty="0" smtClean="0"/>
+          </a:p>
+          <a:p>
+            <a:r>
+              <a:rPr lang="en-GB" baseline="0" dirty="0" smtClean="0"/>
+              <a:t>Perhaps in the future support for Ada 2012 aspects will be added.</a:t>
+            </a:r>
+            <a:endParaRPr lang="en-GB" dirty="0"/>
           </a:p>
         </p:txBody>
       </p:sp>
@@ -1543,7 +1577,7 @@
           <a:p>
             <a:fld id="{CA0C9329-88FA-4F10-ACFF-58B750973BE9}" type="slidenum">
               <a:rPr lang="en-GB" smtClean="0"/>
-              <a:t>15</a:t>
+              <a:t>14</a:t>
             </a:fld>
             <a:endParaRPr lang="en-GB"/>
           </a:p>
@@ -1552,7 +1586,7 @@
     </p:spTree>
     <p:extLst>
       <p:ext uri="{BB962C8B-B14F-4D97-AF65-F5344CB8AC3E}">
-        <p14:creationId xmlns:p14="http://schemas.microsoft.com/office/powerpoint/2010/main" val="1859432055"/>
+        <p14:creationId xmlns:p14="http://schemas.microsoft.com/office/powerpoint/2010/main" val="2019101631"/>
       </p:ext>
     </p:extLst>
   </p:cSld>
@@ -1607,85 +1641,96 @@
           <a:lstStyle/>
           <a:p>
             <a:r>
-              <a:rPr lang="en-GB" dirty="0" smtClean="0"/>
-              <a:t>Question 1 kicks off with an example of importing a C subprogram into an Ada main program.</a:t>
+              <a:rPr lang="en-GB" altLang="en-US" dirty="0" smtClean="0">
+                <a:ea typeface="ＭＳ Ｐゴシック" panose="020B0600070205080204" pitchFamily="34" charset="-128"/>
+              </a:rPr>
+              <a:t>We’ve now reached the end of the slides section of this lecture.  </a:t>
             </a:r>
           </a:p>
           <a:p>
-            <a:endParaRPr lang="en-GB" dirty="0" smtClean="0"/>
+            <a:endParaRPr lang="en-GB" altLang="en-US" dirty="0" smtClean="0">
+              <a:ea typeface="ＭＳ Ｐゴシック" panose="020B0600070205080204" pitchFamily="34" charset="-128"/>
+            </a:endParaRPr>
           </a:p>
           <a:p>
             <a:r>
-              <a:rPr lang="en-GB" dirty="0" smtClean="0"/>
-              <a:t>The Ada entity </a:t>
+              <a:rPr lang="en-GB" altLang="en-US" dirty="0" smtClean="0">
+                <a:ea typeface="ＭＳ Ｐゴシック" panose="020B0600070205080204" pitchFamily="34" charset="-128"/>
+              </a:rPr>
+              <a:t>You should now have enough knowledge of this</a:t>
             </a:r>
             <a:r>
-              <a:rPr lang="en-GB" dirty="0" err="1" smtClean="0"/>
-              <a:t>Get_Length</a:t>
+              <a:rPr lang="en-GB" altLang="en-US" baseline="0" dirty="0" smtClean="0">
+                <a:ea typeface="ＭＳ Ｐゴシック" panose="020B0600070205080204" pitchFamily="34" charset="-128"/>
+              </a:rPr>
+              <a:t> subject </a:t>
             </a:r>
             <a:r>
-              <a:rPr lang="en-GB" dirty="0" smtClean="0"/>
-              <a:t> is a function represented</a:t>
+              <a:rPr lang="en-GB" altLang="en-US" dirty="0" smtClean="0">
+                <a:ea typeface="ＭＳ Ｐゴシック" panose="020B0600070205080204" pitchFamily="34" charset="-128"/>
+              </a:rPr>
+              <a:t>to complete a small quiz with questions designed to test your understanding.</a:t>
+            </a:r>
+          </a:p>
+          <a:p>
+            <a:endParaRPr lang="en-GB" altLang="en-US" dirty="0" smtClean="0">
+              <a:ea typeface="ＭＳ Ｐゴシック" panose="020B0600070205080204" pitchFamily="34" charset="-128"/>
+            </a:endParaRPr>
+          </a:p>
+          <a:p>
+            <a:r>
+              <a:rPr lang="en-GB" altLang="en-US" dirty="0" smtClean="0">
+                <a:ea typeface="ＭＳ Ｐゴシック" panose="020B0600070205080204" pitchFamily="34" charset="-128"/>
+              </a:rPr>
+              <a:t>Before you start</a:t>
             </a:r>
             <a:r>
-              <a:rPr lang="en-GB" baseline="0" dirty="0" smtClean="0"/>
-              <a:t> by Convention, Import and </a:t>
+              <a:rPr lang="en-GB" altLang="en-US" baseline="0" dirty="0" smtClean="0">
+                <a:ea typeface="ＭＳ Ｐゴシック" panose="020B0600070205080204" pitchFamily="34" charset="-128"/>
+              </a:rPr>
+              <a:t> the quiz I suggest you keep a reference open to Interfaces.C and its child packages.</a:t>
+            </a:r>
+            <a:endParaRPr lang="en-GB" altLang="en-US" dirty="0" smtClean="0">
+              <a:ea typeface="ＭＳ Ｐゴシック" panose="020B0600070205080204" pitchFamily="34" charset="-128"/>
+            </a:endParaRPr>
+          </a:p>
+          <a:p>
+            <a:endParaRPr lang="en-GB" altLang="en-US" dirty="0" smtClean="0">
+              <a:ea typeface="ＭＳ Ｐゴシック" panose="020B0600070205080204" pitchFamily="34" charset="-128"/>
+            </a:endParaRPr>
+          </a:p>
+          <a:p>
+            <a:r>
+              <a:rPr lang="en-GB" altLang="en-US" dirty="0" smtClean="0">
+                <a:ea typeface="ＭＳ Ｐゴシック" panose="020B0600070205080204" pitchFamily="34" charset="-128"/>
+              </a:rPr>
+              <a:t>Each question is marked and you will have a chance to review your score at the end</a:t>
             </a:r>
             <a:r>
-              <a:rPr lang="en-GB" baseline="0" dirty="0" err="1" smtClean="0"/>
-              <a:t>External_Name</a:t>
+              <a:rPr lang="en-GB" altLang="en-US" baseline="0" dirty="0" smtClean="0">
+                <a:ea typeface="ＭＳ Ｐゴシック" panose="020B0600070205080204" pitchFamily="34" charset="-128"/>
+              </a:rPr>
+              <a:t> of the quiz</a:t>
             </a:r>
             <a:r>
-              <a:rPr lang="en-GB" baseline="0" dirty="0" smtClean="0"/>
-              <a:t> aspects.</a:t>
-            </a:r>
-          </a:p>
-          <a:p>
-            <a:endParaRPr lang="en-GB" baseline="0" dirty="0" smtClean="0"/>
-          </a:p>
-          <a:p>
-            <a:r>
-              <a:rPr lang="en-GB" baseline="0" dirty="0" smtClean="0"/>
-              <a:t>The Ada main program body calls </a:t>
-            </a:r>
-            <a:r>
-              <a:rPr lang="en-GB" baseline="0" dirty="0" err="1" smtClean="0"/>
-              <a:t>Get_Length</a:t>
-            </a:r>
-            <a:r>
-              <a:rPr lang="en-GB" baseline="0" dirty="0" smtClean="0"/>
+              <a:rPr lang="en-GB" altLang="en-US" dirty="0" smtClean="0">
+                <a:ea typeface="ＭＳ Ｐゴシック" panose="020B0600070205080204" pitchFamily="34" charset="-128"/>
+              </a:rPr>
               <a:t>.</a:t>
             </a:r>
           </a:p>
           <a:p>
-            <a:endParaRPr lang="en-GB" baseline="0" dirty="0" smtClean="0"/>
-          </a:p>
-          <a:p>
-            <a:pPr marL="0" marR="0" indent="0" algn="l" defTabSz="914400" rtl="0" eaLnBrk="1" fontAlgn="auto" latinLnBrk="0" hangingPunct="1">
-              <a:lnSpc>
-                <a:spcPct val="100000"/>
-              </a:lnSpc>
-              <a:spcBef>
-                <a:spcPts val="0"/>
-              </a:spcBef>
-              <a:spcAft>
-                <a:spcPts val="0"/>
-              </a:spcAft>
-              <a:buClrTx/>
-              <a:buSzTx/>
-              <a:buFontTx/>
-              <a:buNone/>
-              <a:tabLst/>
-              <a:defRPr/>
-            </a:pPr>
+            <a:endParaRPr lang="en-GB" altLang="en-US" dirty="0" smtClean="0">
+              <a:ea typeface="ＭＳ Ｐゴシック" panose="020B0600070205080204" pitchFamily="34" charset="-128"/>
+            </a:endParaRPr>
+          </a:p>
+          <a:p>
             <a:r>
-              <a:rPr lang="en-GB" baseline="0" dirty="0" smtClean="0"/>
-              <a:t>If you think this code is correct then please click the tick icon, otherwise click the line of code that is incorrect.</a:t>
+              <a:rPr lang="en-GB" altLang="en-US" dirty="0" smtClean="0">
+                <a:ea typeface="ＭＳ Ｐゴシック" panose="020B0600070205080204" pitchFamily="34" charset="-128"/>
+              </a:rPr>
+              <a:t>Good luck !</a:t>
             </a:r>
-            <a:endParaRPr lang="en-GB" dirty="0" smtClean="0"/>
-          </a:p>
-          <a:p>
-            <a:endParaRPr lang="en-GB" dirty="0"/>
           </a:p>
         </p:txBody>
       </p:sp>
@@ -1706,7 +1751,7 @@
           <a:p>
             <a:fld id="{CA0C9329-88FA-4F10-ACFF-58B750973BE9}" type="slidenum">
               <a:rPr lang="en-GB" smtClean="0"/>
-              <a:t>16</a:t>
+              <a:t>15</a:t>
             </a:fld>
             <a:endParaRPr lang="en-GB"/>
           </a:p>
@@ -1715,7 +1760,7 @@
     </p:spTree>
     <p:extLst>
       <p:ext uri="{BB962C8B-B14F-4D97-AF65-F5344CB8AC3E}">
-        <p14:creationId xmlns:p14="http://schemas.microsoft.com/office/powerpoint/2010/main" val="1088439644"/>
+        <p14:creationId xmlns:p14="http://schemas.microsoft.com/office/powerpoint/2010/main" val="1859432055"/>
       </p:ext>
     </p:extLst>
   </p:cSld>
@@ -1769,6 +1814,61 @@
           <a:bodyPr/>
           <a:lstStyle/>
           <a:p>
+            <a:r>
+              <a:rPr lang="en-GB" dirty="0" smtClean="0"/>
+              <a:t>Question 1 kicks off with an example of importing a C subprogram into an Ada main program.</a:t>
+            </a:r>
+          </a:p>
+          <a:p>
+            <a:endParaRPr lang="en-GB" dirty="0" smtClean="0"/>
+          </a:p>
+          <a:p>
+            <a:r>
+              <a:rPr lang="en-GB" dirty="0" smtClean="0"/>
+              <a:t>The Ada entity </a:t>
+            </a:r>
+            <a:r>
+              <a:rPr lang="en-GB" dirty="0" err="1" smtClean="0"/>
+              <a:t>Get_Length</a:t>
+            </a:r>
+            <a:r>
+              <a:rPr lang="en-GB" dirty="0" smtClean="0"/>
+              <a:t> is a function represented</a:t>
+            </a:r>
+            <a:r>
+              <a:rPr lang="en-GB" baseline="0" dirty="0" smtClean="0"/>
+              <a:t> by Convention, Import and </a:t>
+            </a:r>
+            <a:r>
+              <a:rPr lang="en-GB" baseline="0" dirty="0" err="1" smtClean="0"/>
+              <a:t>External_Name</a:t>
+            </a:r>
+            <a:r>
+              <a:rPr lang="en-GB" baseline="0" dirty="0" smtClean="0"/>
+              <a:t> aspects.</a:t>
+            </a:r>
+          </a:p>
+          <a:p>
+            <a:endParaRPr lang="en-GB" baseline="0" dirty="0" smtClean="0"/>
+          </a:p>
+          <a:p>
+            <a:r>
+              <a:rPr lang="en-GB" baseline="0" dirty="0" smtClean="0"/>
+              <a:t>The Ada main program body calls </a:t>
+            </a:r>
+            <a:r>
+              <a:rPr lang="en-GB" baseline="0" dirty="0" err="1" smtClean="0"/>
+              <a:t>Get_Length</a:t>
+            </a:r>
+            <a:r>
+              <a:rPr lang="en-GB" baseline="0" dirty="0" smtClean="0"/>
+              <a:t>.</a:t>
+            </a:r>
+          </a:p>
+          <a:p>
+            <a:endParaRPr lang="en-GB" baseline="0" dirty="0" smtClean="0"/>
+          </a:p>
+          <a:p>
             <a:pPr marL="0" marR="0" indent="0" algn="l" defTabSz="914400" rtl="0" eaLnBrk="1" fontAlgn="auto" latinLnBrk="0" hangingPunct="1">
               <a:lnSpc>
                 <a:spcPct val="100000"/>
@@ -1787,72 +1887,13 @@
               <a:defRPr/>
             </a:pPr>
             <a:r>
-              <a:rPr lang="en-GB" dirty="0" smtClean="0"/>
-              <a:t>The answer is NO – the code is incorrect</a:t>
-            </a:r>
-            <a:r>
               <a:rPr lang="en-GB" baseline="0" dirty="0" smtClean="0"/>
-              <a:t> and will fail to link into an executable.</a:t>
+              <a:t>If you think this code is correct then please click the tick icon, otherwise click the line of code that is incorrect.</a:t>
             </a:r>
             <a:endParaRPr lang="en-GB" dirty="0" smtClean="0"/>
           </a:p>
           <a:p>
-            <a:endParaRPr lang="en-GB" dirty="0" smtClean="0"/>
-          </a:p>
-          <a:p>
-            <a:r>
-              <a:rPr lang="en-GB" dirty="0" smtClean="0"/>
-              <a:t>The </a:t>
-            </a:r>
-            <a:r>
-              <a:rPr lang="en-GB" dirty="0" err="1" smtClean="0"/>
-              <a:t>External_Name</a:t>
-            </a:r>
-            <a:r>
-              <a:rPr lang="en-GB" dirty="0" smtClean="0"/>
-              <a:t> string must</a:t>
-            </a:r>
-            <a:r>
-              <a:rPr lang="en-GB" baseline="0" dirty="0" smtClean="0"/>
-              <a:t> match the foreign language entity name exactly, including the use of the correct case.</a:t>
-            </a:r>
-          </a:p>
-          <a:p>
-            <a:endParaRPr lang="en-GB" baseline="0" dirty="0" smtClean="0"/>
-          </a:p>
-          <a:p>
-            <a:r>
-              <a:rPr lang="en-GB" baseline="0" dirty="0" smtClean="0"/>
-              <a:t>Here we used the camel case string “</a:t>
-            </a:r>
-            <a:r>
-              <a:rPr lang="en-GB" baseline="0" dirty="0" err="1" smtClean="0"/>
-              <a:t>getLength</a:t>
-            </a:r>
-            <a:r>
-              <a:rPr lang="en-GB" baseline="0" dirty="0" smtClean="0"/>
-              <a:t>” in the declaration of the Ada entity for the imported C subprogram.</a:t>
-            </a:r>
-          </a:p>
-          <a:p>
-            <a:endParaRPr lang="en-GB" baseline="0" dirty="0" smtClean="0"/>
-          </a:p>
-          <a:p>
-            <a:r>
-              <a:rPr lang="en-GB" baseline="0" dirty="0" smtClean="0"/>
-              <a:t>However the C code used all lowercase for the declaration of the </a:t>
-            </a:r>
-            <a:r>
-              <a:rPr lang="en-GB" baseline="0" dirty="0" err="1" smtClean="0"/>
-              <a:t>getlength</a:t>
-            </a:r>
-            <a:r>
-              <a:rPr lang="en-GB" baseline="0" dirty="0" smtClean="0"/>
-              <a:t> function.</a:t>
-            </a:r>
-          </a:p>
-          <a:p>
-            <a:endParaRPr lang="en-GB" baseline="0" dirty="0" smtClean="0"/>
+            <a:endParaRPr lang="en-GB" dirty="0"/>
           </a:p>
         </p:txBody>
       </p:sp>
@@ -1873,7 +1914,7 @@
           <a:p>
             <a:fld id="{CA0C9329-88FA-4F10-ACFF-58B750973BE9}" type="slidenum">
               <a:rPr lang="en-GB" smtClean="0"/>
-              <a:t>17</a:t>
+              <a:t>16</a:t>
             </a:fld>
             <a:endParaRPr lang="en-GB"/>
           </a:p>
@@ -1882,7 +1923,7 @@
     </p:spTree>
     <p:extLst>
       <p:ext uri="{BB962C8B-B14F-4D97-AF65-F5344CB8AC3E}">
-        <p14:creationId xmlns:p14="http://schemas.microsoft.com/office/powerpoint/2010/main" val="1972531008"/>
+        <p14:creationId xmlns:p14="http://schemas.microsoft.com/office/powerpoint/2010/main" val="1088439644"/>
       </p:ext>
     </p:extLst>
   </p:cSld>
@@ -1936,37 +1977,6 @@
           <a:bodyPr/>
           <a:lstStyle/>
           <a:p>
-            <a:r>
-              <a:rPr lang="en-GB" dirty="0" smtClean="0"/>
-              <a:t>Question 2 covers exporting an Ada subprogram</a:t>
-            </a:r>
-            <a:r>
-              <a:rPr lang="en-GB" baseline="0" dirty="0" smtClean="0"/>
-              <a:t> for use by a C main program.</a:t>
-            </a:r>
-          </a:p>
-          <a:p>
-            <a:endParaRPr lang="en-GB" baseline="0" dirty="0" smtClean="0"/>
-          </a:p>
-          <a:p>
-            <a:r>
-              <a:rPr lang="en-GB" baseline="0" dirty="0" smtClean="0"/>
-              <a:t>The function </a:t>
-            </a:r>
-            <a:r>
-              <a:rPr lang="en-GB" baseline="0" dirty="0" err="1" smtClean="0"/>
-              <a:t>Get_Length</a:t>
-            </a:r>
-            <a:r>
-              <a:rPr lang="en-GB" baseline="0" dirty="0" smtClean="0"/>
-              <a:t> will return the value 60 when called.  Study the code carefully.</a:t>
-            </a:r>
-            <a:endParaRPr lang="en-GB" dirty="0" smtClean="0"/>
-          </a:p>
-          <a:p>
-            <a:endParaRPr lang="en-GB" baseline="0" dirty="0" smtClean="0"/>
-          </a:p>
-          <a:p>
             <a:pPr marL="0" marR="0" indent="0" algn="l" defTabSz="914400" rtl="0" eaLnBrk="1" fontAlgn="auto" latinLnBrk="0" hangingPunct="1">
               <a:lnSpc>
                 <a:spcPct val="100000"/>
@@ -1985,13 +1995,72 @@
               <a:defRPr/>
             </a:pPr>
             <a:r>
+              <a:rPr lang="en-GB" dirty="0" smtClean="0"/>
+              <a:t>The answer is NO – the code is incorrect</a:t>
+            </a:r>
+            <a:r>
               <a:rPr lang="en-GB" baseline="0" dirty="0" smtClean="0"/>
-              <a:t>If you think this code is correct then please click the tick icon, otherwise click the line of code that is incorrect.</a:t>
+              <a:t> and will fail to link into an executable.</a:t>
             </a:r>
             <a:endParaRPr lang="en-GB" dirty="0" smtClean="0"/>
           </a:p>
           <a:p>
-            <a:endParaRPr lang="en-GB" dirty="0"/>
+            <a:endParaRPr lang="en-GB" dirty="0" smtClean="0"/>
+          </a:p>
+          <a:p>
+            <a:r>
+              <a:rPr lang="en-GB" dirty="0" smtClean="0"/>
+              <a:t>The </a:t>
+            </a:r>
+            <a:r>
+              <a:rPr lang="en-GB" dirty="0" err="1" smtClean="0"/>
+              <a:t>External_Name</a:t>
+            </a:r>
+            <a:r>
+              <a:rPr lang="en-GB" dirty="0" smtClean="0"/>
+              <a:t> string must</a:t>
+            </a:r>
+            <a:r>
+              <a:rPr lang="en-GB" baseline="0" dirty="0" smtClean="0"/>
+              <a:t> match the foreign language entity name exactly, including the use of the correct case.</a:t>
+            </a:r>
+          </a:p>
+          <a:p>
+            <a:endParaRPr lang="en-GB" baseline="0" dirty="0" smtClean="0"/>
+          </a:p>
+          <a:p>
+            <a:r>
+              <a:rPr lang="en-GB" baseline="0" dirty="0" smtClean="0"/>
+              <a:t>Here we used the camel case string “</a:t>
+            </a:r>
+            <a:r>
+              <a:rPr lang="en-GB" baseline="0" dirty="0" err="1" smtClean="0"/>
+              <a:t>getLength</a:t>
+            </a:r>
+            <a:r>
+              <a:rPr lang="en-GB" baseline="0" dirty="0" smtClean="0"/>
+              <a:t>” in the declaration of the Ada entity for the imported C subprogram.</a:t>
+            </a:r>
+          </a:p>
+          <a:p>
+            <a:endParaRPr lang="en-GB" baseline="0" dirty="0" smtClean="0"/>
+          </a:p>
+          <a:p>
+            <a:r>
+              <a:rPr lang="en-GB" baseline="0" dirty="0" smtClean="0"/>
+              <a:t>However the C code used all lowercase for the declaration of the </a:t>
+            </a:r>
+            <a:r>
+              <a:rPr lang="en-GB" baseline="0" dirty="0" err="1" smtClean="0"/>
+              <a:t>getlength</a:t>
+            </a:r>
+            <a:r>
+              <a:rPr lang="en-GB" baseline="0" dirty="0" smtClean="0"/>
+              <a:t> function.</a:t>
+            </a:r>
+          </a:p>
+          <a:p>
+            <a:endParaRPr lang="en-GB" baseline="0" dirty="0" smtClean="0"/>
           </a:p>
         </p:txBody>
       </p:sp>
@@ -2012,7 +2081,7 @@
           <a:p>
             <a:fld id="{CA0C9329-88FA-4F10-ACFF-58B750973BE9}" type="slidenum">
               <a:rPr lang="en-GB" smtClean="0"/>
-              <a:t>18</a:t>
+              <a:t>17</a:t>
             </a:fld>
             <a:endParaRPr lang="en-GB"/>
           </a:p>
@@ -2021,7 +2090,7 @@
     </p:spTree>
     <p:extLst>
       <p:ext uri="{BB962C8B-B14F-4D97-AF65-F5344CB8AC3E}">
-        <p14:creationId xmlns:p14="http://schemas.microsoft.com/office/powerpoint/2010/main" val="112533636"/>
+        <p14:creationId xmlns:p14="http://schemas.microsoft.com/office/powerpoint/2010/main" val="1972531008"/>
       </p:ext>
     </p:extLst>
   </p:cSld>
@@ -2075,6 +2144,37 @@
           <a:bodyPr/>
           <a:lstStyle/>
           <a:p>
+            <a:r>
+              <a:rPr lang="en-GB" dirty="0" smtClean="0"/>
+              <a:t>Question 2 covers exporting an Ada subprogram</a:t>
+            </a:r>
+            <a:r>
+              <a:rPr lang="en-GB" baseline="0" dirty="0" smtClean="0"/>
+              <a:t> for use by a C main program.</a:t>
+            </a:r>
+          </a:p>
+          <a:p>
+            <a:endParaRPr lang="en-GB" baseline="0" dirty="0" smtClean="0"/>
+          </a:p>
+          <a:p>
+            <a:r>
+              <a:rPr lang="en-GB" baseline="0" dirty="0" smtClean="0"/>
+              <a:t>The function </a:t>
+            </a:r>
+            <a:r>
+              <a:rPr lang="en-GB" baseline="0" dirty="0" err="1" smtClean="0"/>
+              <a:t>Get_Length</a:t>
+            </a:r>
+            <a:r>
+              <a:rPr lang="en-GB" baseline="0" dirty="0" smtClean="0"/>
+              <a:t> will return the value 60 when called.  Study the code carefully.</a:t>
+            </a:r>
+            <a:endParaRPr lang="en-GB" dirty="0" smtClean="0"/>
+          </a:p>
+          <a:p>
+            <a:endParaRPr lang="en-GB" baseline="0" dirty="0" smtClean="0"/>
+          </a:p>
+          <a:p>
             <a:pPr marL="0" marR="0" indent="0" algn="l" defTabSz="914400" rtl="0" eaLnBrk="1" fontAlgn="auto" latinLnBrk="0" hangingPunct="1">
               <a:lnSpc>
                 <a:spcPct val="100000"/>
@@ -2093,99 +2193,9 @@
               <a:defRPr/>
             </a:pPr>
             <a:r>
-              <a:rPr lang="en-GB" dirty="0" smtClean="0"/>
-              <a:t>The answer is NO – the code is incorrect</a:t>
+              <a:rPr lang="en-GB" baseline="0" dirty="0" smtClean="0"/>
+              <a:t>If you think this code is correct then please click the tick icon, otherwise click the line of code that is incorrect.</a:t>
             </a:r>
-            <a:r>
-              <a:rPr lang="en-GB" baseline="0" dirty="0" smtClean="0"/>
-              <a:t> and will fail to execute correctly.</a:t>
-            </a:r>
-          </a:p>
-          <a:p>
-            <a:pPr marL="0" marR="0" indent="0" algn="l" defTabSz="914400" rtl="0" eaLnBrk="1" fontAlgn="auto" latinLnBrk="0" hangingPunct="1">
-              <a:lnSpc>
-                <a:spcPct val="100000"/>
-              </a:lnSpc>
-              <a:spcBef>
-                <a:spcPts val="0"/>
-              </a:spcBef>
-              <a:spcAft>
-                <a:spcPts val="0"/>
-              </a:spcAft>
-              <a:buClrTx/>
-              <a:buSzTx/>
-              <a:buFontTx/>
-              <a:buNone/>
-              <a:tabLst/>
-              <a:defRPr/>
-            </a:pPr>
-            <a:endParaRPr lang="en-GB" baseline="0" dirty="0" smtClean="0"/>
-          </a:p>
-          <a:p>
-            <a:pPr marL="0" marR="0" indent="0" algn="l" defTabSz="914400" rtl="0" eaLnBrk="1" fontAlgn="auto" latinLnBrk="0" hangingPunct="1">
-              <a:lnSpc>
-                <a:spcPct val="100000"/>
-              </a:lnSpc>
-              <a:spcBef>
-                <a:spcPts val="0"/>
-              </a:spcBef>
-              <a:spcAft>
-                <a:spcPts val="0"/>
-              </a:spcAft>
-              <a:buClrTx/>
-              <a:buSzTx/>
-              <a:buFontTx/>
-              <a:buNone/>
-              <a:tabLst/>
-              <a:defRPr/>
-            </a:pPr>
-            <a:r>
-              <a:rPr lang="en-GB" dirty="0" smtClean="0"/>
-              <a:t>There</a:t>
-            </a:r>
-            <a:r>
-              <a:rPr lang="en-GB" baseline="0" dirty="0" smtClean="0"/>
-              <a:t> must be a call to adainit() before the use of any exported Ada entities by the C main program.</a:t>
-            </a:r>
-          </a:p>
-          <a:p>
-            <a:pPr marL="0" marR="0" indent="0" algn="l" defTabSz="914400" rtl="0" eaLnBrk="1" fontAlgn="auto" latinLnBrk="0" hangingPunct="1">
-              <a:lnSpc>
-                <a:spcPct val="100000"/>
-              </a:lnSpc>
-              <a:spcBef>
-                <a:spcPts val="0"/>
-              </a:spcBef>
-              <a:spcAft>
-                <a:spcPts val="0"/>
-              </a:spcAft>
-              <a:buClrTx/>
-              <a:buSzTx/>
-              <a:buFontTx/>
-              <a:buNone/>
-              <a:tabLst/>
-              <a:defRPr/>
-            </a:pPr>
-            <a:endParaRPr lang="en-GB" baseline="0" dirty="0" smtClean="0"/>
-          </a:p>
-          <a:p>
-            <a:pPr marL="0" marR="0" indent="0" algn="l" defTabSz="914400" rtl="0" eaLnBrk="1" fontAlgn="auto" latinLnBrk="0" hangingPunct="1">
-              <a:lnSpc>
-                <a:spcPct val="100000"/>
-              </a:lnSpc>
-              <a:spcBef>
-                <a:spcPts val="0"/>
-              </a:spcBef>
-              <a:spcAft>
-                <a:spcPts val="0"/>
-              </a:spcAft>
-              <a:buClrTx/>
-              <a:buSzTx/>
-              <a:buFontTx/>
-              <a:buNone/>
-              <a:tabLst/>
-              <a:defRPr/>
-            </a:pPr>
             <a:endParaRPr lang="en-GB" dirty="0" smtClean="0"/>
           </a:p>
           <a:p>
@@ -2210,7 +2220,7 @@
           <a:p>
             <a:fld id="{CA0C9329-88FA-4F10-ACFF-58B750973BE9}" type="slidenum">
               <a:rPr lang="en-GB" smtClean="0"/>
-              <a:t>19</a:t>
+              <a:t>18</a:t>
             </a:fld>
             <a:endParaRPr lang="en-GB"/>
           </a:p>
@@ -2219,7 +2229,7 @@
     </p:spTree>
     <p:extLst>
       <p:ext uri="{BB962C8B-B14F-4D97-AF65-F5344CB8AC3E}">
-        <p14:creationId xmlns:p14="http://schemas.microsoft.com/office/powerpoint/2010/main" val="241473279"/>
+        <p14:creationId xmlns:p14="http://schemas.microsoft.com/office/powerpoint/2010/main" val="112533636"/>
       </p:ext>
     </p:extLst>
   </p:cSld>
@@ -2273,36 +2283,6 @@
           <a:bodyPr/>
           <a:lstStyle/>
           <a:p>
-            <a:r>
-              <a:rPr lang="en-GB" dirty="0" smtClean="0"/>
-              <a:t>Question 3 demonstrates the use of an</a:t>
-            </a:r>
-            <a:r>
-              <a:rPr lang="en-GB" baseline="0" dirty="0" smtClean="0"/>
-              <a:t> imported memory object using the C convention.  The program declares an Ada entity using the name </a:t>
-            </a:r>
-            <a:r>
-              <a:rPr lang="en-GB" baseline="0" dirty="0" err="1" smtClean="0"/>
-              <a:t>The_Length</a:t>
-            </a:r>
-            <a:r>
-              <a:rPr lang="en-GB" baseline="0" dirty="0" smtClean="0"/>
-              <a:t> but specifies a different external name for the entity in the foreign language.</a:t>
-            </a:r>
-          </a:p>
-          <a:p>
-            <a:endParaRPr lang="en-GB" baseline="0" dirty="0" smtClean="0"/>
-          </a:p>
-          <a:p>
-            <a:r>
-              <a:rPr lang="en-GB" baseline="0" dirty="0" smtClean="0"/>
-              <a:t>The foreign language has declared the memory object as a constant value 20.</a:t>
-            </a:r>
-          </a:p>
-          <a:p>
-            <a:endParaRPr lang="en-GB" baseline="0" dirty="0" smtClean="0"/>
-          </a:p>
-          <a:p>
             <a:pPr marL="0" marR="0" indent="0" algn="l" defTabSz="914400" rtl="0" eaLnBrk="1" fontAlgn="auto" latinLnBrk="0" hangingPunct="1">
               <a:lnSpc>
                 <a:spcPct val="100000"/>
@@ -2321,9 +2301,99 @@
               <a:defRPr/>
             </a:pPr>
             <a:r>
+              <a:rPr lang="en-GB" dirty="0" smtClean="0"/>
+              <a:t>The answer is NO – the code is incorrect</a:t>
+            </a:r>
+            <a:r>
               <a:rPr lang="en-GB" baseline="0" dirty="0" smtClean="0"/>
-              <a:t>If you think this code is correct then please click the tick icon, otherwise click the line of code that is incorrect.</a:t>
+              <a:t> and will fail to execute correctly.</a:t>
             </a:r>
+          </a:p>
+          <a:p>
+            <a:pPr marL="0" marR="0" indent="0" algn="l" defTabSz="914400" rtl="0" eaLnBrk="1" fontAlgn="auto" latinLnBrk="0" hangingPunct="1">
+              <a:lnSpc>
+                <a:spcPct val="100000"/>
+              </a:lnSpc>
+              <a:spcBef>
+                <a:spcPts val="0"/>
+              </a:spcBef>
+              <a:spcAft>
+                <a:spcPts val="0"/>
+              </a:spcAft>
+              <a:buClrTx/>
+              <a:buSzTx/>
+              <a:buFontTx/>
+              <a:buNone/>
+              <a:tabLst/>
+              <a:defRPr/>
+            </a:pPr>
+            <a:endParaRPr lang="en-GB" baseline="0" dirty="0" smtClean="0"/>
+          </a:p>
+          <a:p>
+            <a:pPr marL="0" marR="0" indent="0" algn="l" defTabSz="914400" rtl="0" eaLnBrk="1" fontAlgn="auto" latinLnBrk="0" hangingPunct="1">
+              <a:lnSpc>
+                <a:spcPct val="100000"/>
+              </a:lnSpc>
+              <a:spcBef>
+                <a:spcPts val="0"/>
+              </a:spcBef>
+              <a:spcAft>
+                <a:spcPts val="0"/>
+              </a:spcAft>
+              <a:buClrTx/>
+              <a:buSzTx/>
+              <a:buFontTx/>
+              <a:buNone/>
+              <a:tabLst/>
+              <a:defRPr/>
+            </a:pPr>
+            <a:r>
+              <a:rPr lang="en-GB" dirty="0" smtClean="0"/>
+              <a:t>There</a:t>
+            </a:r>
+            <a:r>
+              <a:rPr lang="en-GB" baseline="0" dirty="0" smtClean="0"/>
+              <a:t> must be a call to adainit() before the use of any exported Ada entities by the C main program.</a:t>
+            </a:r>
+          </a:p>
+          <a:p>
+            <a:pPr marL="0" marR="0" indent="0" algn="l" defTabSz="914400" rtl="0" eaLnBrk="1" fontAlgn="auto" latinLnBrk="0" hangingPunct="1">
+              <a:lnSpc>
+                <a:spcPct val="100000"/>
+              </a:lnSpc>
+              <a:spcBef>
+                <a:spcPts val="0"/>
+              </a:spcBef>
+              <a:spcAft>
+                <a:spcPts val="0"/>
+              </a:spcAft>
+              <a:buClrTx/>
+              <a:buSzTx/>
+              <a:buFontTx/>
+              <a:buNone/>
+              <a:tabLst/>
+              <a:defRPr/>
+            </a:pPr>
+            <a:endParaRPr lang="en-GB" baseline="0" dirty="0" smtClean="0"/>
+          </a:p>
+          <a:p>
+            <a:pPr marL="0" marR="0" indent="0" algn="l" defTabSz="914400" rtl="0" eaLnBrk="1" fontAlgn="auto" latinLnBrk="0" hangingPunct="1">
+              <a:lnSpc>
+                <a:spcPct val="100000"/>
+              </a:lnSpc>
+              <a:spcBef>
+                <a:spcPts val="0"/>
+              </a:spcBef>
+              <a:spcAft>
+                <a:spcPts val="0"/>
+              </a:spcAft>
+              <a:buClrTx/>
+              <a:buSzTx/>
+              <a:buFontTx/>
+              <a:buNone/>
+              <a:tabLst/>
+              <a:defRPr/>
+            </a:pPr>
             <a:endParaRPr lang="en-GB" dirty="0" smtClean="0"/>
           </a:p>
           <a:p>
@@ -2348,7 +2418,7 @@
           <a:p>
             <a:fld id="{CA0C9329-88FA-4F10-ACFF-58B750973BE9}" type="slidenum">
               <a:rPr lang="en-GB" smtClean="0"/>
-              <a:t>20</a:t>
+              <a:t>19</a:t>
             </a:fld>
             <a:endParaRPr lang="en-GB"/>
           </a:p>
@@ -2357,7 +2427,7 @@
     </p:spTree>
     <p:extLst>
       <p:ext uri="{BB962C8B-B14F-4D97-AF65-F5344CB8AC3E}">
-        <p14:creationId xmlns:p14="http://schemas.microsoft.com/office/powerpoint/2010/main" val="1036053753"/>
+        <p14:creationId xmlns:p14="http://schemas.microsoft.com/office/powerpoint/2010/main" val="241473279"/>
       </p:ext>
     </p:extLst>
   </p:cSld>
@@ -2571,46 +2641,33 @@
           <a:bodyPr/>
           <a:lstStyle/>
           <a:p>
-            <a:pPr marL="0" marR="0" indent="0" algn="l" defTabSz="914400" rtl="0" eaLnBrk="1" fontAlgn="auto" latinLnBrk="0" hangingPunct="1">
-              <a:lnSpc>
-                <a:spcPct val="100000"/>
-              </a:lnSpc>
-              <a:spcBef>
-                <a:spcPts val="0"/>
-              </a:spcBef>
-              <a:spcAft>
-                <a:spcPts val="0"/>
-              </a:spcAft>
-              <a:buClrTx/>
-              <a:buSzTx/>
-              <a:buFontTx/>
-              <a:buNone/>
-              <a:tabLst/>
-              <a:defRPr/>
-            </a:pPr>
             <a:r>
               <a:rPr lang="en-GB" dirty="0" smtClean="0"/>
-              <a:t>The answer is YES – the code is correct.</a:t>
+              <a:t>Question 3 demonstrates the use of an</a:t>
             </a:r>
-          </a:p>
-          <a:p>
-            <a:pPr marL="0" marR="0" indent="0" algn="l" defTabSz="914400" rtl="0" eaLnBrk="1" fontAlgn="auto" latinLnBrk="0" hangingPunct="1">
-              <a:lnSpc>
-                <a:spcPct val="100000"/>
-              </a:lnSpc>
-              <a:spcBef>
-                <a:spcPts val="0"/>
-              </a:spcBef>
-              <a:spcAft>
-                <a:spcPts val="0"/>
-              </a:spcAft>
-              <a:buClrTx/>
-              <a:buSzTx/>
-              <a:buFontTx/>
-              <a:buNone/>
-              <a:tabLst/>
-              <a:defRPr/>
-            </a:pPr>
+            <a:r>
+              <a:rPr lang="en-GB" baseline="0" dirty="0" smtClean="0"/>
+              <a:t> imported memory object using the C convention.  The program declares an Ada entity using the name </a:t>
+            </a:r>
+            <a:r>
+              <a:rPr lang="en-GB" baseline="0" dirty="0" err="1" smtClean="0"/>
+              <a:t>The_Length</a:t>
+            </a:r>
+            <a:r>
+              <a:rPr lang="en-GB" baseline="0" dirty="0" smtClean="0"/>
+              <a:t> but specifies a different external name for the entity in the foreign language.</a:t>
+            </a:r>
+          </a:p>
+          <a:p>
+            <a:endParaRPr lang="en-GB" baseline="0" dirty="0" smtClean="0"/>
+          </a:p>
+          <a:p>
+            <a:r>
+              <a:rPr lang="en-GB" baseline="0" dirty="0" smtClean="0"/>
+              <a:t>The foreign language has declared the memory object as a constant value 20.</a:t>
+            </a:r>
+          </a:p>
+          <a:p>
             <a:endParaRPr lang="en-GB" baseline="0" dirty="0" smtClean="0"/>
           </a:p>
           <a:p>
@@ -2633,8 +2690,11 @@
             </a:pPr>
             <a:r>
               <a:rPr lang="en-GB" baseline="0" dirty="0" smtClean="0"/>
-              <a:t>Ada is able to use memory objects imported from foreign languages without having the responsibility for setting their values.</a:t>
+              <a:t>If you think this code is correct then please click the tick icon, otherwise click the line of code that is incorrect.</a:t>
             </a:r>
+            <a:endParaRPr lang="en-GB" dirty="0" smtClean="0"/>
+          </a:p>
+          <a:p>
             <a:endParaRPr lang="en-GB" dirty="0"/>
           </a:p>
         </p:txBody>
@@ -2656,7 +2716,7 @@
           <a:p>
             <a:fld id="{CA0C9329-88FA-4F10-ACFF-58B750973BE9}" type="slidenum">
               <a:rPr lang="en-GB" smtClean="0"/>
-              <a:t>21</a:t>
+              <a:t>20</a:t>
             </a:fld>
             <a:endParaRPr lang="en-GB"/>
           </a:p>
@@ -2665,7 +2725,7 @@
     </p:spTree>
     <p:extLst>
       <p:ext uri="{BB962C8B-B14F-4D97-AF65-F5344CB8AC3E}">
-        <p14:creationId xmlns:p14="http://schemas.microsoft.com/office/powerpoint/2010/main" val="1539918018"/>
+        <p14:creationId xmlns:p14="http://schemas.microsoft.com/office/powerpoint/2010/main" val="1036053753"/>
       </p:ext>
     </p:extLst>
   </p:cSld>
@@ -2719,34 +2779,46 @@
           <a:bodyPr/>
           <a:lstStyle/>
           <a:p>
+            <a:pPr marL="0" marR="0" indent="0" algn="l" defTabSz="914400" rtl="0" eaLnBrk="1" fontAlgn="auto" latinLnBrk="0" hangingPunct="1">
+              <a:lnSpc>
+                <a:spcPct val="100000"/>
+              </a:lnSpc>
+              <a:spcBef>
+                <a:spcPts val="0"/>
+              </a:spcBef>
+              <a:spcAft>
+                <a:spcPts val="0"/>
+              </a:spcAft>
+              <a:buClrTx/>
+              <a:buSzTx/>
+              <a:buFontTx/>
+              <a:buNone/>
+              <a:tabLst/>
+              <a:defRPr/>
+            </a:pPr>
             <a:r>
               <a:rPr lang="en-GB" dirty="0" smtClean="0"/>
-              <a:t>Question 4 mixes</a:t>
+              <a:t>The answer is YES – the code is correct.</a:t>
             </a:r>
-            <a:r>
-              <a:rPr lang="en-GB" baseline="0" dirty="0" smtClean="0"/>
-              <a:t> the use of Ada access types with C pointers but without using any pointer arithmetic.</a:t>
-            </a:r>
-          </a:p>
-          <a:p>
-            <a:endParaRPr lang="en-GB" baseline="0" dirty="0" smtClean="0"/>
-          </a:p>
-          <a:p>
-            <a:r>
-              <a:rPr lang="en-GB" baseline="0" dirty="0" smtClean="0"/>
-              <a:t>When the C main program executes it intends to outputs the number 50.</a:t>
-            </a:r>
-          </a:p>
-          <a:p>
-            <a:endParaRPr lang="en-GB" baseline="0" dirty="0" smtClean="0"/>
-          </a:p>
-          <a:p>
-            <a:r>
-              <a:rPr lang="en-GB" baseline="0" dirty="0" smtClean="0"/>
-              <a:t>The example code is much larger than previous questions so please take your time to read it through an understand it.</a:t>
-            </a:r>
-          </a:p>
-          <a:p>
+          </a:p>
+          <a:p>
+            <a:pPr marL="0" marR="0" indent="0" algn="l" defTabSz="914400" rtl="0" eaLnBrk="1" fontAlgn="auto" latinLnBrk="0" hangingPunct="1">
+              <a:lnSpc>
+                <a:spcPct val="100000"/>
+              </a:lnSpc>
+              <a:spcBef>
+                <a:spcPts val="0"/>
+              </a:spcBef>
+              <a:spcAft>
+                <a:spcPts val="0"/>
+              </a:spcAft>
+              <a:buClrTx/>
+              <a:buSzTx/>
+              <a:buFontTx/>
+              <a:buNone/>
+              <a:tabLst/>
+              <a:defRPr/>
+            </a:pPr>
             <a:endParaRPr lang="en-GB" baseline="0" dirty="0" smtClean="0"/>
           </a:p>
           <a:p>
@@ -2769,11 +2841,8 @@
             </a:pPr>
             <a:r>
               <a:rPr lang="en-GB" baseline="0" dirty="0" smtClean="0"/>
-              <a:t>If you think this code is correct then please click the tick icon, otherwise click the line of code that is incorrect.</a:t>
+              <a:t>Ada is able to use memory objects imported from foreign languages without having the responsibility for setting their values.</a:t>
             </a:r>
-            <a:endParaRPr lang="en-GB" dirty="0" smtClean="0"/>
-          </a:p>
-          <a:p>
             <a:endParaRPr lang="en-GB" dirty="0"/>
           </a:p>
         </p:txBody>
@@ -2795,7 +2864,7 @@
           <a:p>
             <a:fld id="{CA0C9329-88FA-4F10-ACFF-58B750973BE9}" type="slidenum">
               <a:rPr lang="en-GB" smtClean="0"/>
-              <a:t>22</a:t>
+              <a:t>21</a:t>
             </a:fld>
             <a:endParaRPr lang="en-GB"/>
           </a:p>
@@ -2804,7 +2873,7 @@
     </p:spTree>
     <p:extLst>
       <p:ext uri="{BB962C8B-B14F-4D97-AF65-F5344CB8AC3E}">
-        <p14:creationId xmlns:p14="http://schemas.microsoft.com/office/powerpoint/2010/main" val="680953091"/>
+        <p14:creationId xmlns:p14="http://schemas.microsoft.com/office/powerpoint/2010/main" val="1539918018"/>
       </p:ext>
     </p:extLst>
   </p:cSld>
@@ -2858,6 +2927,37 @@
           <a:bodyPr/>
           <a:lstStyle/>
           <a:p>
+            <a:r>
+              <a:rPr lang="en-GB" dirty="0" smtClean="0"/>
+              <a:t>Question 4 mixes</a:t>
+            </a:r>
+            <a:r>
+              <a:rPr lang="en-GB" baseline="0" dirty="0" smtClean="0"/>
+              <a:t> the use of Ada access types with C pointers but without using any pointer arithmetic.</a:t>
+            </a:r>
+          </a:p>
+          <a:p>
+            <a:endParaRPr lang="en-GB" baseline="0" dirty="0" smtClean="0"/>
+          </a:p>
+          <a:p>
+            <a:r>
+              <a:rPr lang="en-GB" baseline="0" dirty="0" smtClean="0"/>
+              <a:t>When the C main program executes it intends to outputs the number 50.</a:t>
+            </a:r>
+          </a:p>
+          <a:p>
+            <a:endParaRPr lang="en-GB" baseline="0" dirty="0" smtClean="0"/>
+          </a:p>
+          <a:p>
+            <a:r>
+              <a:rPr lang="en-GB" baseline="0" dirty="0" smtClean="0"/>
+              <a:t>The example code is much larger than previous questions so please take your time to read it through an understand it.</a:t>
+            </a:r>
+          </a:p>
+          <a:p>
+            <a:endParaRPr lang="en-GB" baseline="0" dirty="0" smtClean="0"/>
+          </a:p>
+          <a:p>
             <a:pPr marL="0" marR="0" indent="0" algn="l" defTabSz="914400" rtl="0" eaLnBrk="1" fontAlgn="auto" latinLnBrk="0" hangingPunct="1">
               <a:lnSpc>
                 <a:spcPct val="100000"/>
@@ -2876,22 +2976,12 @@
               <a:defRPr/>
             </a:pPr>
             <a:r>
-              <a:rPr lang="en-GB" dirty="0" smtClean="0"/>
-              <a:t>The answer is YES – the code is correct.</a:t>
+              <a:rPr lang="en-GB" baseline="0" dirty="0" smtClean="0"/>
+              <a:t>If you think this code is correct then please click the tick icon, otherwise click the line of code that is incorrect.</a:t>
             </a:r>
-          </a:p>
-          <a:p>
             <a:endParaRPr lang="en-GB" dirty="0" smtClean="0"/>
           </a:p>
           <a:p>
-            <a:r>
-              <a:rPr lang="en-GB" dirty="0" smtClean="0"/>
-              <a:t>It is perfectly safe to</a:t>
-            </a:r>
-            <a:r>
-              <a:rPr lang="en-GB" baseline="0" dirty="0" smtClean="0"/>
-              <a:t> mix Ada access types with C pointers as long as the types from Interfaces.C are used as the target types.</a:t>
-            </a:r>
             <a:endParaRPr lang="en-GB" dirty="0"/>
           </a:p>
         </p:txBody>
@@ -2913,7 +3003,7 @@
           <a:p>
             <a:fld id="{CA0C9329-88FA-4F10-ACFF-58B750973BE9}" type="slidenum">
               <a:rPr lang="en-GB" smtClean="0"/>
-              <a:t>23</a:t>
+              <a:t>22</a:t>
             </a:fld>
             <a:endParaRPr lang="en-GB"/>
           </a:p>
@@ -2922,7 +3012,7 @@
     </p:spTree>
     <p:extLst>
       <p:ext uri="{BB962C8B-B14F-4D97-AF65-F5344CB8AC3E}">
-        <p14:creationId xmlns:p14="http://schemas.microsoft.com/office/powerpoint/2010/main" val="3929045722"/>
+        <p14:creationId xmlns:p14="http://schemas.microsoft.com/office/powerpoint/2010/main" val="680953091"/>
       </p:ext>
     </p:extLst>
   </p:cSld>
@@ -2976,37 +3066,6 @@
           <a:bodyPr/>
           <a:lstStyle/>
           <a:p>
-            <a:r>
-              <a:rPr lang="en-GB" dirty="0" smtClean="0"/>
-              <a:t>Question 5 presents</a:t>
-            </a:r>
-            <a:r>
-              <a:rPr lang="en-GB" baseline="0" dirty="0" smtClean="0"/>
-              <a:t> a method of accessing an array of C constants imported as an Ada entity.</a:t>
-            </a:r>
-          </a:p>
-          <a:p>
-            <a:endParaRPr lang="en-GB" baseline="0" dirty="0" smtClean="0"/>
-          </a:p>
-          <a:p>
-            <a:r>
-              <a:rPr lang="en-GB" baseline="0" dirty="0" smtClean="0"/>
-              <a:t>The body of the Ada main program iterates over the imported entity until the value 9999 is encountered.</a:t>
-            </a:r>
-          </a:p>
-          <a:p>
-            <a:endParaRPr lang="en-GB" baseline="0" dirty="0" smtClean="0"/>
-          </a:p>
-          <a:p>
-            <a:r>
-              <a:rPr lang="en-GB" baseline="0" dirty="0" smtClean="0"/>
-              <a:t>Again this code is quite advanced so please take some time to review it before attempting the question of correctness.</a:t>
-            </a:r>
-          </a:p>
-          <a:p>
-            <a:endParaRPr lang="en-GB" baseline="0" dirty="0" smtClean="0"/>
-          </a:p>
-          <a:p>
             <a:pPr marL="0" marR="0" indent="0" algn="l" defTabSz="914400" rtl="0" eaLnBrk="1" fontAlgn="auto" latinLnBrk="0" hangingPunct="1">
               <a:lnSpc>
                 <a:spcPct val="100000"/>
@@ -3025,12 +3084,22 @@
               <a:defRPr/>
             </a:pPr>
             <a:r>
+              <a:rPr lang="en-GB" dirty="0" smtClean="0"/>
+              <a:t>The answer is YES – the code is correct.</a:t>
+            </a:r>
+          </a:p>
+          <a:p>
+            <a:endParaRPr lang="en-GB" dirty="0" smtClean="0"/>
+          </a:p>
+          <a:p>
+            <a:r>
+              <a:rPr lang="en-GB" dirty="0" smtClean="0"/>
+              <a:t>It is perfectly safe to</a:t>
+            </a:r>
+            <a:r>
               <a:rPr lang="en-GB" baseline="0" dirty="0" smtClean="0"/>
-              <a:t>If you think this code is correct then please click the tick icon, otherwise click the line of code that is incorrect.</a:t>
+              <a:t> mix Ada access types with C pointers as long as the types from Interfaces.C are used as the target types.</a:t>
             </a:r>
-            <a:endParaRPr lang="en-GB" dirty="0" smtClean="0"/>
-          </a:p>
-          <a:p>
             <a:endParaRPr lang="en-GB" dirty="0"/>
           </a:p>
         </p:txBody>
@@ -3052,7 +3121,7 @@
           <a:p>
             <a:fld id="{CA0C9329-88FA-4F10-ACFF-58B750973BE9}" type="slidenum">
               <a:rPr lang="en-GB" smtClean="0"/>
-              <a:t>24</a:t>
+              <a:t>23</a:t>
             </a:fld>
             <a:endParaRPr lang="en-GB"/>
           </a:p>
@@ -3061,7 +3130,7 @@
     </p:spTree>
     <p:extLst>
       <p:ext uri="{BB962C8B-B14F-4D97-AF65-F5344CB8AC3E}">
-        <p14:creationId xmlns:p14="http://schemas.microsoft.com/office/powerpoint/2010/main" val="3669360501"/>
+        <p14:creationId xmlns:p14="http://schemas.microsoft.com/office/powerpoint/2010/main" val="3929045722"/>
       </p:ext>
     </p:extLst>
   </p:cSld>
@@ -3115,50 +3184,34 @@
           <a:bodyPr/>
           <a:lstStyle/>
           <a:p>
-            <a:pPr marL="0" marR="0" indent="0" algn="l" defTabSz="914400" rtl="0" eaLnBrk="1" fontAlgn="auto" latinLnBrk="0" hangingPunct="1">
-              <a:lnSpc>
-                <a:spcPct val="100000"/>
-              </a:lnSpc>
-              <a:spcBef>
-                <a:spcPts val="0"/>
-              </a:spcBef>
-              <a:spcAft>
-                <a:spcPts val="0"/>
-              </a:spcAft>
-              <a:buClrTx/>
-              <a:buSzTx/>
-              <a:buFontTx/>
-              <a:buNone/>
-              <a:tabLst/>
-              <a:defRPr/>
-            </a:pPr>
             <a:r>
               <a:rPr lang="en-GB" dirty="0" smtClean="0"/>
-              <a:t>The answer is YES – the code is correct</a:t>
+              <a:t>Question 5 presents</a:t>
             </a:r>
             <a:r>
               <a:rPr lang="en-GB" baseline="0" dirty="0" smtClean="0"/>
-              <a:t> but it is not recommended to do this kind of access type manipulation.</a:t>
+              <a:t> a method of accessing an array of C constants imported as an Ada entity.</a:t>
             </a:r>
           </a:p>
           <a:p>
-            <a:pPr marL="0" marR="0" indent="0" algn="l" defTabSz="914400" rtl="0" eaLnBrk="1" fontAlgn="auto" latinLnBrk="0" hangingPunct="1">
-              <a:lnSpc>
-                <a:spcPct val="100000"/>
-              </a:lnSpc>
-              <a:spcBef>
-                <a:spcPts val="0"/>
-              </a:spcBef>
-              <a:spcAft>
-                <a:spcPts val="0"/>
-              </a:spcAft>
-              <a:buClrTx/>
-              <a:buSzTx/>
-              <a:buFontTx/>
-              <a:buNone/>
-              <a:tabLst/>
-              <a:defRPr/>
-            </a:pPr>
+            <a:endParaRPr lang="en-GB" baseline="0" dirty="0" smtClean="0"/>
+          </a:p>
+          <a:p>
+            <a:r>
+              <a:rPr lang="en-GB" baseline="0" dirty="0" smtClean="0"/>
+              <a:t>The body of the Ada main program iterates over the imported entity until the value 9999 is encountered.</a:t>
+            </a:r>
+          </a:p>
+          <a:p>
+            <a:endParaRPr lang="en-GB" baseline="0" dirty="0" smtClean="0"/>
+          </a:p>
+          <a:p>
+            <a:r>
+              <a:rPr lang="en-GB" baseline="0" dirty="0" smtClean="0"/>
+              <a:t>Again this code is quite advanced so please take some time to review it before attempting the question of correctness.</a:t>
+            </a:r>
+          </a:p>
+          <a:p>
             <a:endParaRPr lang="en-GB" baseline="0" dirty="0" smtClean="0"/>
           </a:p>
           <a:p>
@@ -3181,95 +3234,12 @@
             </a:pPr>
             <a:r>
               <a:rPr lang="en-GB" baseline="0" dirty="0" smtClean="0"/>
-              <a:t>There are some big assumptions being made by the code in the question slide about the imported C data structure.</a:t>
-            </a:r>
-          </a:p>
-          <a:p>
-            <a:pPr marL="0" marR="0" indent="0" algn="l" defTabSz="914400" rtl="0" eaLnBrk="1" fontAlgn="auto" latinLnBrk="0" hangingPunct="1">
-              <a:lnSpc>
-                <a:spcPct val="100000"/>
-              </a:lnSpc>
-              <a:spcBef>
-                <a:spcPts val="0"/>
-              </a:spcBef>
-              <a:spcAft>
-                <a:spcPts val="0"/>
-              </a:spcAft>
-              <a:buClrTx/>
-              <a:buSzTx/>
-              <a:buFontTx/>
-              <a:buNone/>
-              <a:tabLst/>
-              <a:defRPr/>
-            </a:pPr>
-            <a:endParaRPr lang="en-GB" baseline="0" dirty="0" smtClean="0"/>
-          </a:p>
-          <a:p>
-            <a:pPr marL="0" marR="0" indent="0" algn="l" defTabSz="914400" rtl="0" eaLnBrk="1" fontAlgn="auto" latinLnBrk="0" hangingPunct="1">
-              <a:lnSpc>
-                <a:spcPct val="100000"/>
-              </a:lnSpc>
-              <a:spcBef>
-                <a:spcPts val="0"/>
-              </a:spcBef>
-              <a:spcAft>
-                <a:spcPts val="0"/>
-              </a:spcAft>
-              <a:buClrTx/>
-              <a:buSzTx/>
-              <a:buFontTx/>
-              <a:buNone/>
-              <a:tabLst/>
-              <a:defRPr/>
-            </a:pPr>
-            <a:r>
-              <a:rPr lang="en-GB" baseline="0" dirty="0" smtClean="0"/>
-              <a:t>A better solution using the is shown here.  It is restricted to a single use of the ‘Access attribute and it is made type safe by using the structure returned by the Value subprogram from the Interfaces.C.Pointer package.</a:t>
-            </a:r>
-          </a:p>
-          <a:p>
-            <a:pPr marL="0" marR="0" indent="0" algn="l" defTabSz="914400" rtl="0" eaLnBrk="1" fontAlgn="auto" latinLnBrk="0" hangingPunct="1">
-              <a:lnSpc>
-                <a:spcPct val="100000"/>
-              </a:lnSpc>
-              <a:spcBef>
-                <a:spcPts val="0"/>
-              </a:spcBef>
-              <a:spcAft>
-                <a:spcPts val="0"/>
-              </a:spcAft>
-              <a:buClrTx/>
-              <a:buSzTx/>
-              <a:buFontTx/>
-              <a:buNone/>
-              <a:tabLst/>
-              <a:defRPr/>
-            </a:pPr>
-            <a:endParaRPr lang="en-GB" baseline="0" dirty="0" smtClean="0"/>
-          </a:p>
-          <a:p>
-            <a:pPr marL="0" marR="0" indent="0" algn="l" defTabSz="914400" rtl="0" eaLnBrk="1" fontAlgn="auto" latinLnBrk="0" hangingPunct="1">
-              <a:lnSpc>
-                <a:spcPct val="100000"/>
-              </a:lnSpc>
-              <a:spcBef>
-                <a:spcPts val="0"/>
-              </a:spcBef>
-              <a:spcAft>
-                <a:spcPts val="0"/>
-              </a:spcAft>
-              <a:buClrTx/>
-              <a:buSzTx/>
-              <a:buFontTx/>
-              <a:buNone/>
-              <a:tabLst/>
-              <a:defRPr/>
-            </a:pPr>
-            <a:r>
-              <a:rPr lang="en-GB" baseline="0" dirty="0" smtClean="0"/>
-              <a:t>It is probably debatable about which solution is better but in the interests of fairness both must be presented in this lecture.</a:t>
+              <a:t>If you think this code is correct then please click the tick icon, otherwise click the line of code that is incorrect.</a:t>
             </a:r>
             <a:endParaRPr lang="en-GB" dirty="0" smtClean="0"/>
+          </a:p>
+          <a:p>
+            <a:endParaRPr lang="en-GB" dirty="0"/>
           </a:p>
         </p:txBody>
       </p:sp>
@@ -3290,7 +3260,7 @@
           <a:p>
             <a:fld id="{CA0C9329-88FA-4F10-ACFF-58B750973BE9}" type="slidenum">
               <a:rPr lang="en-GB" smtClean="0"/>
-              <a:t>25</a:t>
+              <a:t>24</a:t>
             </a:fld>
             <a:endParaRPr lang="en-GB"/>
           </a:p>
@@ -3299,7 +3269,7 @@
     </p:spTree>
     <p:extLst>
       <p:ext uri="{BB962C8B-B14F-4D97-AF65-F5344CB8AC3E}">
-        <p14:creationId xmlns:p14="http://schemas.microsoft.com/office/powerpoint/2010/main" val="910478360"/>
+        <p14:creationId xmlns:p14="http://schemas.microsoft.com/office/powerpoint/2010/main" val="3669360501"/>
       </p:ext>
     </p:extLst>
   </p:cSld>
@@ -3353,19 +3323,6 @@
           <a:bodyPr/>
           <a:lstStyle/>
           <a:p>
-            <a:r>
-              <a:rPr lang="en-GB" dirty="0" smtClean="0"/>
-              <a:t>Question 6 asks which of</a:t>
-            </a:r>
-            <a:r>
-              <a:rPr lang="en-GB" baseline="0" dirty="0" smtClean="0"/>
-              <a:t> these packages is not part of the hierarchy of packages rooted in Interfaces.C.</a:t>
-            </a:r>
-          </a:p>
-          <a:p>
-            <a:endParaRPr lang="en-GB" baseline="0" dirty="0" smtClean="0"/>
-          </a:p>
-          <a:p>
             <a:pPr marL="0" marR="0" indent="0" algn="l" defTabSz="914400" rtl="0" eaLnBrk="1" fontAlgn="auto" latinLnBrk="0" hangingPunct="1">
               <a:lnSpc>
                 <a:spcPct val="100000"/>
@@ -3385,16 +3342,142 @@
             </a:pPr>
             <a:r>
               <a:rPr lang="en-GB" dirty="0" smtClean="0"/>
-              <a:t>Please select your</a:t>
+              <a:t>The answer is YES – the code is correct</a:t>
             </a:r>
             <a:r>
               <a:rPr lang="en-GB" baseline="0" dirty="0" smtClean="0"/>
-              <a:t> chosen answer and then click Submit.</a:t>
+              <a:t> but it is not recommended to do this kind of access type manipulation.</a:t>
+            </a:r>
+          </a:p>
+          <a:p>
+            <a:pPr marL="0" marR="0" indent="0" algn="l" defTabSz="914400" rtl="0" eaLnBrk="1" fontAlgn="auto" latinLnBrk="0" hangingPunct="1">
+              <a:lnSpc>
+                <a:spcPct val="100000"/>
+              </a:lnSpc>
+              <a:spcBef>
+                <a:spcPts val="0"/>
+              </a:spcBef>
+              <a:spcAft>
+                <a:spcPts val="0"/>
+              </a:spcAft>
+              <a:buClrTx/>
+              <a:buSzTx/>
+              <a:buFontTx/>
+              <a:buNone/>
+              <a:tabLst/>
+              <a:defRPr/>
+            </a:pPr>
+            <a:endParaRPr lang="en-GB" baseline="0" dirty="0" smtClean="0"/>
+          </a:p>
+          <a:p>
+            <a:pPr marL="0" marR="0" indent="0" algn="l" defTabSz="914400" rtl="0" eaLnBrk="1" fontAlgn="auto" latinLnBrk="0" hangingPunct="1">
+              <a:lnSpc>
+                <a:spcPct val="100000"/>
+              </a:lnSpc>
+              <a:spcBef>
+                <a:spcPts val="0"/>
+              </a:spcBef>
+              <a:spcAft>
+                <a:spcPts val="0"/>
+              </a:spcAft>
+              <a:buClrTx/>
+              <a:buSzTx/>
+              <a:buFontTx/>
+              <a:buNone/>
+              <a:tabLst/>
+              <a:defRPr/>
+            </a:pPr>
+            <a:r>
+              <a:rPr lang="en-GB" baseline="0" dirty="0" smtClean="0"/>
+              <a:t>There are some big assumptions being made by the code in the question slide about the imported C data structure.</a:t>
+            </a:r>
+          </a:p>
+          <a:p>
+            <a:pPr marL="0" marR="0" indent="0" algn="l" defTabSz="914400" rtl="0" eaLnBrk="1" fontAlgn="auto" latinLnBrk="0" hangingPunct="1">
+              <a:lnSpc>
+                <a:spcPct val="100000"/>
+              </a:lnSpc>
+              <a:spcBef>
+                <a:spcPts val="0"/>
+              </a:spcBef>
+              <a:spcAft>
+                <a:spcPts val="0"/>
+              </a:spcAft>
+              <a:buClrTx/>
+              <a:buSzTx/>
+              <a:buFontTx/>
+              <a:buNone/>
+              <a:tabLst/>
+              <a:defRPr/>
+            </a:pPr>
+            <a:endParaRPr lang="en-GB" baseline="0" dirty="0" smtClean="0"/>
+          </a:p>
+          <a:p>
+            <a:pPr marL="0" marR="0" indent="0" algn="l" defTabSz="914400" rtl="0" eaLnBrk="1" fontAlgn="auto" latinLnBrk="0" hangingPunct="1">
+              <a:lnSpc>
+                <a:spcPct val="100000"/>
+              </a:lnSpc>
+              <a:spcBef>
+                <a:spcPts val="0"/>
+              </a:spcBef>
+              <a:spcAft>
+                <a:spcPts val="0"/>
+              </a:spcAft>
+              <a:buClrTx/>
+              <a:buSzTx/>
+              <a:buFontTx/>
+              <a:buNone/>
+              <a:tabLst/>
+              <a:defRPr/>
+            </a:pPr>
+            <a:r>
+              <a:rPr lang="en-GB" baseline="0" dirty="0" smtClean="0"/>
+              <a:t>A better solution using the is shown here.  It is restricted to a single use of the ‘Access attribute and it is made type safe by using the structure returned by the Value subprogram from the Interfaces.C.Pointer package.</a:t>
+            </a:r>
+          </a:p>
+          <a:p>
+            <a:pPr marL="0" marR="0" indent="0" algn="l" defTabSz="914400" rtl="0" eaLnBrk="1" fontAlgn="auto" latinLnBrk="0" hangingPunct="1">
+              <a:lnSpc>
+                <a:spcPct val="100000"/>
+              </a:lnSpc>
+              <a:spcBef>
+                <a:spcPts val="0"/>
+              </a:spcBef>
+              <a:spcAft>
+                <a:spcPts val="0"/>
+              </a:spcAft>
+              <a:buClrTx/>
+              <a:buSzTx/>
+              <a:buFontTx/>
+              <a:buNone/>
+              <a:tabLst/>
+              <a:defRPr/>
+            </a:pPr>
+            <a:endParaRPr lang="en-GB" baseline="0" dirty="0" smtClean="0"/>
+          </a:p>
+          <a:p>
+            <a:pPr marL="0" marR="0" indent="0" algn="l" defTabSz="914400" rtl="0" eaLnBrk="1" fontAlgn="auto" latinLnBrk="0" hangingPunct="1">
+              <a:lnSpc>
+                <a:spcPct val="100000"/>
+              </a:lnSpc>
+              <a:spcBef>
+                <a:spcPts val="0"/>
+              </a:spcBef>
+              <a:spcAft>
+                <a:spcPts val="0"/>
+              </a:spcAft>
+              <a:buClrTx/>
+              <a:buSzTx/>
+              <a:buFontTx/>
+              <a:buNone/>
+              <a:tabLst/>
+              <a:defRPr/>
+            </a:pPr>
+            <a:r>
+              <a:rPr lang="en-GB" baseline="0" dirty="0" smtClean="0"/>
+              <a:t>It is probably debatable about which solution is better but in the interests of fairness both must be presented in this lecture.</a:t>
             </a:r>
             <a:endParaRPr lang="en-GB" dirty="0" smtClean="0"/>
-          </a:p>
-          <a:p>
-            <a:endParaRPr lang="en-GB" dirty="0"/>
           </a:p>
         </p:txBody>
       </p:sp>
@@ -3415,7 +3498,7 @@
           <a:p>
             <a:fld id="{CA0C9329-88FA-4F10-ACFF-58B750973BE9}" type="slidenum">
               <a:rPr lang="en-GB" smtClean="0"/>
-              <a:t>26</a:t>
+              <a:t>25</a:t>
             </a:fld>
             <a:endParaRPr lang="en-GB"/>
           </a:p>
@@ -3424,7 +3507,7 @@
     </p:spTree>
     <p:extLst>
       <p:ext uri="{BB962C8B-B14F-4D97-AF65-F5344CB8AC3E}">
-        <p14:creationId xmlns:p14="http://schemas.microsoft.com/office/powerpoint/2010/main" val="3773988263"/>
+        <p14:creationId xmlns:p14="http://schemas.microsoft.com/office/powerpoint/2010/main" val="910478360"/>
       </p:ext>
     </p:extLst>
   </p:cSld>
@@ -3480,16 +3563,45 @@
           <a:p>
             <a:r>
               <a:rPr lang="en-GB" dirty="0" smtClean="0"/>
-              <a:t>The answer</a:t>
+              <a:t>Question 6 asks which of</a:t>
             </a:r>
             <a:r>
               <a:rPr lang="en-GB" baseline="0" dirty="0" smtClean="0"/>
-              <a:t> was </a:t>
+              <a:t> these packages is not part of the hierarchy of packages rooted in Interfaces.C.</a:t>
+            </a:r>
+          </a:p>
+          <a:p>
+            <a:endParaRPr lang="en-GB" baseline="0" dirty="0" smtClean="0"/>
+          </a:p>
+          <a:p>
+            <a:pPr marL="0" marR="0" indent="0" algn="l" defTabSz="914400" rtl="0" eaLnBrk="1" fontAlgn="auto" latinLnBrk="0" hangingPunct="1">
+              <a:lnSpc>
+                <a:spcPct val="100000"/>
+              </a:lnSpc>
+              <a:spcBef>
+                <a:spcPts val="0"/>
+              </a:spcBef>
+              <a:spcAft>
+                <a:spcPts val="0"/>
+              </a:spcAft>
+              <a:buClrTx/>
+              <a:buSzTx/>
+              <a:buFontTx/>
+              <a:buNone/>
+              <a:tabLst/>
+              <a:defRPr/>
+            </a:pPr>
+            <a:r>
+              <a:rPr lang="en-GB" dirty="0" smtClean="0"/>
+              <a:t>Please select your</a:t>
             </a:r>
             <a:r>
-              <a:rPr lang="en-GB" baseline="0" dirty="0" err="1" smtClean="0"/>
-              <a:t>Interfaces.C.Subprograms</a:t>
+              <a:rPr lang="en-GB" baseline="0" dirty="0" smtClean="0"/>
+              <a:t> chosen answer and then click Submit.</a:t>
             </a:r>
+            <a:endParaRPr lang="en-GB" dirty="0" smtClean="0"/>
+          </a:p>
+          <a:p>
             <a:endParaRPr lang="en-GB" dirty="0"/>
           </a:p>
         </p:txBody>
@@ -3511,7 +3623,7 @@
           <a:p>
             <a:fld id="{CA0C9329-88FA-4F10-ACFF-58B750973BE9}" type="slidenum">
               <a:rPr lang="en-GB" smtClean="0"/>
-              <a:t>27</a:t>
+              <a:t>26</a:t>
             </a:fld>
             <a:endParaRPr lang="en-GB"/>
           </a:p>
@@ -3520,7 +3632,7 @@
     </p:spTree>
     <p:extLst>
       <p:ext uri="{BB962C8B-B14F-4D97-AF65-F5344CB8AC3E}">
-        <p14:creationId xmlns:p14="http://schemas.microsoft.com/office/powerpoint/2010/main" val="703210381"/>
+        <p14:creationId xmlns:p14="http://schemas.microsoft.com/office/powerpoint/2010/main" val="3773988263"/>
       </p:ext>
     </p:extLst>
   </p:cSld>
@@ -3576,29 +3688,15 @@
           <a:p>
             <a:r>
               <a:rPr lang="en-GB" dirty="0" smtClean="0"/>
-              <a:t>Question 7 asks what output will this</a:t>
+              <a:t>The answer</a:t>
             </a:r>
             <a:r>
               <a:rPr lang="en-GB" baseline="0" dirty="0" smtClean="0"/>
-              <a:t> Ada main program produce by using an imported C string.</a:t>
+              <a:t> was </a:t>
             </a:r>
-          </a:p>
-          <a:p>
-            <a:endParaRPr lang="en-GB" baseline="0" dirty="0" smtClean="0"/>
-          </a:p>
-          <a:p>
             <a:r>
-              <a:rPr lang="en-GB" baseline="0" dirty="0" smtClean="0"/>
-              <a:t>Will it fail to compile, output the “Hello World” string or raise PROGRAM_ERROR exception at runtime.</a:t>
-            </a:r>
-          </a:p>
-          <a:p>
-            <a:endParaRPr lang="en-GB" baseline="0" dirty="0" smtClean="0"/>
-          </a:p>
-          <a:p>
-            <a:r>
-              <a:rPr lang="en-GB" baseline="0" dirty="0" smtClean="0"/>
-              <a:t>Make your selection and click Submit to see if you are correct.</a:t>
+              <a:rPr lang="en-GB" baseline="0" dirty="0" err="1" smtClean="0"/>
+              <a:t>Interfaces.C.Subprograms</a:t>
             </a:r>
             <a:endParaRPr lang="en-GB" dirty="0"/>
           </a:p>
@@ -3621,7 +3719,7 @@
           <a:p>
             <a:fld id="{CA0C9329-88FA-4F10-ACFF-58B750973BE9}" type="slidenum">
               <a:rPr lang="en-GB" smtClean="0"/>
-              <a:t>28</a:t>
+              <a:t>27</a:t>
             </a:fld>
             <a:endParaRPr lang="en-GB"/>
           </a:p>
@@ -3630,7 +3728,7 @@
     </p:spTree>
     <p:extLst>
       <p:ext uri="{BB962C8B-B14F-4D97-AF65-F5344CB8AC3E}">
-        <p14:creationId xmlns:p14="http://schemas.microsoft.com/office/powerpoint/2010/main" val="3763494806"/>
+        <p14:creationId xmlns:p14="http://schemas.microsoft.com/office/powerpoint/2010/main" val="703210381"/>
       </p:ext>
     </p:extLst>
   </p:cSld>
@@ -3686,11 +3784,29 @@
           <a:p>
             <a:r>
               <a:rPr lang="en-GB" dirty="0" smtClean="0"/>
-              <a:t>The answer</a:t>
+              <a:t>Question 7 asks what output will this</a:t>
             </a:r>
             <a:r>
               <a:rPr lang="en-GB" baseline="0" dirty="0" smtClean="0"/>
-              <a:t> is the “Hello World” string.  As you can see it’s very easy to use C strings imported into Ada main programs.</a:t>
+              <a:t> Ada main program produce by using an imported C string.</a:t>
+            </a:r>
+          </a:p>
+          <a:p>
+            <a:endParaRPr lang="en-GB" baseline="0" dirty="0" smtClean="0"/>
+          </a:p>
+          <a:p>
+            <a:r>
+              <a:rPr lang="en-GB" baseline="0" dirty="0" smtClean="0"/>
+              <a:t>Will it fail to compile, output the “Hello World” string or raise PROGRAM_ERROR exception at runtime.</a:t>
+            </a:r>
+          </a:p>
+          <a:p>
+            <a:endParaRPr lang="en-GB" baseline="0" dirty="0" smtClean="0"/>
+          </a:p>
+          <a:p>
+            <a:r>
+              <a:rPr lang="en-GB" baseline="0" dirty="0" smtClean="0"/>
+              <a:t>Make your selection and click Submit to see if you are correct.</a:t>
             </a:r>
             <a:endParaRPr lang="en-GB" dirty="0"/>
           </a:p>
@@ -3713,7 +3829,7 @@
           <a:p>
             <a:fld id="{CA0C9329-88FA-4F10-ACFF-58B750973BE9}" type="slidenum">
               <a:rPr lang="en-GB" smtClean="0"/>
-              <a:t>29</a:t>
+              <a:t>28</a:t>
             </a:fld>
             <a:endParaRPr lang="en-GB"/>
           </a:p>
@@ -3722,7 +3838,7 @@
     </p:spTree>
     <p:extLst>
       <p:ext uri="{BB962C8B-B14F-4D97-AF65-F5344CB8AC3E}">
-        <p14:creationId xmlns:p14="http://schemas.microsoft.com/office/powerpoint/2010/main" val="3613163582"/>
+        <p14:creationId xmlns:p14="http://schemas.microsoft.com/office/powerpoint/2010/main" val="3763494806"/>
       </p:ext>
     </p:extLst>
   </p:cSld>
@@ -3778,68 +3894,12 @@
           <a:p>
             <a:r>
               <a:rPr lang="en-GB" dirty="0" smtClean="0"/>
-              <a:t>Moving onto Question 8 we see an Ada package specification exporting a constant</a:t>
+              <a:t>The answer</a:t>
             </a:r>
             <a:r>
               <a:rPr lang="en-GB" baseline="0" dirty="0" smtClean="0"/>
-              <a:t> string using the C convention,  the external name is “</a:t>
+              <a:t> is the “Hello World” string.  As you can see it’s very easy to use C strings imported into Ada main programs.</a:t>
             </a:r>
-            <a:r>
-              <a:rPr lang="en-GB" baseline="0" dirty="0" err="1" smtClean="0"/>
-              <a:t>adaString</a:t>
-            </a:r>
-            <a:r>
-              <a:rPr lang="en-GB" baseline="0" dirty="0" smtClean="0"/>
-              <a:t>”.</a:t>
-            </a:r>
-          </a:p>
-          <a:p>
-            <a:endParaRPr lang="en-GB" baseline="0" dirty="0" smtClean="0"/>
-          </a:p>
-          <a:p>
-            <a:r>
-              <a:rPr lang="en-GB" baseline="0" dirty="0" smtClean="0"/>
-              <a:t>The C main program uses an externally declared string entity called </a:t>
-            </a:r>
-            <a:r>
-              <a:rPr lang="en-GB" baseline="0" dirty="0" err="1" smtClean="0"/>
-              <a:t>adaString</a:t>
-            </a:r>
-            <a:r>
-              <a:rPr lang="en-GB" baseline="0" dirty="0" smtClean="0"/>
-              <a:t> in a call to </a:t>
-            </a:r>
-            <a:r>
-              <a:rPr lang="en-GB" baseline="0" dirty="0" err="1" smtClean="0"/>
-              <a:t>printf</a:t>
-            </a:r>
-            <a:r>
-              <a:rPr lang="en-GB" baseline="0" dirty="0" smtClean="0"/>
-              <a:t>.</a:t>
-            </a:r>
-          </a:p>
-          <a:p>
-            <a:endParaRPr lang="en-GB" baseline="0" dirty="0" smtClean="0"/>
-          </a:p>
-          <a:p>
-            <a:r>
-              <a:rPr lang="en-GB" baseline="0" dirty="0" smtClean="0"/>
-              <a:t>Will the C main program fail to compile, enter an infinite loop and never return or print the “Hello World” string ?</a:t>
-            </a:r>
-          </a:p>
-          <a:p>
-            <a:endParaRPr lang="en-GB" baseline="0" dirty="0" smtClean="0"/>
-          </a:p>
-          <a:p>
-            <a:r>
-              <a:rPr lang="en-GB" baseline="0" dirty="0" smtClean="0"/>
-              <a:t>Make your selection and then click the Submit button to check your answers</a:t>
-            </a:r>
-          </a:p>
-          <a:p>
-            <a:endParaRPr lang="en-GB" baseline="0" dirty="0" smtClean="0"/>
-          </a:p>
-          <a:p>
             <a:endParaRPr lang="en-GB" dirty="0"/>
           </a:p>
         </p:txBody>
@@ -3861,7 +3921,7 @@
           <a:p>
             <a:fld id="{CA0C9329-88FA-4F10-ACFF-58B750973BE9}" type="slidenum">
               <a:rPr lang="en-GB" smtClean="0"/>
-              <a:t>30</a:t>
+              <a:t>29</a:t>
             </a:fld>
             <a:endParaRPr lang="en-GB"/>
           </a:p>
@@ -3870,7 +3930,7 @@
     </p:spTree>
     <p:extLst>
       <p:ext uri="{BB962C8B-B14F-4D97-AF65-F5344CB8AC3E}">
-        <p14:creationId xmlns:p14="http://schemas.microsoft.com/office/powerpoint/2010/main" val="3291046513"/>
+        <p14:creationId xmlns:p14="http://schemas.microsoft.com/office/powerpoint/2010/main" val="3613163582"/>
       </p:ext>
     </p:extLst>
   </p:cSld>
@@ -4064,24 +4124,69 @@
           <a:p>
             <a:r>
               <a:rPr lang="en-GB" dirty="0" smtClean="0"/>
-              <a:t>The answer was “Hello World”.  Again it</a:t>
+              <a:t>Moving onto Question 8 we see an Ada package specification exporting a constant</a:t>
             </a:r>
             <a:r>
               <a:rPr lang="en-GB" baseline="0" dirty="0" smtClean="0"/>
-              <a:t> has been demonstrated how easy it is to use a strongly typed Ada string declaration in a C main program.</a:t>
+              <a:t> string using the C convention,  the external name is “</a:t>
             </a:r>
-          </a:p>
-          <a:p>
-            <a:endParaRPr lang="en-GB" baseline="0" dirty="0" smtClean="0"/>
-          </a:p>
-          <a:p>
+            <a:r>
+              <a:rPr lang="en-GB" baseline="0" dirty="0" err="1" smtClean="0"/>
+              <a:t>adaString</a:t>
+            </a:r>
             <a:r>
               <a:rPr lang="en-GB" baseline="0" dirty="0" smtClean="0"/>
-              <a:t>With this example you can see that declaring all your C strings within Ada packages helps introduce type safe data structures into C programs.</a:t>
+              <a:t>”.</a:t>
             </a:r>
           </a:p>
           <a:p>
             <a:endParaRPr lang="en-GB" baseline="0" dirty="0" smtClean="0"/>
+          </a:p>
+          <a:p>
+            <a:r>
+              <a:rPr lang="en-GB" baseline="0" dirty="0" smtClean="0"/>
+              <a:t>The C main program uses an externally declared string entity called </a:t>
+            </a:r>
+            <a:r>
+              <a:rPr lang="en-GB" baseline="0" dirty="0" err="1" smtClean="0"/>
+              <a:t>adaString</a:t>
+            </a:r>
+            <a:r>
+              <a:rPr lang="en-GB" baseline="0" dirty="0" smtClean="0"/>
+              <a:t> in a call to </a:t>
+            </a:r>
+            <a:r>
+              <a:rPr lang="en-GB" baseline="0" dirty="0" err="1" smtClean="0"/>
+              <a:t>printf</a:t>
+            </a:r>
+            <a:r>
+              <a:rPr lang="en-GB" baseline="0" dirty="0" smtClean="0"/>
+              <a:t>.</a:t>
+            </a:r>
+          </a:p>
+          <a:p>
+            <a:endParaRPr lang="en-GB" baseline="0" dirty="0" smtClean="0"/>
+          </a:p>
+          <a:p>
+            <a:r>
+              <a:rPr lang="en-GB" baseline="0" dirty="0" smtClean="0"/>
+              <a:t>Will the C main program fail to compile, enter an infinite loop and never return or print the “Hello World” string ?</a:t>
+            </a:r>
+          </a:p>
+          <a:p>
+            <a:endParaRPr lang="en-GB" baseline="0" dirty="0" smtClean="0"/>
+          </a:p>
+          <a:p>
+            <a:r>
+              <a:rPr lang="en-GB" baseline="0" dirty="0" smtClean="0"/>
+              <a:t>Make your selection and then click the Submit button to check your answers</a:t>
+            </a:r>
+          </a:p>
+          <a:p>
+            <a:endParaRPr lang="en-GB" baseline="0" dirty="0" smtClean="0"/>
+          </a:p>
+          <a:p>
+            <a:endParaRPr lang="en-GB" dirty="0"/>
           </a:p>
         </p:txBody>
       </p:sp>
@@ -4102,7 +4207,7 @@
           <a:p>
             <a:fld id="{CA0C9329-88FA-4F10-ACFF-58B750973BE9}" type="slidenum">
               <a:rPr lang="en-GB" smtClean="0"/>
-              <a:t>31</a:t>
+              <a:t>30</a:t>
             </a:fld>
             <a:endParaRPr lang="en-GB"/>
           </a:p>
@@ -4111,7 +4216,7 @@
     </p:spTree>
     <p:extLst>
       <p:ext uri="{BB962C8B-B14F-4D97-AF65-F5344CB8AC3E}">
-        <p14:creationId xmlns:p14="http://schemas.microsoft.com/office/powerpoint/2010/main" val="1679358850"/>
+        <p14:creationId xmlns:p14="http://schemas.microsoft.com/office/powerpoint/2010/main" val="3291046513"/>
       </p:ext>
     </p:extLst>
   </p:cSld>
@@ -4167,11 +4272,11 @@
           <a:p>
             <a:r>
               <a:rPr lang="en-GB" dirty="0" smtClean="0"/>
-              <a:t>The</a:t>
+              <a:t>The answer was “Hello World”.  Again it</a:t>
             </a:r>
             <a:r>
               <a:rPr lang="en-GB" baseline="0" dirty="0" smtClean="0"/>
-              <a:t> penultimate question again asks to identify what string output an Ada main program will produce.</a:t>
+              <a:t> has been demonstrated how easy it is to use a strongly typed Ada string declaration in a C main program.</a:t>
             </a:r>
           </a:p>
           <a:p>
@@ -4180,45 +4285,11 @@
           <a:p>
             <a:r>
               <a:rPr lang="en-GB" baseline="0" dirty="0" smtClean="0"/>
-              <a:t>Here we use data types from Interfaces.C.Strings to work with imported C functions that use char * entities.</a:t>
+              <a:t>With this example you can see that declaring all your C strings within Ada packages helps introduce type safe data structures into C programs.</a:t>
             </a:r>
           </a:p>
           <a:p>
             <a:endParaRPr lang="en-GB" baseline="0" dirty="0" smtClean="0"/>
-          </a:p>
-          <a:p>
-            <a:r>
-              <a:rPr lang="en-GB" baseline="0" dirty="0" smtClean="0"/>
-              <a:t>Interfaces.C.Strings provide various type safe subprograms for working with C strings.</a:t>
-            </a:r>
-          </a:p>
-          <a:p>
-            <a:endParaRPr lang="en-GB" baseline="0" dirty="0" smtClean="0"/>
-          </a:p>
-          <a:p>
-            <a:r>
-              <a:rPr lang="en-GB" baseline="0" dirty="0" smtClean="0"/>
-              <a:t>What do you think the output from this Ada main program will be.  </a:t>
-            </a:r>
-          </a:p>
-          <a:p>
-            <a:endParaRPr lang="en-GB" baseline="0" dirty="0" smtClean="0"/>
-          </a:p>
-          <a:p>
-            <a:r>
-              <a:rPr lang="en-GB" baseline="0" dirty="0" smtClean="0"/>
-              <a:t>Will it be the “Hello World” string, nothing due to a PROGRAM_ERROR exception or will the code fail to compile.</a:t>
-            </a:r>
-          </a:p>
-          <a:p>
-            <a:endParaRPr lang="en-GB" baseline="0" dirty="0" smtClean="0"/>
-          </a:p>
-          <a:p>
-            <a:r>
-              <a:rPr lang="en-GB" baseline="0" dirty="0" smtClean="0"/>
-              <a:t>Select your answer and click the Submit button to see if you are correct.</a:t>
-            </a:r>
-            <a:endParaRPr lang="en-GB" dirty="0"/>
           </a:p>
         </p:txBody>
       </p:sp>
@@ -4239,7 +4310,7 @@
           <a:p>
             <a:fld id="{CA0C9329-88FA-4F10-ACFF-58B750973BE9}" type="slidenum">
               <a:rPr lang="en-GB" smtClean="0"/>
-              <a:t>32</a:t>
+              <a:t>31</a:t>
             </a:fld>
             <a:endParaRPr lang="en-GB"/>
           </a:p>
@@ -4248,7 +4319,7 @@
     </p:spTree>
     <p:extLst>
       <p:ext uri="{BB962C8B-B14F-4D97-AF65-F5344CB8AC3E}">
-        <p14:creationId xmlns:p14="http://schemas.microsoft.com/office/powerpoint/2010/main" val="2626252918"/>
+        <p14:creationId xmlns:p14="http://schemas.microsoft.com/office/powerpoint/2010/main" val="1679358850"/>
       </p:ext>
     </p:extLst>
   </p:cSld>
@@ -4304,11 +4375,11 @@
           <a:p>
             <a:r>
               <a:rPr lang="en-GB" dirty="0" smtClean="0"/>
-              <a:t>The answer</a:t>
+              <a:t>The</a:t>
             </a:r>
             <a:r>
               <a:rPr lang="en-GB" baseline="0" dirty="0" smtClean="0"/>
-              <a:t> is “Hello World”.  </a:t>
+              <a:t> penultimate question again asks to identify what string output an Ada main program will produce.</a:t>
             </a:r>
           </a:p>
           <a:p>
@@ -4317,23 +4388,25 @@
           <a:p>
             <a:r>
               <a:rPr lang="en-GB" baseline="0" dirty="0" smtClean="0"/>
-              <a:t>First the </a:t>
+              <a:t>Here we use data types from Interfaces.C.Strings to work with imported C functions that use char * entities.</a:t>
             </a:r>
-            <a:r>
-              <a:rPr lang="en-GB" baseline="0" dirty="0" err="1" smtClean="0"/>
-              <a:t>char_access_array</a:t>
-            </a:r>
+          </a:p>
+          <a:p>
+            <a:endParaRPr lang="en-GB" baseline="0" dirty="0" smtClean="0"/>
+          </a:p>
+          <a:p>
             <a:r>
               <a:rPr lang="en-GB" baseline="0" dirty="0" smtClean="0"/>
-              <a:t> object returned by the imported C function is given to the </a:t>
+              <a:t>Interfaces.C.Strings provide various type safe subprograms for working with C strings.</a:t>
             </a:r>
-            <a:r>
-              <a:rPr lang="en-GB" baseline="0" dirty="0" err="1" smtClean="0"/>
-              <a:t>To_Chars_Ptr</a:t>
-            </a:r>
+          </a:p>
+          <a:p>
+            <a:endParaRPr lang="en-GB" baseline="0" dirty="0" smtClean="0"/>
+          </a:p>
+          <a:p>
             <a:r>
               <a:rPr lang="en-GB" baseline="0" dirty="0" smtClean="0"/>
-              <a:t> subprogram from Interfaces.C.Strings. </a:t>
+              <a:t>What do you think the output from this Ada main program will be.  </a:t>
             </a:r>
           </a:p>
           <a:p>
@@ -4342,21 +4415,17 @@
           <a:p>
             <a:r>
               <a:rPr lang="en-GB" baseline="0" dirty="0" smtClean="0"/>
-              <a:t> The result of this subprogram is given to Value from </a:t>
+              <a:t>Will it be the “Hello World” string, nothing due to a PROGRAM_ERROR exception or will the code fail to compile.</a:t>
             </a:r>
-            <a:r>
-              <a:rPr lang="en-GB" baseline="0" dirty="0" err="1" smtClean="0"/>
-              <a:t>Interfaces.C.String</a:t>
-            </a:r>
+          </a:p>
+          <a:p>
+            <a:endParaRPr lang="en-GB" baseline="0" dirty="0" smtClean="0"/>
+          </a:p>
+          <a:p>
             <a:r>
               <a:rPr lang="en-GB" baseline="0" dirty="0" smtClean="0"/>
-              <a:t> which will return an Ada string version of the character pointer.</a:t>
+              <a:t>Select your answer and click the Submit button to see if you are correct.</a:t>
             </a:r>
-          </a:p>
-          <a:p>
-            <a:endParaRPr lang="en-GB" baseline="0" dirty="0" smtClean="0"/>
-          </a:p>
-          <a:p>
             <a:endParaRPr lang="en-GB" dirty="0"/>
           </a:p>
         </p:txBody>
@@ -4378,7 +4447,7 @@
           <a:p>
             <a:fld id="{CA0C9329-88FA-4F10-ACFF-58B750973BE9}" type="slidenum">
               <a:rPr lang="en-GB" smtClean="0"/>
-              <a:t>33</a:t>
+              <a:t>32</a:t>
             </a:fld>
             <a:endParaRPr lang="en-GB"/>
           </a:p>
@@ -4387,7 +4456,7 @@
     </p:spTree>
     <p:extLst>
       <p:ext uri="{BB962C8B-B14F-4D97-AF65-F5344CB8AC3E}">
-        <p14:creationId xmlns:p14="http://schemas.microsoft.com/office/powerpoint/2010/main" val="60798222"/>
+        <p14:creationId xmlns:p14="http://schemas.microsoft.com/office/powerpoint/2010/main" val="2626252918"/>
       </p:ext>
     </p:extLst>
   </p:cSld>
@@ -4443,11 +4512,11 @@
           <a:p>
             <a:r>
               <a:rPr lang="en-GB" dirty="0" smtClean="0"/>
-              <a:t>Our final question continues</a:t>
+              <a:t>The answer</a:t>
             </a:r>
             <a:r>
               <a:rPr lang="en-GB" baseline="0" dirty="0" smtClean="0"/>
-              <a:t> the theme of using Interfaces.C.Strings.</a:t>
+              <a:t> is “Hello World”.  </a:t>
             </a:r>
           </a:p>
           <a:p>
@@ -4456,137 +4525,44 @@
           <a:p>
             <a:r>
               <a:rPr lang="en-GB" baseline="0" dirty="0" smtClean="0"/>
-              <a:t>This code declares a constant set of Ada strings and exports them as the C convention entity </a:t>
+              <a:t>First the </a:t>
             </a:r>
             <a:r>
               <a:rPr lang="en-GB" baseline="0" dirty="0" err="1" smtClean="0"/>
-              <a:t>someStrings</a:t>
+              <a:t>char_access_array</a:t>
             </a:r>
             <a:r>
               <a:rPr lang="en-GB" baseline="0" dirty="0" smtClean="0"/>
-              <a:t>.  The C main program uses these strings in a loop.  </a:t>
-            </a:r>
-          </a:p>
-          <a:p>
-            <a:endParaRPr lang="en-GB" baseline="0" dirty="0" smtClean="0"/>
-          </a:p>
-          <a:p>
-            <a:pPr marL="0" marR="0" indent="0" algn="l" defTabSz="914400" rtl="0" eaLnBrk="1" fontAlgn="auto" latinLnBrk="0" hangingPunct="1">
-              <a:lnSpc>
-                <a:spcPct val="100000"/>
-              </a:lnSpc>
-              <a:spcBef>
-                <a:spcPts val="0"/>
-              </a:spcBef>
-              <a:spcAft>
-                <a:spcPts val="0"/>
-              </a:spcAft>
-              <a:buClrTx/>
-              <a:buSzTx/>
-              <a:buFontTx/>
-              <a:buNone/>
-              <a:tabLst/>
-              <a:defRPr/>
-            </a:pPr>
-            <a:r>
-              <a:rPr lang="en-GB" baseline="0" dirty="0" smtClean="0"/>
-              <a:t>What do you think the output from the C main program will be.  </a:t>
-            </a:r>
-          </a:p>
-          <a:p>
-            <a:pPr marL="0" marR="0" indent="0" algn="l" defTabSz="914400" rtl="0" eaLnBrk="1" fontAlgn="auto" latinLnBrk="0" hangingPunct="1">
-              <a:lnSpc>
-                <a:spcPct val="100000"/>
-              </a:lnSpc>
-              <a:spcBef>
-                <a:spcPts val="0"/>
-              </a:spcBef>
-              <a:spcAft>
-                <a:spcPts val="0"/>
-              </a:spcAft>
-              <a:buClrTx/>
-              <a:buSzTx/>
-              <a:buFontTx/>
-              <a:buNone/>
-              <a:tabLst/>
-              <a:defRPr/>
-            </a:pPr>
-            <a:endParaRPr lang="en-GB" baseline="0" dirty="0" smtClean="0"/>
-          </a:p>
-          <a:p>
-            <a:pPr marL="0" marR="0" indent="0" algn="l" defTabSz="914400" rtl="0" eaLnBrk="1" fontAlgn="auto" latinLnBrk="0" hangingPunct="1">
-              <a:lnSpc>
-                <a:spcPct val="100000"/>
-              </a:lnSpc>
-              <a:spcBef>
-                <a:spcPts val="0"/>
-              </a:spcBef>
-              <a:spcAft>
-                <a:spcPts val="0"/>
-              </a:spcAft>
-              <a:buClrTx/>
-              <a:buSzTx/>
-              <a:buFontTx/>
-              <a:buNone/>
-              <a:tabLst/>
-              <a:defRPr/>
-            </a:pPr>
-            <a:r>
-              <a:rPr lang="en-GB" baseline="0" dirty="0" smtClean="0"/>
-              <a:t>The C code will fail to output gibberish, the Ada code will raise a CONSTRAINT_ERROR exception </a:t>
+              <a:t> object returned by the imported C function is given to the </a:t>
             </a:r>
             <a:r>
-              <a:rPr lang="en-GB" baseline="0" smtClean="0"/>
-              <a:t>at runtime, or the </a:t>
+              <a:rPr lang="en-GB" baseline="0" dirty="0" err="1" smtClean="0"/>
+              <a:t>To_Chars_Ptr</a:t>
             </a:r>
             <a:r>
               <a:rPr lang="en-GB" baseline="0" dirty="0" smtClean="0"/>
-              <a:t>“Hello World” string.</a:t>
+              <a:t> subprogram from Interfaces.C.Strings. </a:t>
             </a:r>
           </a:p>
           <a:p>
-            <a:pPr marL="0" marR="0" indent="0" algn="l" defTabSz="914400" rtl="0" eaLnBrk="1" fontAlgn="auto" latinLnBrk="0" hangingPunct="1">
-              <a:lnSpc>
-                <a:spcPct val="100000"/>
-              </a:lnSpc>
-              <a:spcBef>
-                <a:spcPts val="0"/>
-              </a:spcBef>
-              <a:spcAft>
-                <a:spcPts val="0"/>
-              </a:spcAft>
-              <a:buClrTx/>
-              <a:buSzTx/>
-              <a:buFontTx/>
-              <a:buNone/>
-              <a:tabLst/>
-              <a:defRPr/>
-            </a:pPr>
             <a:endParaRPr lang="en-GB" baseline="0" dirty="0" smtClean="0"/>
           </a:p>
           <a:p>
-            <a:pPr marL="0" marR="0" indent="0" algn="l" defTabSz="914400" rtl="0" eaLnBrk="1" fontAlgn="auto" latinLnBrk="0" hangingPunct="1">
-              <a:lnSpc>
-                <a:spcPct val="100000"/>
-              </a:lnSpc>
-              <a:spcBef>
-                <a:spcPts val="0"/>
-              </a:spcBef>
-              <a:spcAft>
-                <a:spcPts val="0"/>
-              </a:spcAft>
-              <a:buClrTx/>
-              <a:buSzTx/>
-              <a:buFontTx/>
-              <a:buNone/>
-              <a:tabLst/>
-              <a:defRPr/>
-            </a:pPr>
             <a:r>
               <a:rPr lang="en-GB" baseline="0" dirty="0" smtClean="0"/>
-              <a:t>Select your answer and click the Submit button to see if you are correct.</a:t>
+              <a:t> The result of this subprogram is given to Value from </a:t>
             </a:r>
-            <a:endParaRPr lang="en-GB" dirty="0" smtClean="0"/>
+            <a:r>
+              <a:rPr lang="en-GB" baseline="0" dirty="0" err="1" smtClean="0"/>
+              <a:t>Interfaces.C.String</a:t>
+            </a:r>
+            <a:r>
+              <a:rPr lang="en-GB" baseline="0" dirty="0" smtClean="0"/>
+              <a:t> which will return an Ada string version of the character pointer.</a:t>
+            </a:r>
+          </a:p>
+          <a:p>
+            <a:endParaRPr lang="en-GB" baseline="0" dirty="0" smtClean="0"/>
           </a:p>
           <a:p>
             <a:endParaRPr lang="en-GB" dirty="0"/>
@@ -4610,7 +4586,7 @@
           <a:p>
             <a:fld id="{CA0C9329-88FA-4F10-ACFF-58B750973BE9}" type="slidenum">
               <a:rPr lang="en-GB" smtClean="0"/>
-              <a:t>34</a:t>
+              <a:t>33</a:t>
             </a:fld>
             <a:endParaRPr lang="en-GB"/>
           </a:p>
@@ -4619,7 +4595,7 @@
     </p:spTree>
     <p:extLst>
       <p:ext uri="{BB962C8B-B14F-4D97-AF65-F5344CB8AC3E}">
-        <p14:creationId xmlns:p14="http://schemas.microsoft.com/office/powerpoint/2010/main" val="1668749155"/>
+        <p14:creationId xmlns:p14="http://schemas.microsoft.com/office/powerpoint/2010/main" val="60798222"/>
       </p:ext>
     </p:extLst>
   </p:cSld>
@@ -4675,11 +4651,11 @@
           <a:p>
             <a:r>
               <a:rPr lang="en-GB" dirty="0" smtClean="0"/>
-              <a:t>The answer was “Hello World”.  You could use this type</a:t>
+              <a:t>Our final question continues</a:t>
             </a:r>
             <a:r>
               <a:rPr lang="en-GB" baseline="0" dirty="0" smtClean="0"/>
-              <a:t> of constant Ada structure to limit the need for error prone C strings and gain the type safety of Ada Strings.</a:t>
+              <a:t> the theme of using Interfaces.C.Strings.</a:t>
             </a:r>
           </a:p>
           <a:p>
@@ -4687,13 +4663,140 @@
           </a:p>
           <a:p>
             <a:r>
-              <a:rPr lang="en-GB" dirty="0" smtClean="0"/>
-              <a:t>That concludes</a:t>
+              <a:rPr lang="en-GB" baseline="0" dirty="0" smtClean="0"/>
+              <a:t>This code declares a constant set of Ada strings and exports them as the C convention entity </a:t>
+            </a:r>
+            <a:r>
+              <a:rPr lang="en-GB" baseline="0" dirty="0" err="1" smtClean="0"/>
+              <a:t>someStrings</a:t>
             </a:r>
             <a:r>
               <a:rPr lang="en-GB" baseline="0" dirty="0" smtClean="0"/>
-              <a:t> the quiz – please click the Continue button to review your score.</a:t>
+              <a:t>.  The C main program uses these strings in a loop.  </a:t>
             </a:r>
+          </a:p>
+          <a:p>
+            <a:endParaRPr lang="en-GB" baseline="0" dirty="0" smtClean="0"/>
+          </a:p>
+          <a:p>
+            <a:pPr marL="0" marR="0" indent="0" algn="l" defTabSz="914400" rtl="0" eaLnBrk="1" fontAlgn="auto" latinLnBrk="0" hangingPunct="1">
+              <a:lnSpc>
+                <a:spcPct val="100000"/>
+              </a:lnSpc>
+              <a:spcBef>
+                <a:spcPts val="0"/>
+              </a:spcBef>
+              <a:spcAft>
+                <a:spcPts val="0"/>
+              </a:spcAft>
+              <a:buClrTx/>
+              <a:buSzTx/>
+              <a:buFontTx/>
+              <a:buNone/>
+              <a:tabLst/>
+              <a:defRPr/>
+            </a:pPr>
+            <a:r>
+              <a:rPr lang="en-GB" baseline="0" dirty="0" smtClean="0"/>
+              <a:t>What do you think the output from the C main program will be.  </a:t>
+            </a:r>
+          </a:p>
+          <a:p>
+            <a:pPr marL="0" marR="0" indent="0" algn="l" defTabSz="914400" rtl="0" eaLnBrk="1" fontAlgn="auto" latinLnBrk="0" hangingPunct="1">
+              <a:lnSpc>
+                <a:spcPct val="100000"/>
+              </a:lnSpc>
+              <a:spcBef>
+                <a:spcPts val="0"/>
+              </a:spcBef>
+              <a:spcAft>
+                <a:spcPts val="0"/>
+              </a:spcAft>
+              <a:buClrTx/>
+              <a:buSzTx/>
+              <a:buFontTx/>
+              <a:buNone/>
+              <a:tabLst/>
+              <a:defRPr/>
+            </a:pPr>
+            <a:endParaRPr lang="en-GB" baseline="0" dirty="0" smtClean="0"/>
+          </a:p>
+          <a:p>
+            <a:pPr marL="0" marR="0" indent="0" algn="l" defTabSz="914400" rtl="0" eaLnBrk="1" fontAlgn="auto" latinLnBrk="0" hangingPunct="1">
+              <a:lnSpc>
+                <a:spcPct val="100000"/>
+              </a:lnSpc>
+              <a:spcBef>
+                <a:spcPts val="0"/>
+              </a:spcBef>
+              <a:spcAft>
+                <a:spcPts val="0"/>
+              </a:spcAft>
+              <a:buClrTx/>
+              <a:buSzTx/>
+              <a:buFontTx/>
+              <a:buNone/>
+              <a:tabLst/>
+              <a:defRPr/>
+            </a:pPr>
+            <a:r>
+              <a:rPr lang="en-GB" baseline="0" dirty="0" smtClean="0"/>
+              <a:t>The C code will fail to output gibberish, the Ada code will raise a CONSTRAINT_ERROR exception </a:t>
+            </a:r>
+            <a:r>
+              <a:rPr lang="en-GB" baseline="0" smtClean="0"/>
+              <a:t>at runtime, or the </a:t>
+            </a:r>
+            <a:r>
+              <a:rPr lang="en-GB" baseline="0" dirty="0" smtClean="0"/>
+              <a:t>“Hello World” string.</a:t>
+            </a:r>
+          </a:p>
+          <a:p>
+            <a:pPr marL="0" marR="0" indent="0" algn="l" defTabSz="914400" rtl="0" eaLnBrk="1" fontAlgn="auto" latinLnBrk="0" hangingPunct="1">
+              <a:lnSpc>
+                <a:spcPct val="100000"/>
+              </a:lnSpc>
+              <a:spcBef>
+                <a:spcPts val="0"/>
+              </a:spcBef>
+              <a:spcAft>
+                <a:spcPts val="0"/>
+              </a:spcAft>
+              <a:buClrTx/>
+              <a:buSzTx/>
+              <a:buFontTx/>
+              <a:buNone/>
+              <a:tabLst/>
+              <a:defRPr/>
+            </a:pPr>
+            <a:endParaRPr lang="en-GB" baseline="0" dirty="0" smtClean="0"/>
+          </a:p>
+          <a:p>
+            <a:pPr marL="0" marR="0" indent="0" algn="l" defTabSz="914400" rtl="0" eaLnBrk="1" fontAlgn="auto" latinLnBrk="0" hangingPunct="1">
+              <a:lnSpc>
+                <a:spcPct val="100000"/>
+              </a:lnSpc>
+              <a:spcBef>
+                <a:spcPts val="0"/>
+              </a:spcBef>
+              <a:spcAft>
+                <a:spcPts val="0"/>
+              </a:spcAft>
+              <a:buClrTx/>
+              <a:buSzTx/>
+              <a:buFontTx/>
+              <a:buNone/>
+              <a:tabLst/>
+              <a:defRPr/>
+            </a:pPr>
+            <a:r>
+              <a:rPr lang="en-GB" baseline="0" dirty="0" smtClean="0"/>
+              <a:t>Select your answer and click the Submit button to see if you are correct.</a:t>
+            </a:r>
+            <a:endParaRPr lang="en-GB" dirty="0" smtClean="0"/>
+          </a:p>
+          <a:p>
             <a:endParaRPr lang="en-GB" dirty="0"/>
           </a:p>
         </p:txBody>
@@ -4715,7 +4818,7 @@
           <a:p>
             <a:fld id="{CA0C9329-88FA-4F10-ACFF-58B750973BE9}" type="slidenum">
               <a:rPr lang="en-GB" smtClean="0"/>
-              <a:t>35</a:t>
+              <a:t>34</a:t>
             </a:fld>
             <a:endParaRPr lang="en-GB"/>
           </a:p>
@@ -4724,7 +4827,7 @@
     </p:spTree>
     <p:extLst>
       <p:ext uri="{BB962C8B-B14F-4D97-AF65-F5344CB8AC3E}">
-        <p14:creationId xmlns:p14="http://schemas.microsoft.com/office/powerpoint/2010/main" val="1072193605"/>
+        <p14:creationId xmlns:p14="http://schemas.microsoft.com/office/powerpoint/2010/main" val="1668749155"/>
       </p:ext>
     </p:extLst>
   </p:cSld>
@@ -4779,6 +4882,111 @@
           <a:lstStyle/>
           <a:p>
             <a:r>
+              <a:rPr lang="en-GB" dirty="0" smtClean="0"/>
+              <a:t>The answer was “Hello World”.  You could use this type</a:t>
+            </a:r>
+            <a:r>
+              <a:rPr lang="en-GB" baseline="0" dirty="0" smtClean="0"/>
+              <a:t> of constant Ada structure to limit the need for error prone C strings and gain the type safety of Ada Strings.</a:t>
+            </a:r>
+          </a:p>
+          <a:p>
+            <a:endParaRPr lang="en-GB" baseline="0" dirty="0" smtClean="0"/>
+          </a:p>
+          <a:p>
+            <a:r>
+              <a:rPr lang="en-GB" dirty="0" smtClean="0"/>
+              <a:t>That concludes</a:t>
+            </a:r>
+            <a:r>
+              <a:rPr lang="en-GB" baseline="0" dirty="0" smtClean="0"/>
+              <a:t> the quiz – please click the Continue button to review your score.</a:t>
+            </a:r>
+            <a:endParaRPr lang="en-GB" dirty="0"/>
+          </a:p>
+        </p:txBody>
+      </p:sp>
+      <p:sp>
+        <p:nvSpPr>
+          <p:cNvPr id="4" name="Slide Number Placeholder 3"/>
+          <p:cNvSpPr>
+            <a:spLocks noGrp="1"/>
+          </p:cNvSpPr>
+          <p:nvPr>
+            <p:ph type="sldNum" sz="quarter" idx="10"/>
+          </p:nvPr>
+        </p:nvSpPr>
+        <p:spPr/>
+        <p:txBody>
+          <a:bodyPr/>
+          <a:lstStyle/>
+          <a:p>
+            <a:fld id="{CA0C9329-88FA-4F10-ACFF-58B750973BE9}" type="slidenum">
+              <a:rPr lang="en-GB" smtClean="0"/>
+              <a:t>35</a:t>
+            </a:fld>
+            <a:endParaRPr lang="en-GB"/>
+          </a:p>
+        </p:txBody>
+      </p:sp>
+    </p:spTree>
+    <p:extLst>
+      <p:ext uri="{BB962C8B-B14F-4D97-AF65-F5344CB8AC3E}">
+        <p14:creationId xmlns:p14="http://schemas.microsoft.com/office/powerpoint/2010/main" val="1072193605"/>
+      </p:ext>
+    </p:extLst>
+  </p:cSld>
+  <p:clrMapOvr>
+    <a:masterClrMapping/>
+  </p:clrMapOvr>
+</p:notes>
+</file>
+
+<file path=ppt/notesSlides/notesSlide36.xml><?xml version="1.0" encoding="utf-8"?>
+<p:notes xmlns:a="http://schemas.openxmlformats.org/drawingml/2006/main" xmlns:r="http://schemas.openxmlformats.org/officeDocument/2006/relationships" xmlns:p="http://schemas.openxmlformats.org/presentationml/2006/main">
+  <p:cSld>
+    <p:spTree>
+      <p:nvGrpSpPr>
+        <p:cNvPr id="1" name=""/>
+        <p:cNvGrpSpPr/>
+        <p:nvPr/>
+      </p:nvGrpSpPr>
+      <p:grpSpPr>
+        <a:xfrm>
+          <a:off x="0" y="0"/>
+          <a:ext cx="0" cy="0"/>
+          <a:chOff x="0" y="0"/>
+          <a:chExt cx="0" cy="0"/>
+        </a:xfrm>
+      </p:grpSpPr>
+      <p:sp>
+        <p:nvSpPr>
+          <p:cNvPr id="2" name="Slide Image Placeholder 1"/>
+          <p:cNvSpPr>
+            <a:spLocks noGrp="1" noRot="1" noChangeAspect="1"/>
+          </p:cNvSpPr>
+          <p:nvPr>
+            <p:ph type="sldImg"/>
+          </p:nvPr>
+        </p:nvSpPr>
+        <p:spPr/>
+      </p:sp>
+      <p:sp>
+        <p:nvSpPr>
+          <p:cNvPr id="3" name="Notes Placeholder 2"/>
+          <p:cNvSpPr>
+            <a:spLocks noGrp="1"/>
+          </p:cNvSpPr>
+          <p:nvPr>
+            <p:ph type="body" idx="1"/>
+          </p:nvPr>
+        </p:nvSpPr>
+        <p:spPr/>
+        <p:txBody>
+          <a:bodyPr/>
+          <a:lstStyle/>
+          <a:p>
+            <a:r>
               <a:rPr lang="en-GB" altLang="en-US" dirty="0" smtClean="0">
                 <a:ea typeface="ＭＳ Ｐゴシック" panose="020B0600070205080204" pitchFamily="34" charset="-128"/>
               </a:rPr>
@@ -4864,7 +5072,7 @@
 </p:notes>
 </file>
 
-<file path=ppt/notesSlides/notesSlide36.xml><?xml version="1.0" encoding="utf-8"?>
+<file path=ppt/notesSlides/notesSlide37.xml><?xml version="1.0" encoding="utf-8"?>
 <p:notes xmlns:a="http://schemas.openxmlformats.org/drawingml/2006/main" xmlns:r="http://schemas.openxmlformats.org/officeDocument/2006/relationships" xmlns:p="http://schemas.openxmlformats.org/presentationml/2006/main">
   <p:cSld>
     <p:spTree>
@@ -17790,25 +17998,1144 @@
           </a:p>
         </p:txBody>
       </p:sp>
-      <p:sp>
-        <p:nvSpPr>
-          <p:cNvPr id="3" name="Content Placeholder 2"/>
-          <p:cNvSpPr>
-            <a:spLocks noGrp="1"/>
-          </p:cNvSpPr>
+      <p:graphicFrame>
+        <p:nvGraphicFramePr>
+          <p:cNvPr id="4" name="Tableau 4"/>
+          <p:cNvGraphicFramePr>
+            <a:graphicFrameLocks noGrp="1"/>
+          </p:cNvGraphicFramePr>
           <p:nvPr>
-            <p:ph sz="half" idx="10"/>
+            <p:extLst>
+              <p:ext uri="{D42A27DB-BD31-4B8C-83A1-F6EECF244321}">
+                <p14:modId xmlns:p14="http://schemas.microsoft.com/office/powerpoint/2010/main" val="294276745"/>
+              </p:ext>
+            </p:extLst>
           </p:nvPr>
-        </p:nvSpPr>
-        <p:spPr/>
-        <p:txBody>
-          <a:bodyPr/>
-          <a:lstStyle/>
-          <a:p>
-            <a:endParaRPr lang="en-GB"/>
-          </a:p>
-        </p:txBody>
-      </p:sp>
+        </p:nvGraphicFramePr>
+        <p:xfrm>
+          <a:off x="2969817" y="764704"/>
+          <a:ext cx="3416915" cy="1466164"/>
+        </p:xfrm>
+        <a:graphic>
+          <a:graphicData uri="http://schemas.openxmlformats.org/drawingml/2006/table">
+            <a:tbl>
+              <a:tblPr firstRow="1" bandRow="1">
+                <a:tableStyleId>{5C22544A-7EE6-4342-B048-85BDC9FD1C3A}</a:tableStyleId>
+              </a:tblPr>
+              <a:tblGrid>
+                <a:gridCol w="3416915"/>
+              </a:tblGrid>
+              <a:tr h="1466164">
+                <a:tc>
+                  <a:txBody>
+                    <a:bodyPr/>
+                    <a:lstStyle/>
+                    <a:p>
+                      <a:pPr marL="0" marR="0" indent="0" algn="l" defTabSz="914400" rtl="0" eaLnBrk="1" fontAlgn="auto" latinLnBrk="0" hangingPunct="1">
+                        <a:lnSpc>
+                          <a:spcPct val="100000"/>
+                        </a:lnSpc>
+                        <a:spcBef>
+                          <a:spcPts val="0"/>
+                        </a:spcBef>
+                        <a:spcAft>
+                          <a:spcPts val="0"/>
+                        </a:spcAft>
+                        <a:buClrTx/>
+                        <a:buSzTx/>
+                        <a:buFontTx/>
+                        <a:buNone/>
+                        <a:tabLst/>
+                        <a:defRPr/>
+                      </a:pPr>
+                      <a:r>
+                        <a:rPr lang="en-GB" sz="1100" b="1" baseline="0" dirty="0" smtClean="0">
+                          <a:solidFill>
+                            <a:schemeClr val="tx1"/>
+                          </a:solidFill>
+                          <a:latin typeface="Courier New" pitchFamily="49" charset="0"/>
+                        </a:rPr>
+                        <a:t>/* </a:t>
+                      </a:r>
+                      <a:r>
+                        <a:rPr lang="en-GB" sz="1100" b="1" baseline="0" dirty="0" err="1" smtClean="0">
+                          <a:solidFill>
+                            <a:schemeClr val="tx1"/>
+                          </a:solidFill>
+                          <a:latin typeface="Courier New" pitchFamily="49" charset="0"/>
+                        </a:rPr>
+                        <a:t>clib.h</a:t>
+                      </a:r>
+                      <a:r>
+                        <a:rPr lang="en-GB" sz="1100" b="1" baseline="0" dirty="0" smtClean="0">
+                          <a:solidFill>
+                            <a:schemeClr val="tx1"/>
+                          </a:solidFill>
+                          <a:latin typeface="Courier New" pitchFamily="49" charset="0"/>
+                        </a:rPr>
+                        <a:t> */</a:t>
+                      </a:r>
+                    </a:p>
+                    <a:p>
+                      <a:pPr marL="0" marR="0" indent="0" algn="l" defTabSz="914400" rtl="0" eaLnBrk="1" fontAlgn="auto" latinLnBrk="0" hangingPunct="1">
+                        <a:lnSpc>
+                          <a:spcPct val="100000"/>
+                        </a:lnSpc>
+                        <a:spcBef>
+                          <a:spcPts val="0"/>
+                        </a:spcBef>
+                        <a:spcAft>
+                          <a:spcPts val="0"/>
+                        </a:spcAft>
+                        <a:buClrTx/>
+                        <a:buSzTx/>
+                        <a:buFontTx/>
+                        <a:buNone/>
+                        <a:tabLst/>
+                        <a:defRPr/>
+                      </a:pPr>
+                      <a:r>
+                        <a:rPr lang="en-GB" sz="1100" b="1" baseline="0" dirty="0" smtClean="0">
+                          <a:solidFill>
+                            <a:schemeClr val="tx1"/>
+                          </a:solidFill>
+                          <a:latin typeface="Courier New" pitchFamily="49" charset="0"/>
+                        </a:rPr>
+                        <a:t>#include &lt;</a:t>
+                      </a:r>
+                      <a:r>
+                        <a:rPr lang="en-GB" sz="1100" b="1" baseline="0" dirty="0" err="1" smtClean="0">
+                          <a:solidFill>
+                            <a:schemeClr val="tx1"/>
+                          </a:solidFill>
+                          <a:latin typeface="Courier New" pitchFamily="49" charset="0"/>
+                        </a:rPr>
+                        <a:t>stdio.h</a:t>
+                      </a:r>
+                      <a:r>
+                        <a:rPr lang="en-GB" sz="1100" b="1" baseline="0" dirty="0" smtClean="0">
+                          <a:solidFill>
+                            <a:schemeClr val="tx1"/>
+                          </a:solidFill>
+                          <a:latin typeface="Courier New" pitchFamily="49" charset="0"/>
+                        </a:rPr>
+                        <a:t>&gt;</a:t>
+                      </a:r>
+                    </a:p>
+                    <a:p>
+                      <a:pPr marL="0" marR="0" indent="0" algn="l" defTabSz="914400" rtl="0" eaLnBrk="1" fontAlgn="auto" latinLnBrk="0" hangingPunct="1">
+                        <a:lnSpc>
+                          <a:spcPct val="100000"/>
+                        </a:lnSpc>
+                        <a:spcBef>
+                          <a:spcPts val="0"/>
+                        </a:spcBef>
+                        <a:spcAft>
+                          <a:spcPts val="0"/>
+                        </a:spcAft>
+                        <a:buClrTx/>
+                        <a:buSzTx/>
+                        <a:buFontTx/>
+                        <a:buNone/>
+                        <a:tabLst/>
+                        <a:defRPr/>
+                      </a:pPr>
+                      <a:endParaRPr lang="en-GB" sz="1100" b="1" baseline="0" dirty="0" smtClean="0">
+                        <a:solidFill>
+                          <a:schemeClr val="tx1"/>
+                        </a:solidFill>
+                        <a:latin typeface="Courier New" pitchFamily="49" charset="0"/>
+                      </a:endParaRPr>
+                    </a:p>
+                    <a:p>
+                      <a:pPr marL="0" marR="0" indent="0" algn="l" defTabSz="914400" rtl="0" eaLnBrk="1" fontAlgn="auto" latinLnBrk="0" hangingPunct="1">
+                        <a:lnSpc>
+                          <a:spcPct val="100000"/>
+                        </a:lnSpc>
+                        <a:spcBef>
+                          <a:spcPts val="0"/>
+                        </a:spcBef>
+                        <a:spcAft>
+                          <a:spcPts val="0"/>
+                        </a:spcAft>
+                        <a:buClrTx/>
+                        <a:buSzTx/>
+                        <a:buFontTx/>
+                        <a:buNone/>
+                        <a:tabLst/>
+                        <a:defRPr/>
+                      </a:pPr>
+                      <a:r>
+                        <a:rPr lang="en-GB" sz="1100" b="1" baseline="0" dirty="0" smtClean="0">
+                          <a:solidFill>
+                            <a:schemeClr val="tx1"/>
+                          </a:solidFill>
+                          <a:latin typeface="Courier New" pitchFamily="49" charset="0"/>
+                        </a:rPr>
+                        <a:t>void function1(void* x);</a:t>
+                      </a:r>
+                    </a:p>
+                    <a:p>
+                      <a:pPr marL="0" marR="0" indent="0" algn="l" defTabSz="914400" rtl="0" eaLnBrk="1" fontAlgn="auto" latinLnBrk="0" hangingPunct="1">
+                        <a:lnSpc>
+                          <a:spcPct val="100000"/>
+                        </a:lnSpc>
+                        <a:spcBef>
+                          <a:spcPts val="0"/>
+                        </a:spcBef>
+                        <a:spcAft>
+                          <a:spcPts val="0"/>
+                        </a:spcAft>
+                        <a:buClrTx/>
+                        <a:buSzTx/>
+                        <a:buFontTx/>
+                        <a:buNone/>
+                        <a:tabLst/>
+                        <a:defRPr/>
+                      </a:pPr>
+                      <a:endParaRPr lang="en-GB" sz="1100" b="1" baseline="0" dirty="0" smtClean="0">
+                        <a:solidFill>
+                          <a:schemeClr val="tx1"/>
+                        </a:solidFill>
+                        <a:latin typeface="Courier New" pitchFamily="49" charset="0"/>
+                      </a:endParaRPr>
+                    </a:p>
+                    <a:p>
+                      <a:pPr marL="0" marR="0" indent="0" algn="l" defTabSz="914400" rtl="0" eaLnBrk="1" fontAlgn="auto" latinLnBrk="0" hangingPunct="1">
+                        <a:lnSpc>
+                          <a:spcPct val="100000"/>
+                        </a:lnSpc>
+                        <a:spcBef>
+                          <a:spcPts val="0"/>
+                        </a:spcBef>
+                        <a:spcAft>
+                          <a:spcPts val="0"/>
+                        </a:spcAft>
+                        <a:buClrTx/>
+                        <a:buSzTx/>
+                        <a:buFontTx/>
+                        <a:buNone/>
+                        <a:tabLst/>
+                        <a:defRPr/>
+                      </a:pPr>
+                      <a:r>
+                        <a:rPr lang="en-GB" sz="1100" b="1" baseline="0" dirty="0" smtClean="0">
+                          <a:solidFill>
+                            <a:schemeClr val="tx1"/>
+                          </a:solidFill>
+                          <a:latin typeface="Courier New" pitchFamily="49" charset="0"/>
+                        </a:rPr>
+                        <a:t>void* function2(void);</a:t>
+                      </a:r>
+                    </a:p>
+                    <a:p>
+                      <a:pPr marL="0" marR="0" indent="0" algn="l" defTabSz="914400" rtl="0" eaLnBrk="1" fontAlgn="auto" latinLnBrk="0" hangingPunct="1">
+                        <a:lnSpc>
+                          <a:spcPct val="100000"/>
+                        </a:lnSpc>
+                        <a:spcBef>
+                          <a:spcPts val="0"/>
+                        </a:spcBef>
+                        <a:spcAft>
+                          <a:spcPts val="0"/>
+                        </a:spcAft>
+                        <a:buClrTx/>
+                        <a:buSzTx/>
+                        <a:buFontTx/>
+                        <a:buNone/>
+                        <a:tabLst/>
+                        <a:defRPr/>
+                      </a:pPr>
+                      <a:endParaRPr lang="en-GB" sz="1100" b="1" baseline="0" dirty="0" smtClean="0">
+                        <a:solidFill>
+                          <a:schemeClr val="tx1"/>
+                        </a:solidFill>
+                        <a:latin typeface="Courier New" pitchFamily="49" charset="0"/>
+                      </a:endParaRPr>
+                    </a:p>
+                    <a:p>
+                      <a:pPr marL="0" marR="0" indent="0" algn="l" defTabSz="914400" rtl="0" eaLnBrk="1" fontAlgn="auto" latinLnBrk="0" hangingPunct="1">
+                        <a:lnSpc>
+                          <a:spcPct val="100000"/>
+                        </a:lnSpc>
+                        <a:spcBef>
+                          <a:spcPts val="0"/>
+                        </a:spcBef>
+                        <a:spcAft>
+                          <a:spcPts val="0"/>
+                        </a:spcAft>
+                        <a:buClrTx/>
+                        <a:buSzTx/>
+                        <a:buFontTx/>
+                        <a:buNone/>
+                        <a:tabLst/>
+                        <a:defRPr/>
+                      </a:pPr>
+                      <a:r>
+                        <a:rPr lang="en-GB" sz="1100" b="1" baseline="0" dirty="0" smtClean="0">
+                          <a:solidFill>
+                            <a:schemeClr val="tx1"/>
+                          </a:solidFill>
+                          <a:latin typeface="Courier New" pitchFamily="49" charset="0"/>
+                        </a:rPr>
+                        <a:t>char* function3(char** j);</a:t>
+                      </a:r>
+                      <a:endParaRPr lang="en-GB" sz="1100" b="1" baseline="0" dirty="0" smtClean="0">
+                        <a:solidFill>
+                          <a:schemeClr val="tx1"/>
+                        </a:solidFill>
+                        <a:latin typeface="Courier New" pitchFamily="49" charset="0"/>
+                      </a:endParaRPr>
+                    </a:p>
+                  </a:txBody>
+                  <a:tcPr marL="91413" marR="91413" marT="45445" marB="45445">
+                    <a:solidFill>
+                      <a:schemeClr val="bg1">
+                        <a:lumMod val="95000"/>
+                      </a:schemeClr>
+                    </a:solidFill>
+                  </a:tcPr>
+                </a:tc>
+              </a:tr>
+            </a:tbl>
+          </a:graphicData>
+        </a:graphic>
+      </p:graphicFrame>
+      <p:graphicFrame>
+        <p:nvGraphicFramePr>
+          <p:cNvPr id="5" name="Tableau 4"/>
+          <p:cNvGraphicFramePr>
+            <a:graphicFrameLocks noGrp="1"/>
+          </p:cNvGraphicFramePr>
+          <p:nvPr>
+            <p:extLst>
+              <p:ext uri="{D42A27DB-BD31-4B8C-83A1-F6EECF244321}">
+                <p14:modId xmlns:p14="http://schemas.microsoft.com/office/powerpoint/2010/main" val="1628412884"/>
+              </p:ext>
+            </p:extLst>
+          </p:nvPr>
+        </p:nvGraphicFramePr>
+        <p:xfrm>
+          <a:off x="2672862" y="2447778"/>
+          <a:ext cx="3910819" cy="422031"/>
+        </p:xfrm>
+        <a:graphic>
+          <a:graphicData uri="http://schemas.openxmlformats.org/drawingml/2006/table">
+            <a:tbl>
+              <a:tblPr firstRow="1" bandRow="1">
+                <a:tableStyleId>{5C22544A-7EE6-4342-B048-85BDC9FD1C3A}</a:tableStyleId>
+              </a:tblPr>
+              <a:tblGrid>
+                <a:gridCol w="3910819"/>
+              </a:tblGrid>
+              <a:tr h="422031">
+                <a:tc>
+                  <a:txBody>
+                    <a:bodyPr/>
+                    <a:lstStyle/>
+                    <a:p>
+                      <a:pPr marL="0" marR="0" indent="0" algn="ctr" defTabSz="914400" rtl="0" eaLnBrk="1" fontAlgn="auto" latinLnBrk="0" hangingPunct="1">
+                        <a:lnSpc>
+                          <a:spcPct val="100000"/>
+                        </a:lnSpc>
+                        <a:spcBef>
+                          <a:spcPts val="0"/>
+                        </a:spcBef>
+                        <a:spcAft>
+                          <a:spcPts val="0"/>
+                        </a:spcAft>
+                        <a:buClrTx/>
+                        <a:buSzTx/>
+                        <a:buFontTx/>
+                        <a:buNone/>
+                        <a:tabLst/>
+                        <a:defRPr/>
+                      </a:pPr>
+                      <a:r>
+                        <a:rPr lang="en-GB" sz="1100" b="1" baseline="0" dirty="0" smtClean="0">
+                          <a:solidFill>
+                            <a:schemeClr val="tx1"/>
+                          </a:solidFill>
+                          <a:latin typeface="Courier New" pitchFamily="49" charset="0"/>
+                        </a:rPr>
+                        <a:t>$ </a:t>
+                      </a:r>
+                      <a:r>
+                        <a:rPr lang="en-GB" sz="1100" b="1" baseline="0" dirty="0" err="1" smtClean="0">
+                          <a:solidFill>
+                            <a:schemeClr val="tx1"/>
+                          </a:solidFill>
+                          <a:latin typeface="Courier New" pitchFamily="49" charset="0"/>
+                        </a:rPr>
+                        <a:t>gcc</a:t>
+                      </a:r>
+                      <a:r>
+                        <a:rPr lang="en-GB" sz="1100" b="1" baseline="0" dirty="0" smtClean="0">
+                          <a:solidFill>
+                            <a:schemeClr val="tx1"/>
+                          </a:solidFill>
+                          <a:latin typeface="Courier New" pitchFamily="49" charset="0"/>
+                        </a:rPr>
+                        <a:t> –</a:t>
+                      </a:r>
+                      <a:r>
+                        <a:rPr lang="en-GB" sz="1100" b="1" baseline="0" dirty="0" err="1" smtClean="0">
+                          <a:solidFill>
+                            <a:schemeClr val="tx1"/>
+                          </a:solidFill>
+                          <a:latin typeface="Courier New" pitchFamily="49" charset="0"/>
+                        </a:rPr>
+                        <a:t>fdump</a:t>
+                      </a:r>
+                      <a:r>
+                        <a:rPr lang="en-GB" sz="1100" b="1" baseline="0" dirty="0" smtClean="0">
+                          <a:solidFill>
+                            <a:schemeClr val="tx1"/>
+                          </a:solidFill>
+                          <a:latin typeface="Courier New" pitchFamily="49" charset="0"/>
+                        </a:rPr>
+                        <a:t>-</a:t>
+                      </a:r>
+                      <a:r>
+                        <a:rPr lang="en-GB" sz="1100" b="1" baseline="0" dirty="0" err="1" smtClean="0">
+                          <a:solidFill>
+                            <a:schemeClr val="tx1"/>
+                          </a:solidFill>
+                          <a:latin typeface="Courier New" pitchFamily="49" charset="0"/>
+                        </a:rPr>
+                        <a:t>ada</a:t>
+                      </a:r>
+                      <a:r>
+                        <a:rPr lang="en-GB" sz="1100" b="1" baseline="0" dirty="0" smtClean="0">
+                          <a:solidFill>
+                            <a:schemeClr val="tx1"/>
+                          </a:solidFill>
+                          <a:latin typeface="Courier New" pitchFamily="49" charset="0"/>
+                        </a:rPr>
+                        <a:t>-spec –C </a:t>
+                      </a:r>
+                      <a:r>
+                        <a:rPr lang="en-GB" sz="1100" b="1" baseline="0" dirty="0" err="1" smtClean="0">
+                          <a:solidFill>
+                            <a:schemeClr val="tx1"/>
+                          </a:solidFill>
+                          <a:latin typeface="Courier New" pitchFamily="49" charset="0"/>
+                        </a:rPr>
+                        <a:t>clib.h</a:t>
+                      </a:r>
+                      <a:endParaRPr lang="en-GB" sz="1100" b="1" baseline="0" dirty="0" smtClean="0">
+                        <a:solidFill>
+                          <a:schemeClr val="tx1"/>
+                        </a:solidFill>
+                        <a:latin typeface="Courier New" pitchFamily="49" charset="0"/>
+                      </a:endParaRPr>
+                    </a:p>
+                  </a:txBody>
+                  <a:tcPr marL="91413" marR="91413" marT="45445" marB="45445" anchor="ctr">
+                    <a:solidFill>
+                      <a:schemeClr val="bg1">
+                        <a:lumMod val="95000"/>
+                      </a:schemeClr>
+                    </a:solidFill>
+                  </a:tcPr>
+                </a:tc>
+              </a:tr>
+            </a:tbl>
+          </a:graphicData>
+        </a:graphic>
+      </p:graphicFrame>
+      <p:graphicFrame>
+        <p:nvGraphicFramePr>
+          <p:cNvPr id="13" name="Tableau 4"/>
+          <p:cNvGraphicFramePr>
+            <a:graphicFrameLocks noGrp="1"/>
+          </p:cNvGraphicFramePr>
+          <p:nvPr>
+            <p:extLst>
+              <p:ext uri="{D42A27DB-BD31-4B8C-83A1-F6EECF244321}">
+                <p14:modId xmlns:p14="http://schemas.microsoft.com/office/powerpoint/2010/main" val="3456766294"/>
+              </p:ext>
+            </p:extLst>
+          </p:nvPr>
+        </p:nvGraphicFramePr>
+        <p:xfrm>
+          <a:off x="422031" y="3047221"/>
+          <a:ext cx="8384344" cy="3276050"/>
+        </p:xfrm>
+        <a:graphic>
+          <a:graphicData uri="http://schemas.openxmlformats.org/drawingml/2006/table">
+            <a:tbl>
+              <a:tblPr firstRow="1" bandRow="1">
+                <a:tableStyleId>{5C22544A-7EE6-4342-B048-85BDC9FD1C3A}</a:tableStyleId>
+              </a:tblPr>
+              <a:tblGrid>
+                <a:gridCol w="8384344"/>
+              </a:tblGrid>
+              <a:tr h="2284435">
+                <a:tc>
+                  <a:txBody>
+                    <a:bodyPr/>
+                    <a:lstStyle/>
+                    <a:p>
+                      <a:pPr marL="0" marR="0" indent="0" algn="l" defTabSz="914400" rtl="0" eaLnBrk="1" fontAlgn="auto" latinLnBrk="0" hangingPunct="1">
+                        <a:lnSpc>
+                          <a:spcPct val="100000"/>
+                        </a:lnSpc>
+                        <a:spcBef>
+                          <a:spcPts val="0"/>
+                        </a:spcBef>
+                        <a:spcAft>
+                          <a:spcPts val="0"/>
+                        </a:spcAft>
+                        <a:buClrTx/>
+                        <a:buSzTx/>
+                        <a:buFontTx/>
+                        <a:buNone/>
+                        <a:tabLst/>
+                        <a:defRPr/>
+                      </a:pPr>
+                      <a:r>
+                        <a:rPr lang="en-GB" sz="1100" b="1" baseline="0" dirty="0" smtClean="0">
+                          <a:solidFill>
+                            <a:schemeClr val="tx1"/>
+                          </a:solidFill>
+                          <a:latin typeface="Courier New" pitchFamily="49" charset="0"/>
+                        </a:rPr>
+                        <a:t>pragma Ada_2005;</a:t>
+                      </a:r>
+                    </a:p>
+                    <a:p>
+                      <a:pPr marL="0" marR="0" indent="0" algn="l" defTabSz="914400" rtl="0" eaLnBrk="1" fontAlgn="auto" latinLnBrk="0" hangingPunct="1">
+                        <a:lnSpc>
+                          <a:spcPct val="100000"/>
+                        </a:lnSpc>
+                        <a:spcBef>
+                          <a:spcPts val="0"/>
+                        </a:spcBef>
+                        <a:spcAft>
+                          <a:spcPts val="0"/>
+                        </a:spcAft>
+                        <a:buClrTx/>
+                        <a:buSzTx/>
+                        <a:buFontTx/>
+                        <a:buNone/>
+                        <a:tabLst/>
+                        <a:defRPr/>
+                      </a:pPr>
+                      <a:r>
+                        <a:rPr lang="en-GB" sz="1100" b="1" baseline="0" dirty="0" smtClean="0">
+                          <a:solidFill>
+                            <a:schemeClr val="tx1"/>
+                          </a:solidFill>
+                          <a:latin typeface="Courier New" pitchFamily="49" charset="0"/>
+                        </a:rPr>
+                        <a:t>pragma </a:t>
+                      </a:r>
+                      <a:r>
+                        <a:rPr lang="en-GB" sz="1100" b="1" baseline="0" dirty="0" err="1" smtClean="0">
+                          <a:solidFill>
+                            <a:schemeClr val="tx1"/>
+                          </a:solidFill>
+                          <a:latin typeface="Courier New" pitchFamily="49" charset="0"/>
+                        </a:rPr>
+                        <a:t>Style_Checks</a:t>
+                      </a:r>
+                      <a:r>
+                        <a:rPr lang="en-GB" sz="1100" b="1" baseline="0" dirty="0" smtClean="0">
+                          <a:solidFill>
+                            <a:schemeClr val="tx1"/>
+                          </a:solidFill>
+                          <a:latin typeface="Courier New" pitchFamily="49" charset="0"/>
+                        </a:rPr>
+                        <a:t> (Off);</a:t>
+                      </a:r>
+                    </a:p>
+                    <a:p>
+                      <a:pPr marL="0" marR="0" indent="0" algn="l" defTabSz="914400" rtl="0" eaLnBrk="1" fontAlgn="auto" latinLnBrk="0" hangingPunct="1">
+                        <a:lnSpc>
+                          <a:spcPct val="100000"/>
+                        </a:lnSpc>
+                        <a:spcBef>
+                          <a:spcPts val="0"/>
+                        </a:spcBef>
+                        <a:spcAft>
+                          <a:spcPts val="0"/>
+                        </a:spcAft>
+                        <a:buClrTx/>
+                        <a:buSzTx/>
+                        <a:buFontTx/>
+                        <a:buNone/>
+                        <a:tabLst/>
+                        <a:defRPr/>
+                      </a:pPr>
+                      <a:endParaRPr lang="en-GB" sz="1100" b="1" baseline="0" dirty="0" smtClean="0">
+                        <a:solidFill>
+                          <a:schemeClr val="tx1"/>
+                        </a:solidFill>
+                        <a:latin typeface="Courier New" pitchFamily="49" charset="0"/>
+                      </a:endParaRPr>
+                    </a:p>
+                    <a:p>
+                      <a:pPr marL="0" marR="0" indent="0" algn="l" defTabSz="914400" rtl="0" eaLnBrk="1" fontAlgn="auto" latinLnBrk="0" hangingPunct="1">
+                        <a:lnSpc>
+                          <a:spcPct val="100000"/>
+                        </a:lnSpc>
+                        <a:spcBef>
+                          <a:spcPts val="0"/>
+                        </a:spcBef>
+                        <a:spcAft>
+                          <a:spcPts val="0"/>
+                        </a:spcAft>
+                        <a:buClrTx/>
+                        <a:buSzTx/>
+                        <a:buFontTx/>
+                        <a:buNone/>
+                        <a:tabLst/>
+                        <a:defRPr/>
+                      </a:pPr>
+                      <a:r>
+                        <a:rPr lang="en-GB" sz="1100" b="1" baseline="0" dirty="0" smtClean="0">
+                          <a:solidFill>
+                            <a:schemeClr val="tx1"/>
+                          </a:solidFill>
+                          <a:latin typeface="Courier New" pitchFamily="49" charset="0"/>
+                        </a:rPr>
+                        <a:t>with Interfaces.C; use Interfaces.C;</a:t>
+                      </a:r>
+                    </a:p>
+                    <a:p>
+                      <a:pPr marL="0" marR="0" indent="0" algn="l" defTabSz="914400" rtl="0" eaLnBrk="1" fontAlgn="auto" latinLnBrk="0" hangingPunct="1">
+                        <a:lnSpc>
+                          <a:spcPct val="100000"/>
+                        </a:lnSpc>
+                        <a:spcBef>
+                          <a:spcPts val="0"/>
+                        </a:spcBef>
+                        <a:spcAft>
+                          <a:spcPts val="0"/>
+                        </a:spcAft>
+                        <a:buClrTx/>
+                        <a:buSzTx/>
+                        <a:buFontTx/>
+                        <a:buNone/>
+                        <a:tabLst/>
+                        <a:defRPr/>
+                      </a:pPr>
+                      <a:r>
+                        <a:rPr lang="en-GB" sz="1100" b="1" baseline="0" dirty="0" smtClean="0">
+                          <a:solidFill>
+                            <a:schemeClr val="tx1"/>
+                          </a:solidFill>
+                          <a:latin typeface="Courier New" pitchFamily="49" charset="0"/>
+                        </a:rPr>
+                        <a:t>with System;</a:t>
+                      </a:r>
+                    </a:p>
+                    <a:p>
+                      <a:pPr marL="0" marR="0" indent="0" algn="l" defTabSz="914400" rtl="0" eaLnBrk="1" fontAlgn="auto" latinLnBrk="0" hangingPunct="1">
+                        <a:lnSpc>
+                          <a:spcPct val="100000"/>
+                        </a:lnSpc>
+                        <a:spcBef>
+                          <a:spcPts val="0"/>
+                        </a:spcBef>
+                        <a:spcAft>
+                          <a:spcPts val="0"/>
+                        </a:spcAft>
+                        <a:buClrTx/>
+                        <a:buSzTx/>
+                        <a:buFontTx/>
+                        <a:buNone/>
+                        <a:tabLst/>
+                        <a:defRPr/>
+                      </a:pPr>
+                      <a:r>
+                        <a:rPr lang="en-GB" sz="1100" b="1" baseline="0" dirty="0" smtClean="0">
+                          <a:solidFill>
+                            <a:schemeClr val="tx1"/>
+                          </a:solidFill>
+                          <a:latin typeface="Courier New" pitchFamily="49" charset="0"/>
+                        </a:rPr>
+                        <a:t>with Interfaces.C.Strings;</a:t>
+                      </a:r>
+                    </a:p>
+                    <a:p>
+                      <a:pPr marL="0" marR="0" indent="0" algn="l" defTabSz="914400" rtl="0" eaLnBrk="1" fontAlgn="auto" latinLnBrk="0" hangingPunct="1">
+                        <a:lnSpc>
+                          <a:spcPct val="100000"/>
+                        </a:lnSpc>
+                        <a:spcBef>
+                          <a:spcPts val="0"/>
+                        </a:spcBef>
+                        <a:spcAft>
+                          <a:spcPts val="0"/>
+                        </a:spcAft>
+                        <a:buClrTx/>
+                        <a:buSzTx/>
+                        <a:buFontTx/>
+                        <a:buNone/>
+                        <a:tabLst/>
+                        <a:defRPr/>
+                      </a:pPr>
+                      <a:endParaRPr lang="en-GB" sz="1100" b="1" baseline="0" dirty="0" smtClean="0">
+                        <a:solidFill>
+                          <a:schemeClr val="tx1"/>
+                        </a:solidFill>
+                        <a:latin typeface="Courier New" pitchFamily="49" charset="0"/>
+                      </a:endParaRPr>
+                    </a:p>
+                    <a:p>
+                      <a:pPr marL="0" marR="0" indent="0" algn="l" defTabSz="914400" rtl="0" eaLnBrk="1" fontAlgn="auto" latinLnBrk="0" hangingPunct="1">
+                        <a:lnSpc>
+                          <a:spcPct val="100000"/>
+                        </a:lnSpc>
+                        <a:spcBef>
+                          <a:spcPts val="0"/>
+                        </a:spcBef>
+                        <a:spcAft>
+                          <a:spcPts val="0"/>
+                        </a:spcAft>
+                        <a:buClrTx/>
+                        <a:buSzTx/>
+                        <a:buFontTx/>
+                        <a:buNone/>
+                        <a:tabLst/>
+                        <a:defRPr/>
+                      </a:pPr>
+                      <a:r>
+                        <a:rPr lang="en-GB" sz="1100" b="1" baseline="0" dirty="0" smtClean="0">
+                          <a:solidFill>
+                            <a:schemeClr val="tx1"/>
+                          </a:solidFill>
+                          <a:latin typeface="Courier New" pitchFamily="49" charset="0"/>
+                        </a:rPr>
+                        <a:t>package </a:t>
+                      </a:r>
+                      <a:r>
+                        <a:rPr lang="en-GB" sz="1100" b="1" baseline="0" dirty="0" err="1" smtClean="0">
+                          <a:solidFill>
+                            <a:schemeClr val="tx1"/>
+                          </a:solidFill>
+                          <a:latin typeface="Courier New" pitchFamily="49" charset="0"/>
+                        </a:rPr>
+                        <a:t>clib_h</a:t>
+                      </a:r>
+                      <a:r>
+                        <a:rPr lang="en-GB" sz="1100" b="1" baseline="0" dirty="0" smtClean="0">
+                          <a:solidFill>
+                            <a:schemeClr val="tx1"/>
+                          </a:solidFill>
+                          <a:latin typeface="Courier New" pitchFamily="49" charset="0"/>
+                        </a:rPr>
+                        <a:t> is</a:t>
+                      </a:r>
+                    </a:p>
+                    <a:p>
+                      <a:pPr marL="0" marR="0" indent="0" algn="l" defTabSz="914400" rtl="0" eaLnBrk="1" fontAlgn="auto" latinLnBrk="0" hangingPunct="1">
+                        <a:lnSpc>
+                          <a:spcPct val="100000"/>
+                        </a:lnSpc>
+                        <a:spcBef>
+                          <a:spcPts val="0"/>
+                        </a:spcBef>
+                        <a:spcAft>
+                          <a:spcPts val="0"/>
+                        </a:spcAft>
+                        <a:buClrTx/>
+                        <a:buSzTx/>
+                        <a:buFontTx/>
+                        <a:buNone/>
+                        <a:tabLst/>
+                        <a:defRPr/>
+                      </a:pPr>
+                      <a:endParaRPr lang="en-GB" sz="1100" b="1" baseline="0" dirty="0" smtClean="0">
+                        <a:solidFill>
+                          <a:schemeClr val="tx1"/>
+                        </a:solidFill>
+                        <a:latin typeface="Courier New" pitchFamily="49" charset="0"/>
+                      </a:endParaRPr>
+                    </a:p>
+                    <a:p>
+                      <a:pPr marL="0" marR="0" indent="0" algn="l" defTabSz="914400" rtl="0" eaLnBrk="1" fontAlgn="auto" latinLnBrk="0" hangingPunct="1">
+                        <a:lnSpc>
+                          <a:spcPct val="100000"/>
+                        </a:lnSpc>
+                        <a:spcBef>
+                          <a:spcPts val="0"/>
+                        </a:spcBef>
+                        <a:spcAft>
+                          <a:spcPts val="0"/>
+                        </a:spcAft>
+                        <a:buClrTx/>
+                        <a:buSzTx/>
+                        <a:buFontTx/>
+                        <a:buNone/>
+                        <a:tabLst/>
+                        <a:defRPr/>
+                      </a:pPr>
+                      <a:r>
+                        <a:rPr lang="en-GB" sz="1100" b="1" baseline="0" dirty="0" smtClean="0">
+                          <a:solidFill>
+                            <a:schemeClr val="tx1"/>
+                          </a:solidFill>
+                          <a:latin typeface="Courier New" pitchFamily="49" charset="0"/>
+                        </a:rPr>
+                        <a:t>   procedure function1 (arg1 : </a:t>
+                      </a:r>
+                      <a:r>
+                        <a:rPr lang="en-GB" sz="1100" b="1" baseline="0" dirty="0" err="1" smtClean="0">
+                          <a:solidFill>
+                            <a:schemeClr val="tx1"/>
+                          </a:solidFill>
+                          <a:latin typeface="Courier New" pitchFamily="49" charset="0"/>
+                        </a:rPr>
+                        <a:t>System.Address</a:t>
+                      </a:r>
+                      <a:r>
+                        <a:rPr lang="en-GB" sz="1100" b="1" baseline="0" dirty="0" smtClean="0">
+                          <a:solidFill>
+                            <a:schemeClr val="tx1"/>
+                          </a:solidFill>
+                          <a:latin typeface="Courier New" pitchFamily="49" charset="0"/>
+                        </a:rPr>
+                        <a:t>);  -- clib.h:3</a:t>
+                      </a:r>
+                    </a:p>
+                    <a:p>
+                      <a:pPr marL="0" marR="0" indent="0" algn="l" defTabSz="914400" rtl="0" eaLnBrk="1" fontAlgn="auto" latinLnBrk="0" hangingPunct="1">
+                        <a:lnSpc>
+                          <a:spcPct val="100000"/>
+                        </a:lnSpc>
+                        <a:spcBef>
+                          <a:spcPts val="0"/>
+                        </a:spcBef>
+                        <a:spcAft>
+                          <a:spcPts val="0"/>
+                        </a:spcAft>
+                        <a:buClrTx/>
+                        <a:buSzTx/>
+                        <a:buFontTx/>
+                        <a:buNone/>
+                        <a:tabLst/>
+                        <a:defRPr/>
+                      </a:pPr>
+                      <a:r>
+                        <a:rPr lang="en-GB" sz="1100" b="1" baseline="0" dirty="0" smtClean="0">
+                          <a:solidFill>
+                            <a:schemeClr val="tx1"/>
+                          </a:solidFill>
+                          <a:latin typeface="Courier New" pitchFamily="49" charset="0"/>
+                        </a:rPr>
+                        <a:t>   pragma Import (C, function1, "function1");</a:t>
+                      </a:r>
+                    </a:p>
+                    <a:p>
+                      <a:pPr marL="0" marR="0" indent="0" algn="l" defTabSz="914400" rtl="0" eaLnBrk="1" fontAlgn="auto" latinLnBrk="0" hangingPunct="1">
+                        <a:lnSpc>
+                          <a:spcPct val="100000"/>
+                        </a:lnSpc>
+                        <a:spcBef>
+                          <a:spcPts val="0"/>
+                        </a:spcBef>
+                        <a:spcAft>
+                          <a:spcPts val="0"/>
+                        </a:spcAft>
+                        <a:buClrTx/>
+                        <a:buSzTx/>
+                        <a:buFontTx/>
+                        <a:buNone/>
+                        <a:tabLst/>
+                        <a:defRPr/>
+                      </a:pPr>
+                      <a:endParaRPr lang="en-GB" sz="1100" b="1" baseline="0" dirty="0" smtClean="0">
+                        <a:solidFill>
+                          <a:schemeClr val="tx1"/>
+                        </a:solidFill>
+                        <a:latin typeface="Courier New" pitchFamily="49" charset="0"/>
+                      </a:endParaRPr>
+                    </a:p>
+                    <a:p>
+                      <a:pPr marL="0" marR="0" indent="0" algn="l" defTabSz="914400" rtl="0" eaLnBrk="1" fontAlgn="auto" latinLnBrk="0" hangingPunct="1">
+                        <a:lnSpc>
+                          <a:spcPct val="100000"/>
+                        </a:lnSpc>
+                        <a:spcBef>
+                          <a:spcPts val="0"/>
+                        </a:spcBef>
+                        <a:spcAft>
+                          <a:spcPts val="0"/>
+                        </a:spcAft>
+                        <a:buClrTx/>
+                        <a:buSzTx/>
+                        <a:buFontTx/>
+                        <a:buNone/>
+                        <a:tabLst/>
+                        <a:defRPr/>
+                      </a:pPr>
+                      <a:r>
+                        <a:rPr lang="en-GB" sz="1100" b="1" baseline="0" dirty="0" smtClean="0">
+                          <a:solidFill>
+                            <a:schemeClr val="tx1"/>
+                          </a:solidFill>
+                          <a:latin typeface="Courier New" pitchFamily="49" charset="0"/>
+                        </a:rPr>
+                        <a:t>   function function2 return </a:t>
+                      </a:r>
+                      <a:r>
+                        <a:rPr lang="en-GB" sz="1100" b="1" baseline="0" dirty="0" err="1" smtClean="0">
+                          <a:solidFill>
+                            <a:schemeClr val="tx1"/>
+                          </a:solidFill>
+                          <a:latin typeface="Courier New" pitchFamily="49" charset="0"/>
+                        </a:rPr>
+                        <a:t>System.Address</a:t>
+                      </a:r>
+                      <a:r>
+                        <a:rPr lang="en-GB" sz="1100" b="1" baseline="0" dirty="0" smtClean="0">
+                          <a:solidFill>
+                            <a:schemeClr val="tx1"/>
+                          </a:solidFill>
+                          <a:latin typeface="Courier New" pitchFamily="49" charset="0"/>
+                        </a:rPr>
+                        <a:t>;  -- clib.h:5</a:t>
+                      </a:r>
+                    </a:p>
+                    <a:p>
+                      <a:pPr marL="0" marR="0" indent="0" algn="l" defTabSz="914400" rtl="0" eaLnBrk="1" fontAlgn="auto" latinLnBrk="0" hangingPunct="1">
+                        <a:lnSpc>
+                          <a:spcPct val="100000"/>
+                        </a:lnSpc>
+                        <a:spcBef>
+                          <a:spcPts val="0"/>
+                        </a:spcBef>
+                        <a:spcAft>
+                          <a:spcPts val="0"/>
+                        </a:spcAft>
+                        <a:buClrTx/>
+                        <a:buSzTx/>
+                        <a:buFontTx/>
+                        <a:buNone/>
+                        <a:tabLst/>
+                        <a:defRPr/>
+                      </a:pPr>
+                      <a:r>
+                        <a:rPr lang="en-GB" sz="1100" b="1" baseline="0" dirty="0" smtClean="0">
+                          <a:solidFill>
+                            <a:schemeClr val="tx1"/>
+                          </a:solidFill>
+                          <a:latin typeface="Courier New" pitchFamily="49" charset="0"/>
+                        </a:rPr>
+                        <a:t>   pragma Import (C, function2, "function2");</a:t>
+                      </a:r>
+                    </a:p>
+                    <a:p>
+                      <a:pPr marL="0" marR="0" indent="0" algn="l" defTabSz="914400" rtl="0" eaLnBrk="1" fontAlgn="auto" latinLnBrk="0" hangingPunct="1">
+                        <a:lnSpc>
+                          <a:spcPct val="100000"/>
+                        </a:lnSpc>
+                        <a:spcBef>
+                          <a:spcPts val="0"/>
+                        </a:spcBef>
+                        <a:spcAft>
+                          <a:spcPts val="0"/>
+                        </a:spcAft>
+                        <a:buClrTx/>
+                        <a:buSzTx/>
+                        <a:buFontTx/>
+                        <a:buNone/>
+                        <a:tabLst/>
+                        <a:defRPr/>
+                      </a:pPr>
+                      <a:endParaRPr lang="en-GB" sz="1100" b="1" baseline="0" dirty="0" smtClean="0">
+                        <a:solidFill>
+                          <a:schemeClr val="tx1"/>
+                        </a:solidFill>
+                        <a:latin typeface="Courier New" pitchFamily="49" charset="0"/>
+                      </a:endParaRPr>
+                    </a:p>
+                    <a:p>
+                      <a:pPr marL="0" marR="0" indent="0" algn="l" defTabSz="914400" rtl="0" eaLnBrk="1" fontAlgn="auto" latinLnBrk="0" hangingPunct="1">
+                        <a:lnSpc>
+                          <a:spcPct val="100000"/>
+                        </a:lnSpc>
+                        <a:spcBef>
+                          <a:spcPts val="0"/>
+                        </a:spcBef>
+                        <a:spcAft>
+                          <a:spcPts val="0"/>
+                        </a:spcAft>
+                        <a:buClrTx/>
+                        <a:buSzTx/>
+                        <a:buFontTx/>
+                        <a:buNone/>
+                        <a:tabLst/>
+                        <a:defRPr/>
+                      </a:pPr>
+                      <a:r>
+                        <a:rPr lang="en-GB" sz="1100" b="1" baseline="0" dirty="0" smtClean="0">
+                          <a:solidFill>
+                            <a:schemeClr val="tx1"/>
+                          </a:solidFill>
+                          <a:latin typeface="Courier New" pitchFamily="49" charset="0"/>
+                        </a:rPr>
+                        <a:t>   function function3 (arg1 : </a:t>
+                      </a:r>
+                      <a:r>
+                        <a:rPr lang="en-GB" sz="1100" b="1" baseline="0" dirty="0" err="1" smtClean="0">
+                          <a:solidFill>
+                            <a:schemeClr val="tx1"/>
+                          </a:solidFill>
+                          <a:latin typeface="Courier New" pitchFamily="49" charset="0"/>
+                        </a:rPr>
+                        <a:t>System.Address</a:t>
+                      </a:r>
+                      <a:r>
+                        <a:rPr lang="en-GB" sz="1100" b="1" baseline="0" dirty="0" smtClean="0">
+                          <a:solidFill>
+                            <a:schemeClr val="tx1"/>
+                          </a:solidFill>
+                          <a:latin typeface="Courier New" pitchFamily="49" charset="0"/>
+                        </a:rPr>
+                        <a:t>) return </a:t>
+                      </a:r>
+                      <a:r>
+                        <a:rPr lang="en-GB" sz="1100" b="1" baseline="0" dirty="0" err="1" smtClean="0">
+                          <a:solidFill>
+                            <a:schemeClr val="tx1"/>
+                          </a:solidFill>
+                          <a:latin typeface="Courier New" pitchFamily="49" charset="0"/>
+                        </a:rPr>
+                        <a:t>Interfaces.C.Strings.chars_ptr</a:t>
+                      </a:r>
+                      <a:r>
+                        <a:rPr lang="en-GB" sz="1100" b="1" baseline="0" dirty="0" smtClean="0">
+                          <a:solidFill>
+                            <a:schemeClr val="tx1"/>
+                          </a:solidFill>
+                          <a:latin typeface="Courier New" pitchFamily="49" charset="0"/>
+                        </a:rPr>
+                        <a:t>;  -- clib.h:7</a:t>
+                      </a:r>
+                    </a:p>
+                    <a:p>
+                      <a:pPr marL="0" marR="0" indent="0" algn="l" defTabSz="914400" rtl="0" eaLnBrk="1" fontAlgn="auto" latinLnBrk="0" hangingPunct="1">
+                        <a:lnSpc>
+                          <a:spcPct val="100000"/>
+                        </a:lnSpc>
+                        <a:spcBef>
+                          <a:spcPts val="0"/>
+                        </a:spcBef>
+                        <a:spcAft>
+                          <a:spcPts val="0"/>
+                        </a:spcAft>
+                        <a:buClrTx/>
+                        <a:buSzTx/>
+                        <a:buFontTx/>
+                        <a:buNone/>
+                        <a:tabLst/>
+                        <a:defRPr/>
+                      </a:pPr>
+                      <a:r>
+                        <a:rPr lang="en-GB" sz="1100" b="1" baseline="0" dirty="0" smtClean="0">
+                          <a:solidFill>
+                            <a:schemeClr val="tx1"/>
+                          </a:solidFill>
+                          <a:latin typeface="Courier New" pitchFamily="49" charset="0"/>
+                        </a:rPr>
+                        <a:t>   pragma Import (C, function3, "function3");</a:t>
+                      </a:r>
+                    </a:p>
+                    <a:p>
+                      <a:pPr marL="0" marR="0" indent="0" algn="l" defTabSz="914400" rtl="0" eaLnBrk="1" fontAlgn="auto" latinLnBrk="0" hangingPunct="1">
+                        <a:lnSpc>
+                          <a:spcPct val="100000"/>
+                        </a:lnSpc>
+                        <a:spcBef>
+                          <a:spcPts val="0"/>
+                        </a:spcBef>
+                        <a:spcAft>
+                          <a:spcPts val="0"/>
+                        </a:spcAft>
+                        <a:buClrTx/>
+                        <a:buSzTx/>
+                        <a:buFontTx/>
+                        <a:buNone/>
+                        <a:tabLst/>
+                        <a:defRPr/>
+                      </a:pPr>
+                      <a:endParaRPr lang="en-GB" sz="1100" b="1" baseline="0" dirty="0" smtClean="0">
+                        <a:solidFill>
+                          <a:schemeClr val="tx1"/>
+                        </a:solidFill>
+                        <a:latin typeface="Courier New" pitchFamily="49" charset="0"/>
+                      </a:endParaRPr>
+                    </a:p>
+                    <a:p>
+                      <a:pPr marL="0" marR="0" indent="0" algn="l" defTabSz="914400" rtl="0" eaLnBrk="1" fontAlgn="auto" latinLnBrk="0" hangingPunct="1">
+                        <a:lnSpc>
+                          <a:spcPct val="100000"/>
+                        </a:lnSpc>
+                        <a:spcBef>
+                          <a:spcPts val="0"/>
+                        </a:spcBef>
+                        <a:spcAft>
+                          <a:spcPts val="0"/>
+                        </a:spcAft>
+                        <a:buClrTx/>
+                        <a:buSzTx/>
+                        <a:buFontTx/>
+                        <a:buNone/>
+                        <a:tabLst/>
+                        <a:defRPr/>
+                      </a:pPr>
+                      <a:r>
+                        <a:rPr lang="en-GB" sz="1100" b="1" baseline="0" dirty="0" smtClean="0">
+                          <a:solidFill>
+                            <a:schemeClr val="tx1"/>
+                          </a:solidFill>
+                          <a:latin typeface="Courier New" pitchFamily="49" charset="0"/>
+                        </a:rPr>
+                        <a:t>end </a:t>
+                      </a:r>
+                      <a:r>
+                        <a:rPr lang="en-GB" sz="1100" b="1" baseline="0" dirty="0" err="1" smtClean="0">
+                          <a:solidFill>
+                            <a:schemeClr val="tx1"/>
+                          </a:solidFill>
+                          <a:latin typeface="Courier New" pitchFamily="49" charset="0"/>
+                        </a:rPr>
+                        <a:t>clib_h</a:t>
+                      </a:r>
+                      <a:r>
+                        <a:rPr lang="en-GB" sz="1100" b="1" baseline="0" dirty="0" smtClean="0">
+                          <a:solidFill>
+                            <a:schemeClr val="tx1"/>
+                          </a:solidFill>
+                          <a:latin typeface="Courier New" pitchFamily="49" charset="0"/>
+                        </a:rPr>
+                        <a:t>;</a:t>
+                      </a:r>
+                      <a:endParaRPr lang="en-GB" sz="1100" b="1" baseline="0" dirty="0" smtClean="0">
+                        <a:solidFill>
+                          <a:schemeClr val="tx1"/>
+                        </a:solidFill>
+                        <a:latin typeface="Courier New" pitchFamily="49" charset="0"/>
+                      </a:endParaRPr>
+                    </a:p>
+                  </a:txBody>
+                  <a:tcPr marL="91413" marR="91413" marT="45445" marB="45445">
+                    <a:solidFill>
+                      <a:schemeClr val="bg1">
+                        <a:lumMod val="95000"/>
+                      </a:schemeClr>
+                    </a:solidFill>
+                  </a:tcPr>
+                </a:tc>
+              </a:tr>
+            </a:tbl>
+          </a:graphicData>
+        </a:graphic>
+      </p:graphicFrame>
     </p:spTree>
     <p:extLst>
       <p:ext uri="{BB962C8B-B14F-4D97-AF65-F5344CB8AC3E}">
@@ -41592,23 +42919,7 @@
                   <a:schemeClr val="tx1"/>
                 </a:solidFill>
               </a:rPr>
-              <a:t>Must appear as </a:t>
-            </a:r>
-            <a:r>
-              <a:rPr lang="en-GB" b="0" kern="1200" dirty="0" smtClean="0">
-                <a:solidFill>
-                  <a:schemeClr val="tx1"/>
-                </a:solidFill>
-              </a:rPr>
-              <a:t>the </a:t>
-            </a:r>
-            <a:r>
-              <a:rPr lang="en-GB" b="0" kern="1200" dirty="0" smtClean="0">
-                <a:solidFill>
-                  <a:schemeClr val="tx1"/>
-                </a:solidFill>
-              </a:rPr>
-              <a:t>following in C code</a:t>
+              <a:t>Must appear as the following in C code</a:t>
             </a:r>
           </a:p>
           <a:p>
@@ -44598,14 +45909,14 @@
           <p:nvPr>
             <p:extLst>
               <p:ext uri="{D42A27DB-BD31-4B8C-83A1-F6EECF244321}">
-                <p14:modId xmlns:p14="http://schemas.microsoft.com/office/powerpoint/2010/main" val="2287363200"/>
+                <p14:modId xmlns:p14="http://schemas.microsoft.com/office/powerpoint/2010/main" val="2317644965"/>
               </p:ext>
             </p:extLst>
           </p:nvPr>
         </p:nvGraphicFramePr>
         <p:xfrm>
-          <a:off x="864056" y="2870750"/>
-          <a:ext cx="7609384" cy="2270210"/>
+          <a:off x="1451936" y="2870750"/>
+          <a:ext cx="6240129" cy="2270210"/>
         </p:xfrm>
         <a:graphic>
           <a:graphicData uri="http://schemas.openxmlformats.org/drawingml/2006/table">
@@ -44614,7 +45925,7 @@
                 <a:tableStyleId>{5C22544A-7EE6-4342-B048-85BDC9FD1C3A}</a:tableStyleId>
               </a:tblPr>
               <a:tblGrid>
-                <a:gridCol w="7609384"/>
+                <a:gridCol w="6240129"/>
               </a:tblGrid>
               <a:tr h="0">
                 <a:tc>
@@ -44891,22 +46202,31 @@
                         <a:t> return </a:t>
                       </a:r>
                       <a:r>
-                        <a:rPr lang="en-GB" sz="1100" b="0" baseline="0" dirty="0" err="1" smtClean="0">
-                          <a:solidFill>
-                            <a:schemeClr val="tx1"/>
-                          </a:solidFill>
-                          <a:latin typeface="Courier New" pitchFamily="49" charset="0"/>
-                        </a:rPr>
-                        <a:t>char_array_access</a:t>
-                      </a:r>
-                      <a:r>
-                        <a:rPr lang="en-GB" sz="1100" b="1" baseline="0" dirty="0" smtClean="0">
-                          <a:solidFill>
-                            <a:schemeClr val="tx1"/>
-                          </a:solidFill>
-                          <a:latin typeface="Courier New" pitchFamily="49" charset="0"/>
-                        </a:rPr>
-                        <a:t> with</a:t>
+                        <a:rPr lang="en-GB" sz="1100" b="0" baseline="0" dirty="0" smtClean="0">
+                          <a:solidFill>
+                            <a:schemeClr val="tx1"/>
+                          </a:solidFill>
+                          <a:latin typeface="Courier New" pitchFamily="49" charset="0"/>
+                        </a:rPr>
+                        <a:t>chars_ptr</a:t>
+                      </a:r>
+                      <a:r>
+                        <a:rPr lang="en-GB" sz="1100" b="1" baseline="0" dirty="0" smtClean="0">
+                          <a:solidFill>
+                            <a:schemeClr val="tx1"/>
+                          </a:solidFill>
+                          <a:latin typeface="Courier New" pitchFamily="49" charset="0"/>
+                        </a:rPr>
+                        <a:t> </a:t>
+                      </a:r>
+                      <a:r>
+                        <a:rPr lang="en-GB" sz="1100" b="1" baseline="0" dirty="0" smtClean="0">
+                          <a:solidFill>
+                            <a:schemeClr val="tx1"/>
+                          </a:solidFill>
+                          <a:latin typeface="Courier New" pitchFamily="49" charset="0"/>
+                        </a:rPr>
+                        <a:t>with</a:t>
                       </a:r>
                     </a:p>
                     <a:p>
@@ -45170,24 +46490,6 @@
                           </a:solidFill>
                           <a:latin typeface="Courier New" pitchFamily="49" charset="0"/>
                         </a:rPr>
-                        <a:t>Interfaces.C.Strings.To_Chars_Ptr</a:t>
-                      </a:r>
-                      <a:r>
-                        <a:rPr lang="en-GB" sz="1100" b="1" baseline="0" dirty="0" smtClean="0">
-                          <a:solidFill>
-                            <a:schemeClr val="tx1"/>
-                          </a:solidFill>
-                          <a:latin typeface="Courier New" pitchFamily="49" charset="0"/>
-                        </a:rPr>
-                        <a:t>(</a:t>
-                      </a:r>
-                      <a:r>
-                        <a:rPr lang="en-GB" sz="1100" b="0" baseline="0" dirty="0" err="1" smtClean="0">
-                          <a:solidFill>
-                            <a:schemeClr val="tx1"/>
-                          </a:solidFill>
-                          <a:latin typeface="Courier New" pitchFamily="49" charset="0"/>
-                        </a:rPr>
                         <a:t>Get_String</a:t>
                       </a:r>
                       <a:r>
@@ -45197,8 +46499,14 @@
                           </a:solidFill>
                           <a:latin typeface="Courier New" pitchFamily="49" charset="0"/>
                         </a:rPr>
-                        <a:t>)));</a:t>
-                      </a:r>
+                        <a:t>));</a:t>
+                      </a:r>
+                      <a:endParaRPr lang="en-GB" sz="1100" b="1" baseline="0" dirty="0" smtClean="0">
+                        <a:solidFill>
+                          <a:schemeClr val="tx1"/>
+                        </a:solidFill>
+                        <a:latin typeface="Courier New" pitchFamily="49" charset="0"/>
+                      </a:endParaRPr>
                     </a:p>
                     <a:p>
                       <a:pPr marL="0" marR="0" indent="0" algn="l" defTabSz="914400" rtl="0" eaLnBrk="1" fontAlgn="auto" latinLnBrk="0" hangingPunct="1">
@@ -45275,13 +46583,13 @@
           <p:nvPr>
             <p:extLst>
               <p:ext uri="{D42A27DB-BD31-4B8C-83A1-F6EECF244321}">
-                <p14:modId xmlns:p14="http://schemas.microsoft.com/office/powerpoint/2010/main" val="3998652116"/>
+                <p14:modId xmlns:p14="http://schemas.microsoft.com/office/powerpoint/2010/main" val="3555692696"/>
               </p:ext>
             </p:extLst>
           </p:nvPr>
         </p:nvGraphicFramePr>
         <p:xfrm>
-          <a:off x="2735248" y="1257610"/>
+          <a:off x="2799004" y="1257610"/>
           <a:ext cx="3545993" cy="1096730"/>
         </p:xfrm>
         <a:graphic>

</xml_diff>